<commit_message>
Added Cluster PaymentOrders_Acc in Rapidminer and respective slide in the presentation
</commit_message>
<xml_diff>
--- a/Banking Data Mining.pptx
+++ b/Banking Data Mining.pptx
@@ -19,13 +19,13 @@
     <p:sldId id="263" r:id="rId13"/>
     <p:sldId id="272" r:id="rId14"/>
     <p:sldId id="273" r:id="rId15"/>
-    <p:sldId id="260" r:id="rId16"/>
-    <p:sldId id="271" r:id="rId17"/>
-    <p:sldId id="269" r:id="rId18"/>
-    <p:sldId id="270" r:id="rId19"/>
-    <p:sldId id="274" r:id="rId20"/>
-    <p:sldId id="275" r:id="rId21"/>
-    <p:sldId id="277" r:id="rId22"/>
+    <p:sldId id="276" r:id="rId16"/>
+    <p:sldId id="260" r:id="rId17"/>
+    <p:sldId id="271" r:id="rId18"/>
+    <p:sldId id="269" r:id="rId19"/>
+    <p:sldId id="270" r:id="rId20"/>
+    <p:sldId id="274" r:id="rId21"/>
+    <p:sldId id="275" r:id="rId22"/>
   </p:sldIdLst>
   <p:sldSz cx="12192000" cy="6858000"/>
   <p:notesSz cx="6858000" cy="9144000"/>
@@ -4123,7 +4123,11 @@
           <a:p>
             <a:r>
               <a:rPr lang="en-US" dirty="0" smtClean="0"/>
-              <a:t>Predictive data mining </a:t>
+              <a:t>Permanent Orders &amp; Loans </a:t>
+            </a:r>
+            <a:r>
+              <a:rPr lang="en-US" dirty="0" smtClean="0"/>
+              <a:t>/ Clients Clustering</a:t>
             </a:r>
             <a:endParaRPr lang="pt-PT" dirty="0"/>
           </a:p>
@@ -4136,22 +4140,56 @@
             <a:spLocks noGrp="1"/>
           </p:cNvSpPr>
           <p:nvPr>
-            <p:ph type="body" idx="1"/>
-          </p:nvPr>
-        </p:nvSpPr>
-        <p:spPr/>
-        <p:txBody>
-          <a:bodyPr/>
-          <a:lstStyle/>
-          <a:p>
-            <a:endParaRPr lang="pt-PT" dirty="0"/>
-          </a:p>
-        </p:txBody>
-      </p:sp>
+            <p:ph type="body" sz="half" idx="2"/>
+          </p:nvPr>
+        </p:nvSpPr>
+        <p:spPr/>
+        <p:txBody>
+          <a:bodyPr>
+            <a:normAutofit/>
+          </a:bodyPr>
+          <a:lstStyle/>
+          <a:p>
+            <a:r>
+              <a:rPr lang="en-US" sz="1800" dirty="0" smtClean="0"/>
+              <a:t>It seems to be a correlation between a low frequency of issued statements of an account and smaller amounts of each loan and each permanent order done by that account.</a:t>
+            </a:r>
+            <a:endParaRPr lang="en-US" sz="1800" dirty="0" smtClean="0"/>
+          </a:p>
+        </p:txBody>
+      </p:sp>
+      <p:pic>
+        <p:nvPicPr>
+          <p:cNvPr id="6" name="Content Placeholder 5"/>
+          <p:cNvPicPr>
+            <a:picLocks noGrp="1" noChangeAspect="1"/>
+          </p:cNvPicPr>
+          <p:nvPr>
+            <p:ph idx="1"/>
+          </p:nvPr>
+        </p:nvPicPr>
+        <p:blipFill rotWithShape="1">
+          <a:blip r:embed="rId2">
+            <a:extLst>
+              <a:ext uri="{28A0092B-C50C-407E-A947-70E740481C1C}">
+                <a14:useLocalDpi xmlns:a14="http://schemas.microsoft.com/office/drawing/2010/main" val="0"/>
+              </a:ext>
+            </a:extLst>
+          </a:blip>
+          <a:srcRect l="1796" t="3069" r="886" b="5579"/>
+          <a:stretch/>
+        </p:blipFill>
+        <p:spPr>
+          <a:xfrm>
+            <a:off x="4445000" y="2362200"/>
+            <a:ext cx="6648183" cy="1728000"/>
+          </a:xfrm>
+        </p:spPr>
+      </p:pic>
     </p:spTree>
     <p:extLst>
       <p:ext uri="{BB962C8B-B14F-4D97-AF65-F5344CB8AC3E}">
-        <p14:creationId xmlns:p14="http://schemas.microsoft.com/office/powerpoint/2010/main" val="1179486777"/>
+        <p14:creationId xmlns:p14="http://schemas.microsoft.com/office/powerpoint/2010/main" val="3513839283"/>
       </p:ext>
     </p:extLst>
   </p:cSld>
@@ -4195,7 +4233,7 @@
           <a:p>
             <a:r>
               <a:rPr lang="en-US" dirty="0" smtClean="0"/>
-              <a:t>Data problems and applied solutions</a:t>
+              <a:t>Predictive data mining </a:t>
             </a:r>
             <a:endParaRPr lang="pt-PT" dirty="0"/>
           </a:p>
@@ -4203,117 +4241,27 @@
       </p:sp>
       <p:sp>
         <p:nvSpPr>
-          <p:cNvPr id="3" name="Content Placeholder 2"/>
-          <p:cNvSpPr>
-            <a:spLocks noGrp="1"/>
-          </p:cNvSpPr>
-          <p:nvPr>
-            <p:ph idx="1"/>
-          </p:nvPr>
-        </p:nvSpPr>
-        <p:spPr/>
-        <p:txBody>
-          <a:bodyPr/>
-          <a:lstStyle/>
-          <a:p>
-            <a:r>
-              <a:rPr lang="en-US" dirty="0" smtClean="0"/>
-              <a:t>We had a small dataset of finished loans (loans with status A or B</a:t>
-            </a:r>
-            <a:r>
-              <a:rPr lang="en-US" dirty="0" smtClean="0"/>
-              <a:t>) and a large amount of unfinished loans (status C and D)</a:t>
-            </a:r>
-            <a:endParaRPr lang="en-US" dirty="0" smtClean="0"/>
-          </a:p>
-          <a:p>
-            <a:pPr lvl="1"/>
-            <a:r>
-              <a:rPr lang="en-US" dirty="0" smtClean="0"/>
-              <a:t>Around 234 </a:t>
-            </a:r>
-            <a:r>
-              <a:rPr lang="en-US" dirty="0" smtClean="0"/>
-              <a:t>loans (</a:t>
-            </a:r>
-            <a:r>
-              <a:rPr lang="en-US" dirty="0" smtClean="0"/>
-              <a:t>s</a:t>
-            </a:r>
-            <a:r>
-              <a:rPr lang="en-US" dirty="0" smtClean="0"/>
-              <a:t>tatus A or B).</a:t>
-            </a:r>
-          </a:p>
-          <a:p>
-            <a:pPr lvl="1"/>
-            <a:r>
-              <a:rPr lang="en-US" dirty="0" smtClean="0"/>
-              <a:t>Around 448 unfinished loans (status C or D).</a:t>
-            </a:r>
-            <a:endParaRPr lang="en-US" dirty="0" smtClean="0"/>
-          </a:p>
-          <a:p>
-            <a:r>
-              <a:rPr lang="en-US" dirty="0" smtClean="0"/>
-              <a:t>Recurrent overfitting the model.</a:t>
-            </a:r>
-          </a:p>
-          <a:p>
-            <a:pPr lvl="1"/>
-            <a:r>
-              <a:rPr lang="en-US" dirty="0" smtClean="0"/>
-              <a:t>Modification of (pre)pruning parameters.</a:t>
-            </a:r>
-          </a:p>
-          <a:p>
-            <a:r>
-              <a:rPr lang="en-US" dirty="0" smtClean="0"/>
-              <a:t>Ignoring of irrelevant attributes.</a:t>
-            </a:r>
-          </a:p>
-          <a:p>
-            <a:pPr lvl="1"/>
-            <a:r>
-              <a:rPr lang="en-US" dirty="0" smtClean="0"/>
-              <a:t>We opted for not using any date related field because that would make the model unsuitable for future predictions.</a:t>
-            </a:r>
-          </a:p>
-          <a:p>
-            <a:pPr lvl="1"/>
-            <a:r>
-              <a:rPr lang="en-US" dirty="0" smtClean="0"/>
-              <a:t>We opted to not use gender as a decision variable too.</a:t>
-            </a:r>
-          </a:p>
-          <a:p>
-            <a:r>
-              <a:rPr lang="en-US" dirty="0" smtClean="0"/>
-              <a:t>There isn’t a good distribution of loans by status.</a:t>
-            </a:r>
-          </a:p>
-          <a:p>
-            <a:pPr lvl="1"/>
-            <a:r>
-              <a:rPr lang="en-US" dirty="0" smtClean="0"/>
-              <a:t>The majority of the current loans are of type C and finished loans of type A, </a:t>
-            </a:r>
-            <a:r>
-              <a:rPr lang="pt-PT" dirty="0"/>
-              <a:t>difficulting</a:t>
-            </a:r>
-            <a:r>
-              <a:rPr lang="en-US" dirty="0" smtClean="0"/>
-              <a:t> the perdition of bad indicators for loans.</a:t>
-            </a:r>
-            <a:endParaRPr lang="en-US" dirty="0"/>
+          <p:cNvPr id="4" name="Text Placeholder 3"/>
+          <p:cNvSpPr>
+            <a:spLocks noGrp="1"/>
+          </p:cNvSpPr>
+          <p:nvPr>
+            <p:ph type="body" idx="1"/>
+          </p:nvPr>
+        </p:nvSpPr>
+        <p:spPr/>
+        <p:txBody>
+          <a:bodyPr/>
+          <a:lstStyle/>
+          <a:p>
+            <a:endParaRPr lang="pt-PT" dirty="0"/>
           </a:p>
         </p:txBody>
       </p:sp>
     </p:spTree>
     <p:extLst>
       <p:ext uri="{BB962C8B-B14F-4D97-AF65-F5344CB8AC3E}">
-        <p14:creationId xmlns:p14="http://schemas.microsoft.com/office/powerpoint/2010/main" val="2393289478"/>
+        <p14:creationId xmlns:p14="http://schemas.microsoft.com/office/powerpoint/2010/main" val="1179486777"/>
       </p:ext>
     </p:extLst>
   </p:cSld>
@@ -4342,6 +4290,151 @@
       </p:grpSpPr>
       <p:sp>
         <p:nvSpPr>
+          <p:cNvPr id="2" name="Title 1"/>
+          <p:cNvSpPr>
+            <a:spLocks noGrp="1"/>
+          </p:cNvSpPr>
+          <p:nvPr>
+            <p:ph type="title"/>
+          </p:nvPr>
+        </p:nvSpPr>
+        <p:spPr/>
+        <p:txBody>
+          <a:bodyPr/>
+          <a:lstStyle/>
+          <a:p>
+            <a:r>
+              <a:rPr lang="en-US" dirty="0" smtClean="0"/>
+              <a:t>Data problems and applied solutions</a:t>
+            </a:r>
+            <a:endParaRPr lang="pt-PT" dirty="0"/>
+          </a:p>
+        </p:txBody>
+      </p:sp>
+      <p:sp>
+        <p:nvSpPr>
+          <p:cNvPr id="3" name="Content Placeholder 2"/>
+          <p:cNvSpPr>
+            <a:spLocks noGrp="1"/>
+          </p:cNvSpPr>
+          <p:nvPr>
+            <p:ph idx="1"/>
+          </p:nvPr>
+        </p:nvSpPr>
+        <p:spPr/>
+        <p:txBody>
+          <a:bodyPr/>
+          <a:lstStyle/>
+          <a:p>
+            <a:r>
+              <a:rPr lang="en-US" dirty="0" smtClean="0"/>
+              <a:t>We had a small dataset of finished loans (loans with status A or B)</a:t>
+            </a:r>
+          </a:p>
+          <a:p>
+            <a:pPr lvl="1"/>
+            <a:r>
+              <a:rPr lang="en-US" dirty="0" smtClean="0"/>
+              <a:t>Around 234 loans.</a:t>
+            </a:r>
+          </a:p>
+          <a:p>
+            <a:r>
+              <a:rPr lang="en-US" dirty="0" smtClean="0"/>
+              <a:t>Recurrent overfitting the model.</a:t>
+            </a:r>
+          </a:p>
+          <a:p>
+            <a:pPr lvl="1"/>
+            <a:r>
+              <a:rPr lang="en-US" dirty="0" smtClean="0"/>
+              <a:t>Modification of (pre)pruning parameters.</a:t>
+            </a:r>
+          </a:p>
+          <a:p>
+            <a:r>
+              <a:rPr lang="en-US" dirty="0" smtClean="0"/>
+              <a:t>Ignoring of irrelevant attributes.</a:t>
+            </a:r>
+          </a:p>
+          <a:p>
+            <a:pPr lvl="1"/>
+            <a:r>
+              <a:rPr lang="en-US" dirty="0" smtClean="0"/>
+              <a:t>We opted for not using any date related field because that would make the model unsuitable for future predictions.</a:t>
+            </a:r>
+          </a:p>
+          <a:p>
+            <a:pPr lvl="1"/>
+            <a:r>
+              <a:rPr lang="en-US" dirty="0" smtClean="0"/>
+              <a:t>We opted to not use gender as a decision variable too.</a:t>
+            </a:r>
+          </a:p>
+          <a:p>
+            <a:r>
+              <a:rPr lang="en-US" dirty="0" smtClean="0"/>
+              <a:t>There isn’t a good distribution of loans by status.</a:t>
+            </a:r>
+          </a:p>
+          <a:p>
+            <a:pPr lvl="1"/>
+            <a:r>
+              <a:rPr lang="en-US" dirty="0" smtClean="0"/>
+              <a:t>The majority of the current loans are of type C and finished loans of type A, </a:t>
+            </a:r>
+            <a:r>
+              <a:rPr lang="pt-PT" dirty="0"/>
+              <a:t>difficulting</a:t>
+            </a:r>
+            <a:r>
+              <a:rPr lang="en-US" dirty="0" smtClean="0"/>
+              <a:t> the </a:t>
+            </a:r>
+            <a:r>
+              <a:rPr lang="en-US" dirty="0" smtClean="0"/>
+              <a:t>prediction </a:t>
+            </a:r>
+            <a:r>
+              <a:rPr lang="en-US" dirty="0" smtClean="0"/>
+              <a:t>of bad indicators for loans.</a:t>
+            </a:r>
+            <a:endParaRPr lang="en-US" dirty="0"/>
+          </a:p>
+        </p:txBody>
+      </p:sp>
+    </p:spTree>
+    <p:extLst>
+      <p:ext uri="{BB962C8B-B14F-4D97-AF65-F5344CB8AC3E}">
+        <p14:creationId xmlns:p14="http://schemas.microsoft.com/office/powerpoint/2010/main" val="2393289478"/>
+      </p:ext>
+    </p:extLst>
+  </p:cSld>
+  <p:clrMapOvr>
+    <a:masterClrMapping/>
+  </p:clrMapOvr>
+</p:sld>
+</file>
+
+<file path=ppt/slides/slide18.xml><?xml version="1.0" encoding="utf-8"?>
+<p:sld xmlns:a="http://schemas.openxmlformats.org/drawingml/2006/main" xmlns:r="http://schemas.openxmlformats.org/officeDocument/2006/relationships" xmlns:p="http://schemas.openxmlformats.org/presentationml/2006/main">
+  <p:cSld>
+    <p:spTree>
+      <p:nvGrpSpPr>
+        <p:cNvPr id="1" name=""/>
+        <p:cNvGrpSpPr/>
+        <p:nvPr/>
+      </p:nvGrpSpPr>
+      <p:grpSpPr>
+        <a:xfrm>
+          <a:off x="0" y="0"/>
+          <a:ext cx="0" cy="0"/>
+          <a:chOff x="0" y="0"/>
+          <a:chExt cx="0" cy="0"/>
+        </a:xfrm>
+      </p:grpSpPr>
+      <p:sp>
+        <p:nvSpPr>
           <p:cNvPr id="13" name="Title 12"/>
           <p:cNvSpPr>
             <a:spLocks noGrp="1"/>
@@ -4353,7 +4446,7 @@
         <p:spPr>
           <a:xfrm>
             <a:off x="256032" y="917419"/>
-            <a:ext cx="2834640" cy="1960252"/>
+            <a:ext cx="2834640" cy="1341688"/>
           </a:xfrm>
         </p:spPr>
         <p:txBody>
@@ -4366,17 +4459,6 @@
               <a:rPr lang="en-US" dirty="0" smtClean="0"/>
               <a:t>Decision tree for predicting successful  loans  </a:t>
             </a:r>
-            <a:r>
-              <a:rPr lang="en-US" dirty="0" smtClean="0"/>
-              <a:t/>
-            </a:r>
-            <a:br>
-              <a:rPr lang="en-US" dirty="0" smtClean="0"/>
-            </a:br>
-            <a:r>
-              <a:rPr lang="en-US" dirty="0" smtClean="0"/>
-              <a:t>(based only on finished loans)</a:t>
-            </a:r>
             <a:endParaRPr lang="pt-PT" dirty="0"/>
           </a:p>
         </p:txBody>
@@ -4393,8 +4475,8 @@
         </p:nvSpPr>
         <p:spPr>
           <a:xfrm>
-            <a:off x="256032" y="2877671"/>
-            <a:ext cx="2834640" cy="2937913"/>
+            <a:off x="256032" y="2447365"/>
+            <a:ext cx="2834640" cy="3368219"/>
           </a:xfrm>
         </p:spPr>
         <p:txBody>
@@ -4408,8 +4490,8 @@
               <a:t>We come to the conclusion that the most influencing attributes for loans success or failure are “</a:t>
             </a:r>
             <a:r>
-              <a:rPr lang="en-US" sz="1800" dirty="0" smtClean="0"/>
-              <a:t>average salary</a:t>
+              <a:rPr lang="en-US" sz="1800" dirty="0" err="1" smtClean="0"/>
+              <a:t>average_salary</a:t>
             </a:r>
             <a:r>
               <a:rPr lang="en-US" sz="1800" dirty="0" smtClean="0"/>
@@ -4484,142 +4566,6 @@
 </p:sld>
 </file>
 
-<file path=ppt/slides/slide18.xml><?xml version="1.0" encoding="utf-8"?>
-<p:sld xmlns:a="http://schemas.openxmlformats.org/drawingml/2006/main" xmlns:r="http://schemas.openxmlformats.org/officeDocument/2006/relationships" xmlns:p="http://schemas.openxmlformats.org/presentationml/2006/main">
-  <p:cSld>
-    <p:spTree>
-      <p:nvGrpSpPr>
-        <p:cNvPr id="1" name=""/>
-        <p:cNvGrpSpPr/>
-        <p:nvPr/>
-      </p:nvGrpSpPr>
-      <p:grpSpPr>
-        <a:xfrm>
-          <a:off x="0" y="0"/>
-          <a:ext cx="0" cy="0"/>
-          <a:chOff x="0" y="0"/>
-          <a:chExt cx="0" cy="0"/>
-        </a:xfrm>
-      </p:grpSpPr>
-      <p:sp>
-        <p:nvSpPr>
-          <p:cNvPr id="5" name="Title 4"/>
-          <p:cNvSpPr>
-            <a:spLocks noGrp="1"/>
-          </p:cNvSpPr>
-          <p:nvPr>
-            <p:ph type="title"/>
-          </p:nvPr>
-        </p:nvSpPr>
-        <p:spPr/>
-        <p:txBody>
-          <a:bodyPr/>
-          <a:lstStyle/>
-          <a:p>
-            <a:r>
-              <a:rPr lang="en-US" dirty="0" smtClean="0"/>
-              <a:t>How we reach this solution?</a:t>
-            </a:r>
-            <a:endParaRPr lang="pt-PT" dirty="0"/>
-          </a:p>
-        </p:txBody>
-      </p:sp>
-      <p:sp>
-        <p:nvSpPr>
-          <p:cNvPr id="6" name="Content Placeholder 5"/>
-          <p:cNvSpPr>
-            <a:spLocks noGrp="1"/>
-          </p:cNvSpPr>
-          <p:nvPr>
-            <p:ph idx="1"/>
-          </p:nvPr>
-        </p:nvSpPr>
-        <p:spPr/>
-        <p:txBody>
-          <a:bodyPr/>
-          <a:lstStyle/>
-          <a:p>
-            <a:r>
-              <a:rPr lang="en-US" dirty="0" err="1" smtClean="0"/>
-              <a:t>Rapidminer</a:t>
-            </a:r>
-            <a:endParaRPr lang="en-US" dirty="0" smtClean="0"/>
-          </a:p>
-          <a:p>
-            <a:r>
-              <a:rPr lang="en-US" dirty="0" smtClean="0"/>
-              <a:t>Using split validation operation:</a:t>
-            </a:r>
-          </a:p>
-          <a:p>
-            <a:pPr lvl="1"/>
-            <a:r>
-              <a:rPr lang="en-US" dirty="0" smtClean="0"/>
-              <a:t>70% as training data and 30% as testing.</a:t>
-            </a:r>
-          </a:p>
-          <a:p>
-            <a:r>
-              <a:rPr lang="en-US" dirty="0" smtClean="0"/>
-              <a:t>Using Decision tree operator:</a:t>
-            </a:r>
-          </a:p>
-          <a:p>
-            <a:pPr lvl="1"/>
-            <a:r>
-              <a:rPr lang="en-US" dirty="0" smtClean="0"/>
-              <a:t>Using pruning:</a:t>
-            </a:r>
-          </a:p>
-          <a:p>
-            <a:pPr lvl="2"/>
-            <a:r>
-              <a:rPr lang="en-US" dirty="0" smtClean="0"/>
-              <a:t>Confidence 25%</a:t>
-            </a:r>
-          </a:p>
-          <a:p>
-            <a:pPr lvl="1"/>
-            <a:r>
-              <a:rPr lang="en-US" dirty="0" smtClean="0"/>
-              <a:t>Using pre-pruning:</a:t>
-            </a:r>
-          </a:p>
-          <a:p>
-            <a:pPr lvl="2"/>
-            <a:r>
-              <a:rPr lang="en-US" dirty="0" smtClean="0"/>
-              <a:t>Minimal gain of 5%</a:t>
-            </a:r>
-          </a:p>
-          <a:p>
-            <a:r>
-              <a:rPr lang="en-US" dirty="0" smtClean="0"/>
-              <a:t>Use of data tables:</a:t>
-            </a:r>
-          </a:p>
-          <a:p>
-            <a:pPr lvl="1"/>
-            <a:r>
-              <a:rPr lang="en-US" dirty="0" smtClean="0"/>
-              <a:t>Clients, Account, Loans, Demographic </a:t>
-            </a:r>
-          </a:p>
-        </p:txBody>
-      </p:sp>
-    </p:spTree>
-    <p:extLst>
-      <p:ext uri="{BB962C8B-B14F-4D97-AF65-F5344CB8AC3E}">
-        <p14:creationId xmlns:p14="http://schemas.microsoft.com/office/powerpoint/2010/main" val="3744309312"/>
-      </p:ext>
-    </p:extLst>
-  </p:cSld>
-  <p:clrMapOvr>
-    <a:masterClrMapping/>
-  </p:clrMapOvr>
-</p:sld>
-</file>
-
 <file path=ppt/slides/slide19.xml><?xml version="1.0" encoding="utf-8"?>
 <p:sld xmlns:a="http://schemas.openxmlformats.org/drawingml/2006/main" xmlns:r="http://schemas.openxmlformats.org/officeDocument/2006/relationships" xmlns:p="http://schemas.openxmlformats.org/presentationml/2006/main">
   <p:cSld>
@@ -4639,7 +4585,7 @@
       </p:grpSpPr>
       <p:sp>
         <p:nvSpPr>
-          <p:cNvPr id="13" name="Title 12"/>
+          <p:cNvPr id="5" name="Title 4"/>
           <p:cNvSpPr>
             <a:spLocks noGrp="1"/>
           </p:cNvSpPr>
@@ -4647,153 +4593,106 @@
             <p:ph type="title"/>
           </p:nvPr>
         </p:nvSpPr>
-        <p:spPr>
-          <a:xfrm>
-            <a:off x="256032" y="917419"/>
-            <a:ext cx="2834640" cy="1960252"/>
-          </a:xfrm>
-        </p:spPr>
-        <p:txBody>
-          <a:bodyPr>
-            <a:normAutofit fontScale="90000"/>
-          </a:bodyPr>
+        <p:spPr/>
+        <p:txBody>
+          <a:bodyPr/>
           <a:lstStyle/>
           <a:p>
             <a:r>
               <a:rPr lang="en-US" dirty="0" smtClean="0"/>
-              <a:t>Decision tree for predicting successful  loans  </a:t>
-            </a:r>
+              <a:t>How we reach this solution?</a:t>
+            </a:r>
+            <a:endParaRPr lang="pt-PT" dirty="0"/>
+          </a:p>
+        </p:txBody>
+      </p:sp>
+      <p:sp>
+        <p:nvSpPr>
+          <p:cNvPr id="6" name="Content Placeholder 5"/>
+          <p:cNvSpPr>
+            <a:spLocks noGrp="1"/>
+          </p:cNvSpPr>
+          <p:nvPr>
+            <p:ph idx="1"/>
+          </p:nvPr>
+        </p:nvSpPr>
+        <p:spPr/>
+        <p:txBody>
+          <a:bodyPr/>
+          <a:lstStyle/>
+          <a:p>
+            <a:r>
+              <a:rPr lang="en-US" dirty="0" err="1" smtClean="0"/>
+              <a:t>Rapidminer</a:t>
+            </a:r>
+            <a:endParaRPr lang="en-US" dirty="0" smtClean="0"/>
+          </a:p>
+          <a:p>
             <a:r>
               <a:rPr lang="en-US" dirty="0" smtClean="0"/>
-              <a:t/>
-            </a:r>
-            <a:br>
+              <a:t>Using split validation operation:</a:t>
+            </a:r>
+          </a:p>
+          <a:p>
+            <a:pPr lvl="1"/>
+            <a:r>
               <a:rPr lang="en-US" dirty="0" smtClean="0"/>
-            </a:br>
+              <a:t>70% as training data and 30% as testing.</a:t>
+            </a:r>
+          </a:p>
+          <a:p>
             <a:r>
               <a:rPr lang="en-US" dirty="0" smtClean="0"/>
-              <a:t>(based on all loans data)</a:t>
-            </a:r>
-            <a:endParaRPr lang="pt-PT" dirty="0"/>
-          </a:p>
-        </p:txBody>
-      </p:sp>
-      <p:sp>
-        <p:nvSpPr>
-          <p:cNvPr id="15" name="Text Placeholder 14"/>
-          <p:cNvSpPr>
-            <a:spLocks noGrp="1"/>
-          </p:cNvSpPr>
-          <p:nvPr>
-            <p:ph type="body" sz="half" idx="2"/>
-          </p:nvPr>
-        </p:nvSpPr>
-        <p:spPr>
-          <a:xfrm>
-            <a:off x="256032" y="2877671"/>
-            <a:ext cx="2834640" cy="3098187"/>
-          </a:xfrm>
-        </p:spPr>
-        <p:txBody>
-          <a:bodyPr>
-            <a:normAutofit fontScale="92500" lnSpcReduction="20000"/>
-          </a:bodyPr>
-          <a:lstStyle/>
-          <a:p>
-            <a:r>
-              <a:rPr lang="en-US" sz="1800" dirty="0" smtClean="0"/>
-              <a:t>We come to the conclusion that the most influencing attributes for loans success or failure are “</a:t>
-            </a:r>
-            <a:r>
-              <a:rPr lang="en-US" sz="1800" dirty="0" smtClean="0"/>
-              <a:t>average salary” and “number of municipalities </a:t>
-            </a:r>
-            <a:r>
-              <a:rPr lang="en-US" sz="1800" dirty="0" smtClean="0"/>
-              <a:t>with inhabitants above 10000</a:t>
-            </a:r>
-            <a:r>
-              <a:rPr lang="en-US" sz="1800" dirty="0" smtClean="0"/>
-              <a:t>” </a:t>
-            </a:r>
-            <a:r>
-              <a:rPr lang="en-US" sz="1800" dirty="0" smtClean="0"/>
-              <a:t>of clients demographic data, </a:t>
-            </a:r>
-            <a:r>
-              <a:rPr lang="en-US" sz="1800" dirty="0" smtClean="0"/>
-              <a:t>“payments” </a:t>
-            </a:r>
-            <a:r>
-              <a:rPr lang="en-US" sz="1800" dirty="0" smtClean="0"/>
-              <a:t>and “amount” of the loans</a:t>
-            </a:r>
-            <a:r>
-              <a:rPr lang="en-US" sz="1800" dirty="0" smtClean="0"/>
-              <a:t>.</a:t>
-            </a:r>
-          </a:p>
-          <a:p>
-            <a:r>
-              <a:rPr lang="en-US" sz="1800" dirty="0" smtClean="0"/>
-              <a:t>Loans with status A and C are considered good and B and D considered bad.</a:t>
-            </a:r>
-            <a:endParaRPr lang="en-US" sz="1800" dirty="0"/>
-          </a:p>
-        </p:txBody>
-      </p:sp>
-      <p:pic>
-        <p:nvPicPr>
-          <p:cNvPr id="2" name="Picture 1"/>
-          <p:cNvPicPr>
-            <a:picLocks noChangeAspect="1"/>
-          </p:cNvPicPr>
-          <p:nvPr/>
-        </p:nvPicPr>
-        <p:blipFill>
-          <a:blip r:embed="rId2"/>
-          <a:stretch>
-            <a:fillRect/>
-          </a:stretch>
-        </p:blipFill>
-        <p:spPr>
-          <a:xfrm>
-            <a:off x="4715995" y="588309"/>
-            <a:ext cx="5947522" cy="4168349"/>
-          </a:xfrm>
-          <a:prstGeom prst="rect">
-            <a:avLst/>
-          </a:prstGeom>
-        </p:spPr>
-      </p:pic>
-      <p:pic>
-        <p:nvPicPr>
-          <p:cNvPr id="3" name="Picture 2"/>
-          <p:cNvPicPr>
-            <a:picLocks noChangeAspect="1"/>
-          </p:cNvPicPr>
-          <p:nvPr/>
-        </p:nvPicPr>
-        <p:blipFill>
-          <a:blip r:embed="rId3"/>
-          <a:stretch>
-            <a:fillRect/>
-          </a:stretch>
-        </p:blipFill>
-        <p:spPr>
-          <a:xfrm>
-            <a:off x="4155981" y="4756658"/>
-            <a:ext cx="7067550" cy="1219200"/>
-          </a:xfrm>
-          <a:prstGeom prst="rect">
-            <a:avLst/>
-          </a:prstGeom>
-        </p:spPr>
-      </p:pic>
+              <a:t>Using Decision tree operator:</a:t>
+            </a:r>
+          </a:p>
+          <a:p>
+            <a:pPr lvl="1"/>
+            <a:r>
+              <a:rPr lang="en-US" dirty="0" smtClean="0"/>
+              <a:t>Using pruning:</a:t>
+            </a:r>
+          </a:p>
+          <a:p>
+            <a:pPr lvl="2"/>
+            <a:r>
+              <a:rPr lang="en-US" dirty="0" smtClean="0"/>
+              <a:t>Confidence 25%</a:t>
+            </a:r>
+          </a:p>
+          <a:p>
+            <a:pPr lvl="1"/>
+            <a:r>
+              <a:rPr lang="en-US" dirty="0" smtClean="0"/>
+              <a:t>Using pre-pruning:</a:t>
+            </a:r>
+          </a:p>
+          <a:p>
+            <a:pPr lvl="2"/>
+            <a:r>
+              <a:rPr lang="en-US" dirty="0" smtClean="0"/>
+              <a:t>Minimal gain of 5%</a:t>
+            </a:r>
+          </a:p>
+          <a:p>
+            <a:r>
+              <a:rPr lang="en-US" dirty="0" smtClean="0"/>
+              <a:t>Use of data tables:</a:t>
+            </a:r>
+          </a:p>
+          <a:p>
+            <a:pPr lvl="1"/>
+            <a:r>
+              <a:rPr lang="en-US" dirty="0" smtClean="0"/>
+              <a:t>Clients, Account, Loans, Demographic </a:t>
+            </a:r>
+          </a:p>
+        </p:txBody>
+      </p:sp>
     </p:spTree>
     <p:extLst>
       <p:ext uri="{BB962C8B-B14F-4D97-AF65-F5344CB8AC3E}">
-        <p14:creationId xmlns:p14="http://schemas.microsoft.com/office/powerpoint/2010/main" val="1042578715"/>
+        <p14:creationId xmlns:p14="http://schemas.microsoft.com/office/powerpoint/2010/main" val="3744309312"/>
       </p:ext>
     </p:extLst>
   </p:cSld>
@@ -4913,7 +4812,7 @@
           <a:p>
             <a:r>
               <a:rPr lang="en-US" dirty="0" smtClean="0"/>
-              <a:t>How we reach this solution?</a:t>
+              <a:t>Evaluation</a:t>
             </a:r>
             <a:endParaRPr lang="pt-PT" dirty="0"/>
           </a:p>
@@ -4921,126 +4820,27 @@
       </p:sp>
       <p:sp>
         <p:nvSpPr>
-          <p:cNvPr id="6" name="Content Placeholder 5"/>
-          <p:cNvSpPr>
-            <a:spLocks noGrp="1"/>
-          </p:cNvSpPr>
-          <p:nvPr>
-            <p:ph idx="1"/>
-          </p:nvPr>
-        </p:nvSpPr>
-        <p:spPr/>
-        <p:txBody>
-          <a:bodyPr/>
-          <a:lstStyle/>
-          <a:p>
-            <a:r>
-              <a:rPr lang="en-US" dirty="0" err="1" smtClean="0"/>
-              <a:t>Rapidminer</a:t>
-            </a:r>
-            <a:endParaRPr lang="en-US" dirty="0" smtClean="0"/>
-          </a:p>
-          <a:p>
-            <a:r>
-              <a:rPr lang="en-US" dirty="0" smtClean="0"/>
-              <a:t>Using </a:t>
-            </a:r>
-            <a:r>
-              <a:rPr lang="en-US" dirty="0" smtClean="0"/>
-              <a:t>x</a:t>
-            </a:r>
-            <a:r>
-              <a:rPr lang="en-US" dirty="0"/>
-              <a:t>-</a:t>
-            </a:r>
-            <a:r>
-              <a:rPr lang="en-US" dirty="0" smtClean="0"/>
-              <a:t>validation </a:t>
-            </a:r>
-            <a:r>
-              <a:rPr lang="en-US" dirty="0" smtClean="0"/>
-              <a:t>operation</a:t>
-            </a:r>
-            <a:r>
-              <a:rPr lang="en-US" dirty="0" smtClean="0"/>
-              <a:t>:</a:t>
-            </a:r>
-          </a:p>
-          <a:p>
-            <a:pPr lvl="1"/>
-            <a:r>
-              <a:rPr lang="en-US" dirty="0" smtClean="0"/>
-              <a:t>Number of validations: 10 </a:t>
-            </a:r>
-            <a:endParaRPr lang="en-US" dirty="0" smtClean="0"/>
-          </a:p>
-          <a:p>
-            <a:r>
-              <a:rPr lang="en-US" dirty="0" smtClean="0"/>
-              <a:t>Using </a:t>
-            </a:r>
-            <a:r>
-              <a:rPr lang="en-US" dirty="0" smtClean="0"/>
-              <a:t>Decision tree operator:</a:t>
-            </a:r>
-          </a:p>
-          <a:p>
-            <a:pPr lvl="1"/>
-            <a:r>
-              <a:rPr lang="en-US" dirty="0" smtClean="0"/>
-              <a:t>Using pruning:</a:t>
-            </a:r>
-          </a:p>
-          <a:p>
-            <a:pPr lvl="2"/>
-            <a:r>
-              <a:rPr lang="en-US" dirty="0" smtClean="0"/>
-              <a:t>Confidence 25%</a:t>
-            </a:r>
-          </a:p>
-          <a:p>
-            <a:pPr lvl="1"/>
-            <a:r>
-              <a:rPr lang="en-US" dirty="0" smtClean="0"/>
-              <a:t>Using pre-pruning:</a:t>
-            </a:r>
-          </a:p>
-          <a:p>
-            <a:pPr lvl="2"/>
-            <a:r>
-              <a:rPr lang="en-US" dirty="0" smtClean="0"/>
-              <a:t>Minimal gain of </a:t>
-            </a:r>
-            <a:r>
-              <a:rPr lang="en-US" dirty="0" smtClean="0"/>
-              <a:t>4%</a:t>
-            </a:r>
-            <a:endParaRPr lang="en-US" dirty="0" smtClean="0"/>
-          </a:p>
-          <a:p>
-            <a:r>
-              <a:rPr lang="en-US" dirty="0" smtClean="0"/>
-              <a:t>Use of data tables:</a:t>
-            </a:r>
-          </a:p>
-          <a:p>
-            <a:pPr lvl="1"/>
-            <a:r>
-              <a:rPr lang="en-US" dirty="0" smtClean="0"/>
-              <a:t>Clients, Account, Loans, </a:t>
-            </a:r>
-            <a:r>
-              <a:rPr lang="en-US" dirty="0" smtClean="0"/>
-              <a:t>Demographic</a:t>
-            </a:r>
-            <a:endParaRPr lang="en-US" dirty="0" smtClean="0"/>
+          <p:cNvPr id="6" name="Text Placeholder 5"/>
+          <p:cNvSpPr>
+            <a:spLocks noGrp="1"/>
+          </p:cNvSpPr>
+          <p:nvPr>
+            <p:ph type="body" idx="1"/>
+          </p:nvPr>
+        </p:nvSpPr>
+        <p:spPr/>
+        <p:txBody>
+          <a:bodyPr/>
+          <a:lstStyle/>
+          <a:p>
+            <a:endParaRPr lang="pt-PT"/>
           </a:p>
         </p:txBody>
       </p:sp>
     </p:spTree>
     <p:extLst>
       <p:ext uri="{BB962C8B-B14F-4D97-AF65-F5344CB8AC3E}">
-        <p14:creationId xmlns:p14="http://schemas.microsoft.com/office/powerpoint/2010/main" val="1344232720"/>
+        <p14:creationId xmlns:p14="http://schemas.microsoft.com/office/powerpoint/2010/main" val="29656270"/>
       </p:ext>
     </p:extLst>
   </p:cSld>
@@ -5069,12 +4869,12 @@
       </p:grpSpPr>
       <p:sp>
         <p:nvSpPr>
-          <p:cNvPr id="2" name="Title 1"/>
-          <p:cNvSpPr>
-            <a:spLocks noGrp="1"/>
-          </p:cNvSpPr>
-          <p:nvPr>
-            <p:ph type="ctrTitle"/>
+          <p:cNvPr id="4" name="Title 3"/>
+          <p:cNvSpPr>
+            <a:spLocks noGrp="1"/>
+          </p:cNvSpPr>
+          <p:nvPr>
+            <p:ph type="title"/>
           </p:nvPr>
         </p:nvSpPr>
         <p:spPr/>
@@ -5084,18 +4884,30 @@
           <a:p>
             <a:r>
               <a:rPr lang="en-US" dirty="0" smtClean="0"/>
-              <a:t>Q &amp; A</a:t>
-            </a:r>
-            <a:br>
+              <a:t>Evaluation of the model using current loans (types C and D)</a:t>
+            </a:r>
+            <a:endParaRPr lang="pt-PT" dirty="0"/>
+          </a:p>
+        </p:txBody>
+      </p:sp>
+      <p:sp>
+        <p:nvSpPr>
+          <p:cNvPr id="5" name="Content Placeholder 4"/>
+          <p:cNvSpPr>
+            <a:spLocks noGrp="1"/>
+          </p:cNvSpPr>
+          <p:nvPr>
+            <p:ph idx="1"/>
+          </p:nvPr>
+        </p:nvSpPr>
+        <p:spPr/>
+        <p:txBody>
+          <a:bodyPr/>
+          <a:lstStyle/>
+          <a:p>
+            <a:r>
               <a:rPr lang="en-US" dirty="0" smtClean="0"/>
-            </a:br>
-            <a:r>
-              <a:rPr lang="en-US" sz="2400" dirty="0" smtClean="0"/>
-              <a:t>“If your model is perfect, throw it away” – Carlos </a:t>
-            </a:r>
-            <a:r>
-              <a:rPr lang="en-US" sz="2400" dirty="0" err="1" smtClean="0"/>
-              <a:t>Soares</a:t>
+              <a:t>v</a:t>
             </a:r>
             <a:endParaRPr lang="pt-PT" dirty="0"/>
           </a:p>
@@ -5103,31 +4915,134 @@
       </p:sp>
       <p:sp>
         <p:nvSpPr>
-          <p:cNvPr id="3" name="Subtitle 2"/>
-          <p:cNvSpPr>
-            <a:spLocks noGrp="1"/>
-          </p:cNvSpPr>
-          <p:nvPr>
-            <p:ph type="subTitle" idx="1"/>
-          </p:nvPr>
-        </p:nvSpPr>
-        <p:spPr/>
-        <p:txBody>
-          <a:bodyPr/>
-          <a:lstStyle/>
-          <a:p>
-            <a:r>
-              <a:rPr lang="en-US" dirty="0" smtClean="0"/>
-              <a:t>Thank you!</a:t>
-            </a:r>
-            <a:endParaRPr lang="pt-PT" dirty="0"/>
+          <p:cNvPr id="6" name="Text Placeholder 5"/>
+          <p:cNvSpPr>
+            <a:spLocks noGrp="1"/>
+          </p:cNvSpPr>
+          <p:nvPr>
+            <p:ph type="body" sz="half" idx="2"/>
+          </p:nvPr>
+        </p:nvSpPr>
+        <p:spPr/>
+        <p:txBody>
+          <a:bodyPr>
+            <a:noAutofit/>
+          </a:bodyPr>
+          <a:lstStyle/>
+          <a:p>
+            <a:r>
+              <a:rPr lang="en-US" sz="1800" dirty="0" smtClean="0"/>
+              <a:t>We try to, using the data given on active loans (status C and D), find a correlation to the future of those loans. </a:t>
+            </a:r>
+          </a:p>
+          <a:p>
+            <a:r>
+              <a:rPr lang="en-US" sz="1800" dirty="0" smtClean="0"/>
+              <a:t>We see that in general current loans in a good shape (status C) tend to </a:t>
+            </a:r>
+            <a:r>
+              <a:rPr lang="en-US" sz="1800" dirty="0"/>
+              <a:t>mostly </a:t>
+            </a:r>
+            <a:r>
+              <a:rPr lang="en-US" sz="1800" dirty="0" smtClean="0"/>
+              <a:t>succeed (type A).</a:t>
+            </a:r>
+            <a:endParaRPr lang="pt-PT" sz="1800" dirty="0"/>
+          </a:p>
+        </p:txBody>
+      </p:sp>
+      <p:pic>
+        <p:nvPicPr>
+          <p:cNvPr id="8" name="Picture 7"/>
+          <p:cNvPicPr>
+            <a:picLocks noChangeAspect="1"/>
+          </p:cNvPicPr>
+          <p:nvPr/>
+        </p:nvPicPr>
+        <p:blipFill rotWithShape="1">
+          <a:blip r:embed="rId2"/>
+          <a:srcRect r="2483"/>
+          <a:stretch/>
+        </p:blipFill>
+        <p:spPr>
+          <a:xfrm>
+            <a:off x="3983691" y="785812"/>
+            <a:ext cx="2860862" cy="5286375"/>
+          </a:xfrm>
+          <a:prstGeom prst="rect">
+            <a:avLst/>
+          </a:prstGeom>
+        </p:spPr>
+      </p:pic>
+      <p:pic>
+        <p:nvPicPr>
+          <p:cNvPr id="9" name="Picture 8"/>
+          <p:cNvPicPr>
+            <a:picLocks noChangeAspect="1"/>
+          </p:cNvPicPr>
+          <p:nvPr/>
+        </p:nvPicPr>
+        <p:blipFill>
+          <a:blip r:embed="rId3"/>
+          <a:stretch>
+            <a:fillRect/>
+          </a:stretch>
+        </p:blipFill>
+        <p:spPr>
+          <a:xfrm>
+            <a:off x="8268462" y="790574"/>
+            <a:ext cx="2914650" cy="5276850"/>
+          </a:xfrm>
+          <a:prstGeom prst="rect">
+            <a:avLst/>
+          </a:prstGeom>
+        </p:spPr>
+      </p:pic>
+      <p:sp>
+        <p:nvSpPr>
+          <p:cNvPr id="10" name="Right Arrow 9"/>
+          <p:cNvSpPr/>
+          <p:nvPr/>
+        </p:nvSpPr>
+        <p:spPr>
+          <a:xfrm>
+            <a:off x="7140388" y="2944906"/>
+            <a:ext cx="1128074" cy="672353"/>
+          </a:xfrm>
+          <a:prstGeom prst="rightArrow">
+            <a:avLst/>
+          </a:prstGeom>
+        </p:spPr>
+        <p:style>
+          <a:lnRef idx="2">
+            <a:schemeClr val="accent1">
+              <a:shade val="50000"/>
+            </a:schemeClr>
+          </a:lnRef>
+          <a:fillRef idx="1">
+            <a:schemeClr val="accent1"/>
+          </a:fillRef>
+          <a:effectRef idx="0">
+            <a:schemeClr val="accent1"/>
+          </a:effectRef>
+          <a:fontRef idx="minor">
+            <a:schemeClr val="lt1"/>
+          </a:fontRef>
+        </p:style>
+        <p:txBody>
+          <a:bodyPr rtlCol="0" anchor="ctr"/>
+          <a:lstStyle/>
+          <a:p>
+            <a:pPr algn="ctr"/>
+            <a:endParaRPr lang="pt-PT"/>
           </a:p>
         </p:txBody>
       </p:sp>
     </p:spTree>
     <p:extLst>
       <p:ext uri="{BB962C8B-B14F-4D97-AF65-F5344CB8AC3E}">
-        <p14:creationId xmlns:p14="http://schemas.microsoft.com/office/powerpoint/2010/main" val="1867880588"/>
+        <p14:creationId xmlns:p14="http://schemas.microsoft.com/office/powerpoint/2010/main" val="2932298730"/>
       </p:ext>
     </p:extLst>
   </p:cSld>

</xml_diff>

<commit_message>
added slides and new preditive model
</commit_message>
<xml_diff>
--- a/Banking Data Mining.pptx
+++ b/Banking Data Mining.pptx
@@ -22,14 +22,12 @@
     <p:sldId id="276" r:id="rId16"/>
     <p:sldId id="260" r:id="rId17"/>
     <p:sldId id="271" r:id="rId18"/>
-    <p:sldId id="269" r:id="rId19"/>
-    <p:sldId id="270" r:id="rId20"/>
-    <p:sldId id="277" r:id="rId21"/>
-    <p:sldId id="278" r:id="rId22"/>
-    <p:sldId id="279" r:id="rId23"/>
-    <p:sldId id="280" r:id="rId24"/>
-    <p:sldId id="281" r:id="rId25"/>
-    <p:sldId id="282" r:id="rId26"/>
+    <p:sldId id="277" r:id="rId19"/>
+    <p:sldId id="278" r:id="rId20"/>
+    <p:sldId id="279" r:id="rId21"/>
+    <p:sldId id="280" r:id="rId22"/>
+    <p:sldId id="281" r:id="rId23"/>
+    <p:sldId id="282" r:id="rId24"/>
   </p:sldIdLst>
   <p:sldSz cx="12192000" cy="6858000"/>
   <p:notesSz cx="6858000" cy="9144000"/>
@@ -4327,15 +4325,61 @@
           <a:p>
             <a:r>
               <a:rPr lang="en-US" dirty="0" smtClean="0"/>
-              <a:t>We had a small dataset of finished loans (loans with status A or B)</a:t>
-            </a:r>
+              <a:t>We had a small dataset of finished loans </a:t>
+            </a:r>
+            <a:endParaRPr lang="en-US" dirty="0" smtClean="0"/>
           </a:p>
           <a:p>
             <a:pPr lvl="1"/>
             <a:r>
               <a:rPr lang="en-US" dirty="0" smtClean="0"/>
-              <a:t>Around 234 loans.</a:t>
-            </a:r>
+              <a:t>Around </a:t>
+            </a:r>
+            <a:r>
+              <a:rPr lang="en-US" dirty="0" smtClean="0"/>
+              <a:t>234 </a:t>
+            </a:r>
+            <a:r>
+              <a:rPr lang="en-US" dirty="0" smtClean="0"/>
+              <a:t>finished loans</a:t>
+            </a:r>
+            <a:r>
+              <a:rPr lang="en-US" dirty="0" smtClean="0"/>
+              <a:t> </a:t>
+            </a:r>
+            <a:r>
+              <a:rPr lang="en-US" dirty="0"/>
+              <a:t>(loans with status A or B</a:t>
+            </a:r>
+            <a:r>
+              <a:rPr lang="en-US" dirty="0" smtClean="0"/>
+              <a:t>)</a:t>
+            </a:r>
+            <a:endParaRPr lang="en-US" dirty="0" smtClean="0"/>
+          </a:p>
+          <a:p>
+            <a:pPr lvl="1"/>
+            <a:r>
+              <a:rPr lang="en-US" dirty="0" smtClean="0"/>
+              <a:t>Around 448 active loans (</a:t>
+            </a:r>
+            <a:r>
+              <a:rPr lang="en-US" dirty="0"/>
+              <a:t>loans with status </a:t>
+            </a:r>
+            <a:r>
+              <a:rPr lang="en-US" dirty="0" smtClean="0"/>
+              <a:t>C </a:t>
+            </a:r>
+            <a:r>
+              <a:rPr lang="en-US" dirty="0"/>
+              <a:t>or </a:t>
+            </a:r>
+            <a:r>
+              <a:rPr lang="en-US" dirty="0" smtClean="0"/>
+              <a:t>D)</a:t>
+            </a:r>
+            <a:endParaRPr lang="en-US" dirty="0" smtClean="0"/>
           </a:p>
           <a:p>
             <a:r>
@@ -4436,368 +4480,6 @@
         </p:nvSpPr>
         <p:spPr>
           <a:xfrm>
-            <a:off x="256032" y="917419"/>
-            <a:ext cx="2834640" cy="1341688"/>
-          </a:xfrm>
-        </p:spPr>
-        <p:txBody>
-          <a:bodyPr>
-            <a:normAutofit fontScale="90000"/>
-          </a:bodyPr>
-          <a:lstStyle/>
-          <a:p>
-            <a:r>
-              <a:rPr lang="en-US" dirty="0" smtClean="0"/>
-              <a:t>Decision tree for predicting successful  loans  </a:t>
-            </a:r>
-            <a:endParaRPr lang="pt-PT" dirty="0"/>
-          </a:p>
-        </p:txBody>
-      </p:sp>
-      <p:sp>
-        <p:nvSpPr>
-          <p:cNvPr id="15" name="Text Placeholder 14"/>
-          <p:cNvSpPr>
-            <a:spLocks noGrp="1"/>
-          </p:cNvSpPr>
-          <p:nvPr>
-            <p:ph type="body" sz="half" idx="2"/>
-          </p:nvPr>
-        </p:nvSpPr>
-        <p:spPr>
-          <a:xfrm>
-            <a:off x="256032" y="2447365"/>
-            <a:ext cx="2834640" cy="3368219"/>
-          </a:xfrm>
-        </p:spPr>
-        <p:txBody>
-          <a:bodyPr>
-            <a:normAutofit/>
-          </a:bodyPr>
-          <a:lstStyle/>
-          <a:p>
-            <a:r>
-              <a:rPr lang="en-US" sz="1800" dirty="0" smtClean="0"/>
-              <a:t>We come to the conclusion that the most influencing attributes for loans success or failure are “</a:t>
-            </a:r>
-            <a:r>
-              <a:rPr lang="en-US" sz="1800" dirty="0" err="1" smtClean="0"/>
-              <a:t>average_salary</a:t>
-            </a:r>
-            <a:r>
-              <a:rPr lang="en-US" sz="1800" dirty="0" smtClean="0"/>
-              <a:t>” of clients demographic data, “duration” and “amount” of the loans.</a:t>
-            </a:r>
-            <a:endParaRPr lang="pt-PT" sz="1800" dirty="0"/>
-          </a:p>
-        </p:txBody>
-      </p:sp>
-      <p:pic>
-        <p:nvPicPr>
-          <p:cNvPr id="16" name="Content Placeholder 5"/>
-          <p:cNvPicPr>
-            <a:picLocks noChangeAspect="1"/>
-          </p:cNvPicPr>
-          <p:nvPr/>
-        </p:nvPicPr>
-        <p:blipFill>
-          <a:blip r:embed="rId2"/>
-          <a:stretch>
-            <a:fillRect/>
-          </a:stretch>
-        </p:blipFill>
-        <p:spPr>
-          <a:xfrm>
-            <a:off x="4917609" y="787528"/>
-            <a:ext cx="4576016" cy="4368016"/>
-          </a:xfrm>
-          <a:prstGeom prst="rect">
-            <a:avLst/>
-          </a:prstGeom>
-          <a:solidFill>
-            <a:schemeClr val="bg1">
-              <a:lumMod val="75000"/>
-            </a:schemeClr>
-          </a:solidFill>
-        </p:spPr>
-      </p:pic>
-      <p:pic>
-        <p:nvPicPr>
-          <p:cNvPr id="17" name="Picture 16"/>
-          <p:cNvPicPr>
-            <a:picLocks noChangeAspect="1"/>
-          </p:cNvPicPr>
-          <p:nvPr/>
-        </p:nvPicPr>
-        <p:blipFill rotWithShape="1">
-          <a:blip r:embed="rId3"/>
-          <a:srcRect t="7857" b="6394"/>
-          <a:stretch/>
-        </p:blipFill>
-        <p:spPr>
-          <a:xfrm>
-            <a:off x="4341391" y="4948518"/>
-            <a:ext cx="6169679" cy="1116106"/>
-          </a:xfrm>
-          <a:prstGeom prst="rect">
-            <a:avLst/>
-          </a:prstGeom>
-        </p:spPr>
-      </p:pic>
-    </p:spTree>
-    <p:extLst>
-      <p:ext uri="{BB962C8B-B14F-4D97-AF65-F5344CB8AC3E}">
-        <p14:creationId xmlns:p14="http://schemas.microsoft.com/office/powerpoint/2010/main" val="1065855552"/>
-      </p:ext>
-    </p:extLst>
-  </p:cSld>
-  <p:clrMapOvr>
-    <a:masterClrMapping/>
-  </p:clrMapOvr>
-</p:sld>
-</file>
-
-<file path=ppt/slides/slide19.xml><?xml version="1.0" encoding="utf-8"?>
-<p:sld xmlns:a="http://schemas.openxmlformats.org/drawingml/2006/main" xmlns:r="http://schemas.openxmlformats.org/officeDocument/2006/relationships" xmlns:p="http://schemas.openxmlformats.org/presentationml/2006/main">
-  <p:cSld>
-    <p:spTree>
-      <p:nvGrpSpPr>
-        <p:cNvPr id="1" name=""/>
-        <p:cNvGrpSpPr/>
-        <p:nvPr/>
-      </p:nvGrpSpPr>
-      <p:grpSpPr>
-        <a:xfrm>
-          <a:off x="0" y="0"/>
-          <a:ext cx="0" cy="0"/>
-          <a:chOff x="0" y="0"/>
-          <a:chExt cx="0" cy="0"/>
-        </a:xfrm>
-      </p:grpSpPr>
-      <p:sp>
-        <p:nvSpPr>
-          <p:cNvPr id="5" name="Title 4"/>
-          <p:cNvSpPr>
-            <a:spLocks noGrp="1"/>
-          </p:cNvSpPr>
-          <p:nvPr>
-            <p:ph type="title"/>
-          </p:nvPr>
-        </p:nvSpPr>
-        <p:spPr/>
-        <p:txBody>
-          <a:bodyPr/>
-          <a:lstStyle/>
-          <a:p>
-            <a:r>
-              <a:rPr lang="en-US" dirty="0" smtClean="0"/>
-              <a:t>How we reach this solution?</a:t>
-            </a:r>
-            <a:endParaRPr lang="pt-PT" dirty="0"/>
-          </a:p>
-        </p:txBody>
-      </p:sp>
-      <p:sp>
-        <p:nvSpPr>
-          <p:cNvPr id="6" name="Content Placeholder 5"/>
-          <p:cNvSpPr>
-            <a:spLocks noGrp="1"/>
-          </p:cNvSpPr>
-          <p:nvPr>
-            <p:ph idx="1"/>
-          </p:nvPr>
-        </p:nvSpPr>
-        <p:spPr/>
-        <p:txBody>
-          <a:bodyPr/>
-          <a:lstStyle/>
-          <a:p>
-            <a:r>
-              <a:rPr lang="en-US" dirty="0" err="1" smtClean="0"/>
-              <a:t>Rapidminer</a:t>
-            </a:r>
-            <a:endParaRPr lang="en-US" dirty="0" smtClean="0"/>
-          </a:p>
-          <a:p>
-            <a:r>
-              <a:rPr lang="en-US" dirty="0" smtClean="0"/>
-              <a:t>Using split validation operation:</a:t>
-            </a:r>
-          </a:p>
-          <a:p>
-            <a:pPr lvl="1"/>
-            <a:r>
-              <a:rPr lang="en-US" dirty="0" smtClean="0"/>
-              <a:t>70% as training data and 30% as testing.</a:t>
-            </a:r>
-          </a:p>
-          <a:p>
-            <a:r>
-              <a:rPr lang="en-US" dirty="0" smtClean="0"/>
-              <a:t>Using Decision tree operator:</a:t>
-            </a:r>
-          </a:p>
-          <a:p>
-            <a:pPr lvl="1"/>
-            <a:r>
-              <a:rPr lang="en-US" dirty="0" smtClean="0"/>
-              <a:t>Using pruning:</a:t>
-            </a:r>
-          </a:p>
-          <a:p>
-            <a:pPr lvl="2"/>
-            <a:r>
-              <a:rPr lang="en-US" dirty="0" smtClean="0"/>
-              <a:t>Confidence 25%</a:t>
-            </a:r>
-          </a:p>
-          <a:p>
-            <a:pPr lvl="1"/>
-            <a:r>
-              <a:rPr lang="en-US" dirty="0" smtClean="0"/>
-              <a:t>Using pre-pruning:</a:t>
-            </a:r>
-          </a:p>
-          <a:p>
-            <a:pPr lvl="2"/>
-            <a:r>
-              <a:rPr lang="en-US" dirty="0" smtClean="0"/>
-              <a:t>Minimal gain of 5%</a:t>
-            </a:r>
-          </a:p>
-          <a:p>
-            <a:r>
-              <a:rPr lang="en-US" dirty="0" smtClean="0"/>
-              <a:t>Use of data tables:</a:t>
-            </a:r>
-          </a:p>
-          <a:p>
-            <a:pPr lvl="1"/>
-            <a:r>
-              <a:rPr lang="en-US" dirty="0" smtClean="0"/>
-              <a:t>Clients, Account, Loans, Demographic </a:t>
-            </a:r>
-          </a:p>
-        </p:txBody>
-      </p:sp>
-    </p:spTree>
-    <p:extLst>
-      <p:ext uri="{BB962C8B-B14F-4D97-AF65-F5344CB8AC3E}">
-        <p14:creationId xmlns:p14="http://schemas.microsoft.com/office/powerpoint/2010/main" val="3744309312"/>
-      </p:ext>
-    </p:extLst>
-  </p:cSld>
-  <p:clrMapOvr>
-    <a:masterClrMapping/>
-  </p:clrMapOvr>
-</p:sld>
-</file>
-
-<file path=ppt/slides/slide2.xml><?xml version="1.0" encoding="utf-8"?>
-<p:sld xmlns:a="http://schemas.openxmlformats.org/drawingml/2006/main" xmlns:r="http://schemas.openxmlformats.org/officeDocument/2006/relationships" xmlns:p="http://schemas.openxmlformats.org/presentationml/2006/main">
-  <p:cSld>
-    <p:spTree>
-      <p:nvGrpSpPr>
-        <p:cNvPr id="1" name=""/>
-        <p:cNvGrpSpPr/>
-        <p:nvPr/>
-      </p:nvGrpSpPr>
-      <p:grpSpPr>
-        <a:xfrm>
-          <a:off x="0" y="0"/>
-          <a:ext cx="0" cy="0"/>
-          <a:chOff x="0" y="0"/>
-          <a:chExt cx="0" cy="0"/>
-        </a:xfrm>
-      </p:grpSpPr>
-      <p:sp>
-        <p:nvSpPr>
-          <p:cNvPr id="2" name="Title 1"/>
-          <p:cNvSpPr>
-            <a:spLocks noGrp="1"/>
-          </p:cNvSpPr>
-          <p:nvPr>
-            <p:ph type="title"/>
-          </p:nvPr>
-        </p:nvSpPr>
-        <p:spPr/>
-        <p:txBody>
-          <a:bodyPr/>
-          <a:lstStyle/>
-          <a:p>
-            <a:r>
-              <a:rPr lang="en-US" dirty="0" smtClean="0"/>
-              <a:t>CRISP-DM</a:t>
-            </a:r>
-            <a:endParaRPr lang="pt-PT" dirty="0"/>
-          </a:p>
-        </p:txBody>
-      </p:sp>
-      <p:pic>
-        <p:nvPicPr>
-          <p:cNvPr id="4" name="Content Placeholder 3"/>
-          <p:cNvPicPr>
-            <a:picLocks noGrp="1" noChangeAspect="1"/>
-          </p:cNvPicPr>
-          <p:nvPr>
-            <p:ph idx="1"/>
-          </p:nvPr>
-        </p:nvPicPr>
-        <p:blipFill>
-          <a:blip r:embed="rId2"/>
-          <a:stretch>
-            <a:fillRect/>
-          </a:stretch>
-        </p:blipFill>
-        <p:spPr>
-          <a:xfrm>
-            <a:off x="4970527" y="863600"/>
-            <a:ext cx="5111622" cy="5121275"/>
-          </a:xfrm>
-        </p:spPr>
-      </p:pic>
-    </p:spTree>
-    <p:extLst>
-      <p:ext uri="{BB962C8B-B14F-4D97-AF65-F5344CB8AC3E}">
-        <p14:creationId xmlns:p14="http://schemas.microsoft.com/office/powerpoint/2010/main" val="3847756803"/>
-      </p:ext>
-    </p:extLst>
-  </p:cSld>
-  <p:clrMapOvr>
-    <a:masterClrMapping/>
-  </p:clrMapOvr>
-</p:sld>
-</file>
-
-<file path=ppt/slides/slide20.xml><?xml version="1.0" encoding="utf-8"?>
-<p:sld xmlns:a="http://schemas.openxmlformats.org/drawingml/2006/main" xmlns:r="http://schemas.openxmlformats.org/officeDocument/2006/relationships" xmlns:p="http://schemas.openxmlformats.org/presentationml/2006/main">
-  <p:cSld>
-    <p:spTree>
-      <p:nvGrpSpPr>
-        <p:cNvPr id="1" name=""/>
-        <p:cNvGrpSpPr/>
-        <p:nvPr/>
-      </p:nvGrpSpPr>
-      <p:grpSpPr>
-        <a:xfrm>
-          <a:off x="0" y="0"/>
-          <a:ext cx="0" cy="0"/>
-          <a:chOff x="0" y="0"/>
-          <a:chExt cx="0" cy="0"/>
-        </a:xfrm>
-      </p:grpSpPr>
-      <p:sp>
-        <p:nvSpPr>
-          <p:cNvPr id="13" name="Title 12"/>
-          <p:cNvSpPr>
-            <a:spLocks noGrp="1"/>
-          </p:cNvSpPr>
-          <p:nvPr>
-            <p:ph type="title"/>
-          </p:nvPr>
-        </p:nvSpPr>
-        <p:spPr>
-          <a:xfrm>
             <a:off x="256032" y="917418"/>
             <a:ext cx="2834640" cy="2135063"/>
           </a:xfrm>
@@ -4810,11 +4492,7 @@
           <a:p>
             <a:r>
               <a:rPr lang="en-US" dirty="0" smtClean="0"/>
-              <a:t>Decision tree for predicting successful  </a:t>
-            </a:r>
-            <a:r>
-              <a:rPr lang="en-US" dirty="0" smtClean="0"/>
-              <a:t>loans based on finished loans only  </a:t>
+              <a:t>Decision tree for predicting successful  loans based on finished loans only  </a:t>
             </a:r>
             <a:endParaRPr lang="pt-PT" dirty="0"/>
           </a:p>
@@ -4847,8 +4525,8 @@
               <a:t>We come to the conclusion that the most influencing attributes for loans success or failure are “</a:t>
             </a:r>
             <a:r>
-              <a:rPr lang="en-US" sz="1800" dirty="0" err="1" smtClean="0"/>
-              <a:t>average_salary</a:t>
+              <a:rPr lang="en-US" sz="1800" dirty="0" smtClean="0"/>
+              <a:t>average salary</a:t>
             </a:r>
             <a:r>
               <a:rPr lang="en-US" sz="1800" dirty="0" smtClean="0"/>
@@ -4923,7 +4601,7 @@
 </p:sld>
 </file>
 
-<file path=ppt/slides/slide21.xml><?xml version="1.0" encoding="utf-8"?>
+<file path=ppt/slides/slide19.xml><?xml version="1.0" encoding="utf-8"?>
 <p:sld xmlns:a="http://schemas.openxmlformats.org/drawingml/2006/main" xmlns:r="http://schemas.openxmlformats.org/officeDocument/2006/relationships" xmlns:p="http://schemas.openxmlformats.org/presentationml/2006/main">
   <p:cSld>
     <p:spTree>
@@ -5059,7 +4737,7 @@
 </p:sld>
 </file>
 
-<file path=ppt/slides/slide22.xml><?xml version="1.0" encoding="utf-8"?>
+<file path=ppt/slides/slide2.xml><?xml version="1.0" encoding="utf-8"?>
 <p:sld xmlns:a="http://schemas.openxmlformats.org/drawingml/2006/main" xmlns:r="http://schemas.openxmlformats.org/officeDocument/2006/relationships" xmlns:p="http://schemas.openxmlformats.org/presentationml/2006/main">
   <p:cSld>
     <p:spTree>
@@ -5078,6 +4756,82 @@
       </p:grpSpPr>
       <p:sp>
         <p:nvSpPr>
+          <p:cNvPr id="2" name="Title 1"/>
+          <p:cNvSpPr>
+            <a:spLocks noGrp="1"/>
+          </p:cNvSpPr>
+          <p:nvPr>
+            <p:ph type="title"/>
+          </p:nvPr>
+        </p:nvSpPr>
+        <p:spPr/>
+        <p:txBody>
+          <a:bodyPr/>
+          <a:lstStyle/>
+          <a:p>
+            <a:r>
+              <a:rPr lang="en-US" dirty="0" smtClean="0"/>
+              <a:t>CRISP-DM</a:t>
+            </a:r>
+            <a:endParaRPr lang="pt-PT" dirty="0"/>
+          </a:p>
+        </p:txBody>
+      </p:sp>
+      <p:pic>
+        <p:nvPicPr>
+          <p:cNvPr id="4" name="Content Placeholder 3"/>
+          <p:cNvPicPr>
+            <a:picLocks noGrp="1" noChangeAspect="1"/>
+          </p:cNvPicPr>
+          <p:nvPr>
+            <p:ph idx="1"/>
+          </p:nvPr>
+        </p:nvPicPr>
+        <p:blipFill>
+          <a:blip r:embed="rId2"/>
+          <a:stretch>
+            <a:fillRect/>
+          </a:stretch>
+        </p:blipFill>
+        <p:spPr>
+          <a:xfrm>
+            <a:off x="4970527" y="863600"/>
+            <a:ext cx="5111622" cy="5121275"/>
+          </a:xfrm>
+        </p:spPr>
+      </p:pic>
+    </p:spTree>
+    <p:extLst>
+      <p:ext uri="{BB962C8B-B14F-4D97-AF65-F5344CB8AC3E}">
+        <p14:creationId xmlns:p14="http://schemas.microsoft.com/office/powerpoint/2010/main" val="3847756803"/>
+      </p:ext>
+    </p:extLst>
+  </p:cSld>
+  <p:clrMapOvr>
+    <a:masterClrMapping/>
+  </p:clrMapOvr>
+</p:sld>
+</file>
+
+<file path=ppt/slides/slide20.xml><?xml version="1.0" encoding="utf-8"?>
+<p:sld xmlns:a="http://schemas.openxmlformats.org/drawingml/2006/main" xmlns:r="http://schemas.openxmlformats.org/officeDocument/2006/relationships" xmlns:p="http://schemas.openxmlformats.org/presentationml/2006/main">
+  <p:cSld>
+    <p:spTree>
+      <p:nvGrpSpPr>
+        <p:cNvPr id="1" name=""/>
+        <p:cNvGrpSpPr/>
+        <p:nvPr/>
+      </p:nvGrpSpPr>
+      <p:grpSpPr>
+        <a:xfrm>
+          <a:off x="0" y="0"/>
+          <a:ext cx="0" cy="0"/>
+          <a:chOff x="0" y="0"/>
+          <a:chExt cx="0" cy="0"/>
+        </a:xfrm>
+      </p:grpSpPr>
+      <p:sp>
+        <p:nvSpPr>
           <p:cNvPr id="13" name="Title 12"/>
           <p:cNvSpPr>
             <a:spLocks noGrp="1"/>
@@ -5100,15 +4854,7 @@
           <a:p>
             <a:r>
               <a:rPr lang="en-US" dirty="0" smtClean="0"/>
-              <a:t>Decision tree for predicting successful  loans </a:t>
-            </a:r>
-            <a:r>
-              <a:rPr lang="en-US" dirty="0" smtClean="0"/>
-              <a:t>based on finished and active loans</a:t>
-            </a:r>
-            <a:r>
-              <a:rPr lang="en-US" dirty="0" smtClean="0"/>
-              <a:t> </a:t>
+              <a:t>Decision tree for predicting successful  loans based on finished and active loans </a:t>
             </a:r>
             <a:endParaRPr lang="pt-PT" dirty="0"/>
           </a:p>
@@ -5138,27 +4884,7 @@
           <a:p>
             <a:r>
               <a:rPr lang="en-US" sz="1800" dirty="0" smtClean="0"/>
-              <a:t>We come to the conclusion that the most influencing attributes for loans success or failure are “</a:t>
-            </a:r>
-            <a:r>
-              <a:rPr lang="en-US" sz="1800" dirty="0" err="1" smtClean="0"/>
-              <a:t>average_salary</a:t>
-            </a:r>
-            <a:r>
-              <a:rPr lang="en-US" sz="1800" dirty="0" smtClean="0"/>
-              <a:t>”, “number of municipalities with inhabitants above 10000” </a:t>
-            </a:r>
-            <a:r>
-              <a:rPr lang="en-US" sz="1800" dirty="0" smtClean="0"/>
-              <a:t>of clients demographic data, </a:t>
-            </a:r>
-            <a:r>
-              <a:rPr lang="en-US" sz="1800" dirty="0" smtClean="0"/>
-              <a:t>“payments” </a:t>
-            </a:r>
-            <a:r>
-              <a:rPr lang="en-US" sz="1800" dirty="0" smtClean="0"/>
-              <a:t>and “amount” of the loans.</a:t>
+              <a:t>We come to the conclusion that the most influencing attributes for loans success or failure are “average salary”, “number of municipalities with inhabitants above 10000” of clients demographic data, “payments” and “amount” of the loans.</a:t>
             </a:r>
             <a:endParaRPr lang="pt-PT" sz="1800" dirty="0"/>
           </a:p>
@@ -5224,7 +4950,7 @@
 </p:sld>
 </file>
 
-<file path=ppt/slides/slide23.xml><?xml version="1.0" encoding="utf-8"?>
+<file path=ppt/slides/slide21.xml><?xml version="1.0" encoding="utf-8"?>
 <p:sld xmlns:a="http://schemas.openxmlformats.org/drawingml/2006/main" xmlns:r="http://schemas.openxmlformats.org/officeDocument/2006/relationships" xmlns:p="http://schemas.openxmlformats.org/presentationml/2006/main">
   <p:cSld>
     <p:spTree>
@@ -5288,15 +5014,7 @@
           <a:p>
             <a:r>
               <a:rPr lang="en-US" dirty="0" smtClean="0"/>
-              <a:t>Using </a:t>
-            </a:r>
-            <a:r>
-              <a:rPr lang="en-US" dirty="0" smtClean="0"/>
-              <a:t>x-validation </a:t>
-            </a:r>
-            <a:r>
-              <a:rPr lang="en-US" dirty="0" smtClean="0"/>
-              <a:t>operation:</a:t>
+              <a:t>Using x-validation operation:</a:t>
             </a:r>
           </a:p>
           <a:p>
@@ -5305,7 +5023,6 @@
               <a:rPr lang="en-US" dirty="0" smtClean="0"/>
               <a:t>Number of validations: 10</a:t>
             </a:r>
-            <a:endParaRPr lang="en-US" dirty="0" smtClean="0"/>
           </a:p>
           <a:p>
             <a:r>
@@ -5338,13 +5055,8 @@
             <a:pPr lvl="2"/>
             <a:r>
               <a:rPr lang="en-US" dirty="0" smtClean="0"/>
-              <a:t>Minimal gain of </a:t>
-            </a:r>
-            <a:r>
-              <a:rPr lang="en-US" dirty="0" smtClean="0"/>
-              <a:t>4%</a:t>
-            </a:r>
-            <a:endParaRPr lang="en-US" dirty="0" smtClean="0"/>
+              <a:t>Minimal gain of 4%</a:t>
+            </a:r>
           </a:p>
           <a:p>
             <a:r>
@@ -5374,7 +5086,7 @@
 </p:sld>
 </file>
 
-<file path=ppt/slides/slide24.xml><?xml version="1.0" encoding="utf-8"?>
+<file path=ppt/slides/slide22.xml><?xml version="1.0" encoding="utf-8"?>
 <p:sld xmlns:a="http://schemas.openxmlformats.org/drawingml/2006/main" xmlns:r="http://schemas.openxmlformats.org/officeDocument/2006/relationships" xmlns:p="http://schemas.openxmlformats.org/presentationml/2006/main">
   <p:cSld>
     <p:spTree>
@@ -5415,11 +5127,7 @@
           <a:p>
             <a:r>
               <a:rPr lang="en-US" sz="2400" dirty="0" smtClean="0"/>
-              <a:t>Decision tree for predicting successful  loans </a:t>
-            </a:r>
-            <a:r>
-              <a:rPr lang="en-US" sz="2400" dirty="0" smtClean="0"/>
-              <a:t>based on finished and active loans and transaction data</a:t>
+              <a:t>Decision tree for predicting successful  loans based on finished and active loans and transaction data</a:t>
             </a:r>
             <a:endParaRPr lang="pt-PT" sz="2400" dirty="0"/>
           </a:p>
@@ -5449,19 +5157,7 @@
           <a:p>
             <a:r>
               <a:rPr lang="en-US" sz="1800" dirty="0" smtClean="0"/>
-              <a:t>We come to the conclusion that the most influencing attributes for loans success or failure are </a:t>
-            </a:r>
-            <a:r>
-              <a:rPr lang="en-US" sz="1800" dirty="0" smtClean="0"/>
-              <a:t>“number of cities”, “ratio of urban inhabitants” </a:t>
-            </a:r>
-            <a:r>
-              <a:rPr lang="en-US" sz="1800" dirty="0" smtClean="0"/>
-              <a:t>of clients demographic data, “duration” and “amount” of the </a:t>
-            </a:r>
-            <a:r>
-              <a:rPr lang="en-US" sz="1800" dirty="0" smtClean="0"/>
-              <a:t>loans and account transaction’s type history.</a:t>
+              <a:t>We come to the conclusion that the most influencing attributes for loans success or failure are “number of cities”, “ratio of urban inhabitants” of clients demographic data, “duration” and “amount” of the loans and account transaction’s type history.</a:t>
             </a:r>
             <a:endParaRPr lang="pt-PT" sz="1800" dirty="0"/>
           </a:p>
@@ -5527,7 +5223,7 @@
 </p:sld>
 </file>
 
-<file path=ppt/slides/slide25.xml><?xml version="1.0" encoding="utf-8"?>
+<file path=ppt/slides/slide23.xml><?xml version="1.0" encoding="utf-8"?>
 <p:sld xmlns:a="http://schemas.openxmlformats.org/drawingml/2006/main" xmlns:r="http://schemas.openxmlformats.org/officeDocument/2006/relationships" xmlns:p="http://schemas.openxmlformats.org/presentationml/2006/main">
   <p:cSld>
     <p:spTree>
@@ -5885,11 +5581,7 @@
             </a:r>
             <a:r>
               <a:rPr lang="en-US" dirty="0" smtClean="0"/>
-              <a:t>had missing values that were replace by average value of all other </a:t>
-            </a:r>
-            <a:r>
-              <a:rPr lang="en-US" dirty="0" smtClean="0"/>
-              <a:t>districts</a:t>
+              <a:t>had missing values that were replace by average value of all other districts</a:t>
             </a:r>
           </a:p>
           <a:p>
@@ -5904,7 +5596,6 @@
               <a:rPr lang="en-US" dirty="0" smtClean="0"/>
               <a:t>Ex.: Accounts with history of sanctions.</a:t>
             </a:r>
-            <a:endParaRPr lang="en-US" dirty="0" smtClean="0"/>
           </a:p>
         </p:txBody>
       </p:sp>

</xml_diff>

<commit_message>
notes added to presentation
</commit_message>
<xml_diff>
--- a/Banking Data Mining.pptx
+++ b/Banking Data Mining.pptx
@@ -4,6 +4,9 @@
   <p:sldMasterIdLst>
     <p:sldMasterId id="2147483840" r:id="rId1"/>
   </p:sldMasterIdLst>
+  <p:notesMasterIdLst>
+    <p:notesMasterId r:id="rId48"/>
+  </p:notesMasterIdLst>
   <p:sldIdLst>
     <p:sldId id="256" r:id="rId2"/>
     <p:sldId id="257" r:id="rId3"/>
@@ -157,6 +160,2987 @@
 </p:presentation>
 </file>
 
+<file path=ppt/notesMasters/notesMaster1.xml><?xml version="1.0" encoding="utf-8"?>
+<p:notesMaster xmlns:a="http://schemas.openxmlformats.org/drawingml/2006/main" xmlns:r="http://schemas.openxmlformats.org/officeDocument/2006/relationships" xmlns:p="http://schemas.openxmlformats.org/presentationml/2006/main">
+  <p:cSld>
+    <p:bg>
+      <p:bgRef idx="1001">
+        <a:schemeClr val="bg1"/>
+      </p:bgRef>
+    </p:bg>
+    <p:spTree>
+      <p:nvGrpSpPr>
+        <p:cNvPr id="1" name=""/>
+        <p:cNvGrpSpPr/>
+        <p:nvPr/>
+      </p:nvGrpSpPr>
+      <p:grpSpPr>
+        <a:xfrm>
+          <a:off x="0" y="0"/>
+          <a:ext cx="0" cy="0"/>
+          <a:chOff x="0" y="0"/>
+          <a:chExt cx="0" cy="0"/>
+        </a:xfrm>
+      </p:grpSpPr>
+      <p:sp>
+        <p:nvSpPr>
+          <p:cNvPr id="2" name="Header Placeholder 1"/>
+          <p:cNvSpPr>
+            <a:spLocks noGrp="1"/>
+          </p:cNvSpPr>
+          <p:nvPr>
+            <p:ph type="hdr" sz="quarter"/>
+          </p:nvPr>
+        </p:nvSpPr>
+        <p:spPr>
+          <a:xfrm>
+            <a:off x="0" y="0"/>
+            <a:ext cx="2971800" cy="458788"/>
+          </a:xfrm>
+          <a:prstGeom prst="rect">
+            <a:avLst/>
+          </a:prstGeom>
+        </p:spPr>
+        <p:txBody>
+          <a:bodyPr vert="horz" lIns="91440" tIns="45720" rIns="91440" bIns="45720" rtlCol="0"/>
+          <a:lstStyle>
+            <a:lvl1pPr algn="l">
+              <a:defRPr sz="1200"/>
+            </a:lvl1pPr>
+          </a:lstStyle>
+          <a:p>
+            <a:endParaRPr lang="pt-PT"/>
+          </a:p>
+        </p:txBody>
+      </p:sp>
+      <p:sp>
+        <p:nvSpPr>
+          <p:cNvPr id="3" name="Date Placeholder 2"/>
+          <p:cNvSpPr>
+            <a:spLocks noGrp="1"/>
+          </p:cNvSpPr>
+          <p:nvPr>
+            <p:ph type="dt" idx="1"/>
+          </p:nvPr>
+        </p:nvSpPr>
+        <p:spPr>
+          <a:xfrm>
+            <a:off x="3884613" y="0"/>
+            <a:ext cx="2971800" cy="458788"/>
+          </a:xfrm>
+          <a:prstGeom prst="rect">
+            <a:avLst/>
+          </a:prstGeom>
+        </p:spPr>
+        <p:txBody>
+          <a:bodyPr vert="horz" lIns="91440" tIns="45720" rIns="91440" bIns="45720" rtlCol="0"/>
+          <a:lstStyle>
+            <a:lvl1pPr algn="r">
+              <a:defRPr sz="1200"/>
+            </a:lvl1pPr>
+          </a:lstStyle>
+          <a:p>
+            <a:fld id="{B6C1B612-214C-4868-8B68-1B8D1443524D}" type="datetimeFigureOut">
+              <a:rPr lang="pt-PT" smtClean="0"/>
+              <a:t>25/01/2016</a:t>
+            </a:fld>
+            <a:endParaRPr lang="pt-PT"/>
+          </a:p>
+        </p:txBody>
+      </p:sp>
+      <p:sp>
+        <p:nvSpPr>
+          <p:cNvPr id="4" name="Slide Image Placeholder 3"/>
+          <p:cNvSpPr>
+            <a:spLocks noGrp="1" noRot="1" noChangeAspect="1"/>
+          </p:cNvSpPr>
+          <p:nvPr>
+            <p:ph type="sldImg" idx="2"/>
+          </p:nvPr>
+        </p:nvSpPr>
+        <p:spPr>
+          <a:xfrm>
+            <a:off x="685800" y="1143000"/>
+            <a:ext cx="5486400" cy="3086100"/>
+          </a:xfrm>
+          <a:prstGeom prst="rect">
+            <a:avLst/>
+          </a:prstGeom>
+          <a:noFill/>
+          <a:ln w="12700">
+            <a:solidFill>
+              <a:prstClr val="black"/>
+            </a:solidFill>
+          </a:ln>
+        </p:spPr>
+        <p:txBody>
+          <a:bodyPr vert="horz" lIns="91440" tIns="45720" rIns="91440" bIns="45720" rtlCol="0" anchor="ctr"/>
+          <a:lstStyle/>
+          <a:p>
+            <a:endParaRPr lang="pt-PT"/>
+          </a:p>
+        </p:txBody>
+      </p:sp>
+      <p:sp>
+        <p:nvSpPr>
+          <p:cNvPr id="5" name="Notes Placeholder 4"/>
+          <p:cNvSpPr>
+            <a:spLocks noGrp="1"/>
+          </p:cNvSpPr>
+          <p:nvPr>
+            <p:ph type="body" sz="quarter" idx="3"/>
+          </p:nvPr>
+        </p:nvSpPr>
+        <p:spPr>
+          <a:xfrm>
+            <a:off x="685800" y="4400550"/>
+            <a:ext cx="5486400" cy="3600450"/>
+          </a:xfrm>
+          <a:prstGeom prst="rect">
+            <a:avLst/>
+          </a:prstGeom>
+        </p:spPr>
+        <p:txBody>
+          <a:bodyPr vert="horz" lIns="91440" tIns="45720" rIns="91440" bIns="45720" rtlCol="0"/>
+          <a:lstStyle/>
+          <a:p>
+            <a:pPr lvl="0"/>
+            <a:r>
+              <a:rPr lang="en-US" smtClean="0"/>
+              <a:t>Edit Master text styles</a:t>
+            </a:r>
+          </a:p>
+          <a:p>
+            <a:pPr lvl="1"/>
+            <a:r>
+              <a:rPr lang="en-US" smtClean="0"/>
+              <a:t>Second level</a:t>
+            </a:r>
+          </a:p>
+          <a:p>
+            <a:pPr lvl="2"/>
+            <a:r>
+              <a:rPr lang="en-US" smtClean="0"/>
+              <a:t>Third level</a:t>
+            </a:r>
+          </a:p>
+          <a:p>
+            <a:pPr lvl="3"/>
+            <a:r>
+              <a:rPr lang="en-US" smtClean="0"/>
+              <a:t>Fourth level</a:t>
+            </a:r>
+          </a:p>
+          <a:p>
+            <a:pPr lvl="4"/>
+            <a:r>
+              <a:rPr lang="en-US" smtClean="0"/>
+              <a:t>Fifth level</a:t>
+            </a:r>
+            <a:endParaRPr lang="pt-PT"/>
+          </a:p>
+        </p:txBody>
+      </p:sp>
+      <p:sp>
+        <p:nvSpPr>
+          <p:cNvPr id="6" name="Footer Placeholder 5"/>
+          <p:cNvSpPr>
+            <a:spLocks noGrp="1"/>
+          </p:cNvSpPr>
+          <p:nvPr>
+            <p:ph type="ftr" sz="quarter" idx="4"/>
+          </p:nvPr>
+        </p:nvSpPr>
+        <p:spPr>
+          <a:xfrm>
+            <a:off x="0" y="8685213"/>
+            <a:ext cx="2971800" cy="458787"/>
+          </a:xfrm>
+          <a:prstGeom prst="rect">
+            <a:avLst/>
+          </a:prstGeom>
+        </p:spPr>
+        <p:txBody>
+          <a:bodyPr vert="horz" lIns="91440" tIns="45720" rIns="91440" bIns="45720" rtlCol="0" anchor="b"/>
+          <a:lstStyle>
+            <a:lvl1pPr algn="l">
+              <a:defRPr sz="1200"/>
+            </a:lvl1pPr>
+          </a:lstStyle>
+          <a:p>
+            <a:endParaRPr lang="pt-PT"/>
+          </a:p>
+        </p:txBody>
+      </p:sp>
+      <p:sp>
+        <p:nvSpPr>
+          <p:cNvPr id="7" name="Slide Number Placeholder 6"/>
+          <p:cNvSpPr>
+            <a:spLocks noGrp="1"/>
+          </p:cNvSpPr>
+          <p:nvPr>
+            <p:ph type="sldNum" sz="quarter" idx="5"/>
+          </p:nvPr>
+        </p:nvSpPr>
+        <p:spPr>
+          <a:xfrm>
+            <a:off x="3884613" y="8685213"/>
+            <a:ext cx="2971800" cy="458787"/>
+          </a:xfrm>
+          <a:prstGeom prst="rect">
+            <a:avLst/>
+          </a:prstGeom>
+        </p:spPr>
+        <p:txBody>
+          <a:bodyPr vert="horz" lIns="91440" tIns="45720" rIns="91440" bIns="45720" rtlCol="0" anchor="b"/>
+          <a:lstStyle>
+            <a:lvl1pPr algn="r">
+              <a:defRPr sz="1200"/>
+            </a:lvl1pPr>
+          </a:lstStyle>
+          <a:p>
+            <a:fld id="{DE9A8645-4E47-4476-9EEF-65BED58C741A}" type="slidenum">
+              <a:rPr lang="pt-PT" smtClean="0"/>
+              <a:t>‹#›</a:t>
+            </a:fld>
+            <a:endParaRPr lang="pt-PT"/>
+          </a:p>
+        </p:txBody>
+      </p:sp>
+    </p:spTree>
+    <p:extLst>
+      <p:ext uri="{BB962C8B-B14F-4D97-AF65-F5344CB8AC3E}">
+        <p14:creationId xmlns:p14="http://schemas.microsoft.com/office/powerpoint/2010/main" val="979989628"/>
+      </p:ext>
+    </p:extLst>
+  </p:cSld>
+  <p:clrMap bg1="lt1" tx1="dk1" bg2="lt2" tx2="dk2" accent1="accent1" accent2="accent2" accent3="accent3" accent4="accent4" accent5="accent5" accent6="accent6" hlink="hlink" folHlink="folHlink"/>
+  <p:notesStyle>
+    <a:lvl1pPr marL="0" algn="l" defTabSz="914400" rtl="0" eaLnBrk="1" latinLnBrk="0" hangingPunct="1">
+      <a:defRPr sz="1200" kern="1200">
+        <a:solidFill>
+          <a:schemeClr val="tx1"/>
+        </a:solidFill>
+        <a:latin typeface="+mn-lt"/>
+        <a:ea typeface="+mn-ea"/>
+        <a:cs typeface="+mn-cs"/>
+      </a:defRPr>
+    </a:lvl1pPr>
+    <a:lvl2pPr marL="457200" algn="l" defTabSz="914400" rtl="0" eaLnBrk="1" latinLnBrk="0" hangingPunct="1">
+      <a:defRPr sz="1200" kern="1200">
+        <a:solidFill>
+          <a:schemeClr val="tx1"/>
+        </a:solidFill>
+        <a:latin typeface="+mn-lt"/>
+        <a:ea typeface="+mn-ea"/>
+        <a:cs typeface="+mn-cs"/>
+      </a:defRPr>
+    </a:lvl2pPr>
+    <a:lvl3pPr marL="914400" algn="l" defTabSz="914400" rtl="0" eaLnBrk="1" latinLnBrk="0" hangingPunct="1">
+      <a:defRPr sz="1200" kern="1200">
+        <a:solidFill>
+          <a:schemeClr val="tx1"/>
+        </a:solidFill>
+        <a:latin typeface="+mn-lt"/>
+        <a:ea typeface="+mn-ea"/>
+        <a:cs typeface="+mn-cs"/>
+      </a:defRPr>
+    </a:lvl3pPr>
+    <a:lvl4pPr marL="1371600" algn="l" defTabSz="914400" rtl="0" eaLnBrk="1" latinLnBrk="0" hangingPunct="1">
+      <a:defRPr sz="1200" kern="1200">
+        <a:solidFill>
+          <a:schemeClr val="tx1"/>
+        </a:solidFill>
+        <a:latin typeface="+mn-lt"/>
+        <a:ea typeface="+mn-ea"/>
+        <a:cs typeface="+mn-cs"/>
+      </a:defRPr>
+    </a:lvl4pPr>
+    <a:lvl5pPr marL="1828800" algn="l" defTabSz="914400" rtl="0" eaLnBrk="1" latinLnBrk="0" hangingPunct="1">
+      <a:defRPr sz="1200" kern="1200">
+        <a:solidFill>
+          <a:schemeClr val="tx1"/>
+        </a:solidFill>
+        <a:latin typeface="+mn-lt"/>
+        <a:ea typeface="+mn-ea"/>
+        <a:cs typeface="+mn-cs"/>
+      </a:defRPr>
+    </a:lvl5pPr>
+    <a:lvl6pPr marL="2286000" algn="l" defTabSz="914400" rtl="0" eaLnBrk="1" latinLnBrk="0" hangingPunct="1">
+      <a:defRPr sz="1200" kern="1200">
+        <a:solidFill>
+          <a:schemeClr val="tx1"/>
+        </a:solidFill>
+        <a:latin typeface="+mn-lt"/>
+        <a:ea typeface="+mn-ea"/>
+        <a:cs typeface="+mn-cs"/>
+      </a:defRPr>
+    </a:lvl6pPr>
+    <a:lvl7pPr marL="2743200" algn="l" defTabSz="914400" rtl="0" eaLnBrk="1" latinLnBrk="0" hangingPunct="1">
+      <a:defRPr sz="1200" kern="1200">
+        <a:solidFill>
+          <a:schemeClr val="tx1"/>
+        </a:solidFill>
+        <a:latin typeface="+mn-lt"/>
+        <a:ea typeface="+mn-ea"/>
+        <a:cs typeface="+mn-cs"/>
+      </a:defRPr>
+    </a:lvl7pPr>
+    <a:lvl8pPr marL="3200400" algn="l" defTabSz="914400" rtl="0" eaLnBrk="1" latinLnBrk="0" hangingPunct="1">
+      <a:defRPr sz="1200" kern="1200">
+        <a:solidFill>
+          <a:schemeClr val="tx1"/>
+        </a:solidFill>
+        <a:latin typeface="+mn-lt"/>
+        <a:ea typeface="+mn-ea"/>
+        <a:cs typeface="+mn-cs"/>
+      </a:defRPr>
+    </a:lvl8pPr>
+    <a:lvl9pPr marL="3657600" algn="l" defTabSz="914400" rtl="0" eaLnBrk="1" latinLnBrk="0" hangingPunct="1">
+      <a:defRPr sz="1200" kern="1200">
+        <a:solidFill>
+          <a:schemeClr val="tx1"/>
+        </a:solidFill>
+        <a:latin typeface="+mn-lt"/>
+        <a:ea typeface="+mn-ea"/>
+        <a:cs typeface="+mn-cs"/>
+      </a:defRPr>
+    </a:lvl9pPr>
+  </p:notesStyle>
+</p:notesMaster>
+</file>
+
+<file path=ppt/notesSlides/notesSlide1.xml><?xml version="1.0" encoding="utf-8"?>
+<p:notes xmlns:a="http://schemas.openxmlformats.org/drawingml/2006/main" xmlns:r="http://schemas.openxmlformats.org/officeDocument/2006/relationships" xmlns:p="http://schemas.openxmlformats.org/presentationml/2006/main">
+  <p:cSld>
+    <p:spTree>
+      <p:nvGrpSpPr>
+        <p:cNvPr id="1" name=""/>
+        <p:cNvGrpSpPr/>
+        <p:nvPr/>
+      </p:nvGrpSpPr>
+      <p:grpSpPr>
+        <a:xfrm>
+          <a:off x="0" y="0"/>
+          <a:ext cx="0" cy="0"/>
+          <a:chOff x="0" y="0"/>
+          <a:chExt cx="0" cy="0"/>
+        </a:xfrm>
+      </p:grpSpPr>
+      <p:sp>
+        <p:nvSpPr>
+          <p:cNvPr id="2" name="Slide Image Placeholder 1"/>
+          <p:cNvSpPr>
+            <a:spLocks noGrp="1" noRot="1" noChangeAspect="1"/>
+          </p:cNvSpPr>
+          <p:nvPr>
+            <p:ph type="sldImg"/>
+          </p:nvPr>
+        </p:nvSpPr>
+        <p:spPr/>
+      </p:sp>
+      <p:sp>
+        <p:nvSpPr>
+          <p:cNvPr id="3" name="Notes Placeholder 2"/>
+          <p:cNvSpPr>
+            <a:spLocks noGrp="1"/>
+          </p:cNvSpPr>
+          <p:nvPr>
+            <p:ph type="body" idx="1"/>
+          </p:nvPr>
+        </p:nvSpPr>
+        <p:spPr/>
+        <p:txBody>
+          <a:bodyPr/>
+          <a:lstStyle/>
+          <a:p>
+            <a:r>
+              <a:rPr lang="en-US" dirty="0" smtClean="0"/>
+              <a:t>Explain</a:t>
+            </a:r>
+            <a:r>
+              <a:rPr lang="en-US" baseline="0" dirty="0" smtClean="0"/>
+              <a:t> that the data we got is about typical operations in a bank and additional demographic generic data.</a:t>
+            </a:r>
+            <a:endParaRPr lang="en-US" dirty="0" smtClean="0"/>
+          </a:p>
+          <a:p>
+            <a:endParaRPr lang="en-US" dirty="0" smtClean="0"/>
+          </a:p>
+          <a:p>
+            <a:r>
+              <a:rPr lang="en-US" dirty="0" smtClean="0"/>
+              <a:t>Relationships between tables (relations</a:t>
+            </a:r>
+            <a:r>
+              <a:rPr lang="en-US" baseline="0" dirty="0" smtClean="0"/>
+              <a:t> knowledge)</a:t>
+            </a:r>
+          </a:p>
+          <a:p>
+            <a:r>
+              <a:rPr lang="en-US" baseline="0" dirty="0" smtClean="0"/>
+              <a:t>Get to know our mining objective – loans success prediction</a:t>
+            </a:r>
+          </a:p>
+          <a:p>
+            <a:endParaRPr lang="en-US" baseline="0" dirty="0" smtClean="0"/>
+          </a:p>
+          <a:p>
+            <a:r>
+              <a:rPr lang="en-US" dirty="0" smtClean="0"/>
+              <a:t>Excel.</a:t>
+            </a:r>
+            <a:endParaRPr lang="pt-PT" dirty="0"/>
+          </a:p>
+        </p:txBody>
+      </p:sp>
+      <p:sp>
+        <p:nvSpPr>
+          <p:cNvPr id="4" name="Slide Number Placeholder 3"/>
+          <p:cNvSpPr>
+            <a:spLocks noGrp="1"/>
+          </p:cNvSpPr>
+          <p:nvPr>
+            <p:ph type="sldNum" sz="quarter" idx="10"/>
+          </p:nvPr>
+        </p:nvSpPr>
+        <p:spPr/>
+        <p:txBody>
+          <a:bodyPr/>
+          <a:lstStyle/>
+          <a:p>
+            <a:fld id="{DE9A8645-4E47-4476-9EEF-65BED58C741A}" type="slidenum">
+              <a:rPr lang="pt-PT" smtClean="0"/>
+              <a:t>3</a:t>
+            </a:fld>
+            <a:endParaRPr lang="pt-PT"/>
+          </a:p>
+        </p:txBody>
+      </p:sp>
+    </p:spTree>
+    <p:extLst>
+      <p:ext uri="{BB962C8B-B14F-4D97-AF65-F5344CB8AC3E}">
+        <p14:creationId xmlns:p14="http://schemas.microsoft.com/office/powerpoint/2010/main" val="2768726183"/>
+      </p:ext>
+    </p:extLst>
+  </p:cSld>
+  <p:clrMapOvr>
+    <a:masterClrMapping/>
+  </p:clrMapOvr>
+</p:notes>
+</file>
+
+<file path=ppt/notesSlides/notesSlide10.xml><?xml version="1.0" encoding="utf-8"?>
+<p:notes xmlns:a="http://schemas.openxmlformats.org/drawingml/2006/main" xmlns:r="http://schemas.openxmlformats.org/officeDocument/2006/relationships" xmlns:p="http://schemas.openxmlformats.org/presentationml/2006/main">
+  <p:cSld>
+    <p:spTree>
+      <p:nvGrpSpPr>
+        <p:cNvPr id="1" name=""/>
+        <p:cNvGrpSpPr/>
+        <p:nvPr/>
+      </p:nvGrpSpPr>
+      <p:grpSpPr>
+        <a:xfrm>
+          <a:off x="0" y="0"/>
+          <a:ext cx="0" cy="0"/>
+          <a:chOff x="0" y="0"/>
+          <a:chExt cx="0" cy="0"/>
+        </a:xfrm>
+      </p:grpSpPr>
+      <p:sp>
+        <p:nvSpPr>
+          <p:cNvPr id="2" name="Slide Image Placeholder 1"/>
+          <p:cNvSpPr>
+            <a:spLocks noGrp="1" noRot="1" noChangeAspect="1"/>
+          </p:cNvSpPr>
+          <p:nvPr>
+            <p:ph type="sldImg"/>
+          </p:nvPr>
+        </p:nvSpPr>
+        <p:spPr/>
+      </p:sp>
+      <p:sp>
+        <p:nvSpPr>
+          <p:cNvPr id="3" name="Notes Placeholder 2"/>
+          <p:cNvSpPr>
+            <a:spLocks noGrp="1"/>
+          </p:cNvSpPr>
+          <p:nvPr>
+            <p:ph type="body" idx="1"/>
+          </p:nvPr>
+        </p:nvSpPr>
+        <p:spPr/>
+        <p:txBody>
+          <a:bodyPr/>
+          <a:lstStyle/>
+          <a:p>
+            <a:endParaRPr lang="pt-PT" dirty="0"/>
+          </a:p>
+        </p:txBody>
+      </p:sp>
+      <p:sp>
+        <p:nvSpPr>
+          <p:cNvPr id="4" name="Slide Number Placeholder 3"/>
+          <p:cNvSpPr>
+            <a:spLocks noGrp="1"/>
+          </p:cNvSpPr>
+          <p:nvPr>
+            <p:ph type="sldNum" sz="quarter" idx="10"/>
+          </p:nvPr>
+        </p:nvSpPr>
+        <p:spPr/>
+        <p:txBody>
+          <a:bodyPr/>
+          <a:lstStyle/>
+          <a:p>
+            <a:fld id="{DE9A8645-4E47-4476-9EEF-65BED58C741A}" type="slidenum">
+              <a:rPr lang="pt-PT" smtClean="0"/>
+              <a:t>13</a:t>
+            </a:fld>
+            <a:endParaRPr lang="pt-PT"/>
+          </a:p>
+        </p:txBody>
+      </p:sp>
+    </p:spTree>
+    <p:extLst>
+      <p:ext uri="{BB962C8B-B14F-4D97-AF65-F5344CB8AC3E}">
+        <p14:creationId xmlns:p14="http://schemas.microsoft.com/office/powerpoint/2010/main" val="1180521961"/>
+      </p:ext>
+    </p:extLst>
+  </p:cSld>
+  <p:clrMapOvr>
+    <a:masterClrMapping/>
+  </p:clrMapOvr>
+</p:notes>
+</file>
+
+<file path=ppt/notesSlides/notesSlide11.xml><?xml version="1.0" encoding="utf-8"?>
+<p:notes xmlns:a="http://schemas.openxmlformats.org/drawingml/2006/main" xmlns:r="http://schemas.openxmlformats.org/officeDocument/2006/relationships" xmlns:p="http://schemas.openxmlformats.org/presentationml/2006/main">
+  <p:cSld>
+    <p:spTree>
+      <p:nvGrpSpPr>
+        <p:cNvPr id="1" name=""/>
+        <p:cNvGrpSpPr/>
+        <p:nvPr/>
+      </p:nvGrpSpPr>
+      <p:grpSpPr>
+        <a:xfrm>
+          <a:off x="0" y="0"/>
+          <a:ext cx="0" cy="0"/>
+          <a:chOff x="0" y="0"/>
+          <a:chExt cx="0" cy="0"/>
+        </a:xfrm>
+      </p:grpSpPr>
+      <p:sp>
+        <p:nvSpPr>
+          <p:cNvPr id="2" name="Slide Image Placeholder 1"/>
+          <p:cNvSpPr>
+            <a:spLocks noGrp="1" noRot="1" noChangeAspect="1"/>
+          </p:cNvSpPr>
+          <p:nvPr>
+            <p:ph type="sldImg"/>
+          </p:nvPr>
+        </p:nvSpPr>
+        <p:spPr/>
+      </p:sp>
+      <p:sp>
+        <p:nvSpPr>
+          <p:cNvPr id="3" name="Notes Placeholder 2"/>
+          <p:cNvSpPr>
+            <a:spLocks noGrp="1"/>
+          </p:cNvSpPr>
+          <p:nvPr>
+            <p:ph type="body" idx="1"/>
+          </p:nvPr>
+        </p:nvSpPr>
+        <p:spPr/>
+        <p:txBody>
+          <a:bodyPr/>
+          <a:lstStyle/>
+          <a:p>
+            <a:endParaRPr lang="pt-PT" dirty="0"/>
+          </a:p>
+        </p:txBody>
+      </p:sp>
+      <p:sp>
+        <p:nvSpPr>
+          <p:cNvPr id="4" name="Slide Number Placeholder 3"/>
+          <p:cNvSpPr>
+            <a:spLocks noGrp="1"/>
+          </p:cNvSpPr>
+          <p:nvPr>
+            <p:ph type="sldNum" sz="quarter" idx="10"/>
+          </p:nvPr>
+        </p:nvSpPr>
+        <p:spPr/>
+        <p:txBody>
+          <a:bodyPr/>
+          <a:lstStyle/>
+          <a:p>
+            <a:fld id="{DE9A8645-4E47-4476-9EEF-65BED58C741A}" type="slidenum">
+              <a:rPr lang="pt-PT" smtClean="0"/>
+              <a:t>16</a:t>
+            </a:fld>
+            <a:endParaRPr lang="pt-PT"/>
+          </a:p>
+        </p:txBody>
+      </p:sp>
+    </p:spTree>
+    <p:extLst>
+      <p:ext uri="{BB962C8B-B14F-4D97-AF65-F5344CB8AC3E}">
+        <p14:creationId xmlns:p14="http://schemas.microsoft.com/office/powerpoint/2010/main" val="2107439283"/>
+      </p:ext>
+    </p:extLst>
+  </p:cSld>
+  <p:clrMapOvr>
+    <a:masterClrMapping/>
+  </p:clrMapOvr>
+</p:notes>
+</file>
+
+<file path=ppt/notesSlides/notesSlide12.xml><?xml version="1.0" encoding="utf-8"?>
+<p:notes xmlns:a="http://schemas.openxmlformats.org/drawingml/2006/main" xmlns:r="http://schemas.openxmlformats.org/officeDocument/2006/relationships" xmlns:p="http://schemas.openxmlformats.org/presentationml/2006/main">
+  <p:cSld>
+    <p:spTree>
+      <p:nvGrpSpPr>
+        <p:cNvPr id="1" name=""/>
+        <p:cNvGrpSpPr/>
+        <p:nvPr/>
+      </p:nvGrpSpPr>
+      <p:grpSpPr>
+        <a:xfrm>
+          <a:off x="0" y="0"/>
+          <a:ext cx="0" cy="0"/>
+          <a:chOff x="0" y="0"/>
+          <a:chExt cx="0" cy="0"/>
+        </a:xfrm>
+      </p:grpSpPr>
+      <p:sp>
+        <p:nvSpPr>
+          <p:cNvPr id="2" name="Slide Image Placeholder 1"/>
+          <p:cNvSpPr>
+            <a:spLocks noGrp="1" noRot="1" noChangeAspect="1"/>
+          </p:cNvSpPr>
+          <p:nvPr>
+            <p:ph type="sldImg"/>
+          </p:nvPr>
+        </p:nvSpPr>
+        <p:spPr/>
+      </p:sp>
+      <p:sp>
+        <p:nvSpPr>
+          <p:cNvPr id="3" name="Notes Placeholder 2"/>
+          <p:cNvSpPr>
+            <a:spLocks noGrp="1"/>
+          </p:cNvSpPr>
+          <p:nvPr>
+            <p:ph type="body" idx="1"/>
+          </p:nvPr>
+        </p:nvSpPr>
+        <p:spPr/>
+        <p:txBody>
+          <a:bodyPr/>
+          <a:lstStyle/>
+          <a:p>
+            <a:r>
+              <a:rPr lang="en-US" dirty="0" smtClean="0"/>
+              <a:t>RAPIDMINER</a:t>
+            </a:r>
+            <a:r>
+              <a:rPr lang="en-US" baseline="0" dirty="0" smtClean="0"/>
+              <a:t> all the way.</a:t>
+            </a:r>
+            <a:endParaRPr lang="pt-PT" dirty="0"/>
+          </a:p>
+        </p:txBody>
+      </p:sp>
+      <p:sp>
+        <p:nvSpPr>
+          <p:cNvPr id="4" name="Slide Number Placeholder 3"/>
+          <p:cNvSpPr>
+            <a:spLocks noGrp="1"/>
+          </p:cNvSpPr>
+          <p:nvPr>
+            <p:ph type="sldNum" sz="quarter" idx="10"/>
+          </p:nvPr>
+        </p:nvSpPr>
+        <p:spPr/>
+        <p:txBody>
+          <a:bodyPr/>
+          <a:lstStyle/>
+          <a:p>
+            <a:fld id="{DE9A8645-4E47-4476-9EEF-65BED58C741A}" type="slidenum">
+              <a:rPr lang="pt-PT" smtClean="0"/>
+              <a:t>17</a:t>
+            </a:fld>
+            <a:endParaRPr lang="pt-PT"/>
+          </a:p>
+        </p:txBody>
+      </p:sp>
+    </p:spTree>
+    <p:extLst>
+      <p:ext uri="{BB962C8B-B14F-4D97-AF65-F5344CB8AC3E}">
+        <p14:creationId xmlns:p14="http://schemas.microsoft.com/office/powerpoint/2010/main" val="3665968542"/>
+      </p:ext>
+    </p:extLst>
+  </p:cSld>
+  <p:clrMapOvr>
+    <a:masterClrMapping/>
+  </p:clrMapOvr>
+</p:notes>
+</file>
+
+<file path=ppt/notesSlides/notesSlide13.xml><?xml version="1.0" encoding="utf-8"?>
+<p:notes xmlns:a="http://schemas.openxmlformats.org/drawingml/2006/main" xmlns:r="http://schemas.openxmlformats.org/officeDocument/2006/relationships" xmlns:p="http://schemas.openxmlformats.org/presentationml/2006/main">
+  <p:cSld>
+    <p:spTree>
+      <p:nvGrpSpPr>
+        <p:cNvPr id="1" name=""/>
+        <p:cNvGrpSpPr/>
+        <p:nvPr/>
+      </p:nvGrpSpPr>
+      <p:grpSpPr>
+        <a:xfrm>
+          <a:off x="0" y="0"/>
+          <a:ext cx="0" cy="0"/>
+          <a:chOff x="0" y="0"/>
+          <a:chExt cx="0" cy="0"/>
+        </a:xfrm>
+      </p:grpSpPr>
+      <p:sp>
+        <p:nvSpPr>
+          <p:cNvPr id="2" name="Slide Image Placeholder 1"/>
+          <p:cNvSpPr>
+            <a:spLocks noGrp="1" noRot="1" noChangeAspect="1"/>
+          </p:cNvSpPr>
+          <p:nvPr>
+            <p:ph type="sldImg"/>
+          </p:nvPr>
+        </p:nvSpPr>
+        <p:spPr/>
+      </p:sp>
+      <p:sp>
+        <p:nvSpPr>
+          <p:cNvPr id="3" name="Notes Placeholder 2"/>
+          <p:cNvSpPr>
+            <a:spLocks noGrp="1"/>
+          </p:cNvSpPr>
+          <p:nvPr>
+            <p:ph type="body" idx="1"/>
+          </p:nvPr>
+        </p:nvSpPr>
+        <p:spPr/>
+        <p:txBody>
+          <a:bodyPr/>
+          <a:lstStyle/>
+          <a:p>
+            <a:pPr marL="0" marR="0" indent="0" algn="l" defTabSz="914400" rtl="0" eaLnBrk="1" fontAlgn="auto" latinLnBrk="0" hangingPunct="1">
+              <a:lnSpc>
+                <a:spcPct val="100000"/>
+              </a:lnSpc>
+              <a:spcBef>
+                <a:spcPts val="0"/>
+              </a:spcBef>
+              <a:spcAft>
+                <a:spcPts val="0"/>
+              </a:spcAft>
+              <a:buClrTx/>
+              <a:buSzTx/>
+              <a:buFontTx/>
+              <a:buNone/>
+              <a:tabLst/>
+              <a:defRPr/>
+            </a:pPr>
+            <a:r>
+              <a:rPr lang="en-US" dirty="0" smtClean="0"/>
+              <a:t>Decision</a:t>
+            </a:r>
+            <a:r>
+              <a:rPr lang="en-US" baseline="0" dirty="0" smtClean="0"/>
+              <a:t> support model at the business side, such as specific condition accordingly to the tree tests.</a:t>
+            </a:r>
+            <a:endParaRPr lang="pt-PT" dirty="0" smtClean="0"/>
+          </a:p>
+          <a:p>
+            <a:endParaRPr lang="pt-PT" dirty="0"/>
+          </a:p>
+        </p:txBody>
+      </p:sp>
+      <p:sp>
+        <p:nvSpPr>
+          <p:cNvPr id="4" name="Slide Number Placeholder 3"/>
+          <p:cNvSpPr>
+            <a:spLocks noGrp="1"/>
+          </p:cNvSpPr>
+          <p:nvPr>
+            <p:ph type="sldNum" sz="quarter" idx="10"/>
+          </p:nvPr>
+        </p:nvSpPr>
+        <p:spPr/>
+        <p:txBody>
+          <a:bodyPr/>
+          <a:lstStyle/>
+          <a:p>
+            <a:fld id="{DE9A8645-4E47-4476-9EEF-65BED58C741A}" type="slidenum">
+              <a:rPr lang="pt-PT" smtClean="0"/>
+              <a:t>19</a:t>
+            </a:fld>
+            <a:endParaRPr lang="pt-PT"/>
+          </a:p>
+        </p:txBody>
+      </p:sp>
+    </p:spTree>
+    <p:extLst>
+      <p:ext uri="{BB962C8B-B14F-4D97-AF65-F5344CB8AC3E}">
+        <p14:creationId xmlns:p14="http://schemas.microsoft.com/office/powerpoint/2010/main" val="2094505943"/>
+      </p:ext>
+    </p:extLst>
+  </p:cSld>
+  <p:clrMapOvr>
+    <a:masterClrMapping/>
+  </p:clrMapOvr>
+</p:notes>
+</file>
+
+<file path=ppt/notesSlides/notesSlide14.xml><?xml version="1.0" encoding="utf-8"?>
+<p:notes xmlns:a="http://schemas.openxmlformats.org/drawingml/2006/main" xmlns:r="http://schemas.openxmlformats.org/officeDocument/2006/relationships" xmlns:p="http://schemas.openxmlformats.org/presentationml/2006/main">
+  <p:cSld>
+    <p:spTree>
+      <p:nvGrpSpPr>
+        <p:cNvPr id="1" name=""/>
+        <p:cNvGrpSpPr/>
+        <p:nvPr/>
+      </p:nvGrpSpPr>
+      <p:grpSpPr>
+        <a:xfrm>
+          <a:off x="0" y="0"/>
+          <a:ext cx="0" cy="0"/>
+          <a:chOff x="0" y="0"/>
+          <a:chExt cx="0" cy="0"/>
+        </a:xfrm>
+      </p:grpSpPr>
+      <p:sp>
+        <p:nvSpPr>
+          <p:cNvPr id="2" name="Slide Image Placeholder 1"/>
+          <p:cNvSpPr>
+            <a:spLocks noGrp="1" noRot="1" noChangeAspect="1"/>
+          </p:cNvSpPr>
+          <p:nvPr>
+            <p:ph type="sldImg"/>
+          </p:nvPr>
+        </p:nvSpPr>
+        <p:spPr/>
+      </p:sp>
+      <p:sp>
+        <p:nvSpPr>
+          <p:cNvPr id="3" name="Notes Placeholder 2"/>
+          <p:cNvSpPr>
+            <a:spLocks noGrp="1"/>
+          </p:cNvSpPr>
+          <p:nvPr>
+            <p:ph type="body" idx="1"/>
+          </p:nvPr>
+        </p:nvSpPr>
+        <p:spPr/>
+        <p:txBody>
+          <a:bodyPr/>
+          <a:lstStyle/>
+          <a:p>
+            <a:r>
+              <a:rPr lang="en-US" dirty="0" smtClean="0"/>
+              <a:t>Hold-out method</a:t>
+            </a:r>
+            <a:r>
+              <a:rPr lang="en-US" baseline="0" dirty="0" smtClean="0"/>
+              <a:t> was used to experiment this validation technique, and also, besides the standard values being 70/30, we see that this values were a good choice  due to the variability of the given data, resulting in a better modelling. </a:t>
+            </a:r>
+            <a:endParaRPr lang="pt-PT" dirty="0"/>
+          </a:p>
+        </p:txBody>
+      </p:sp>
+      <p:sp>
+        <p:nvSpPr>
+          <p:cNvPr id="4" name="Slide Number Placeholder 3"/>
+          <p:cNvSpPr>
+            <a:spLocks noGrp="1"/>
+          </p:cNvSpPr>
+          <p:nvPr>
+            <p:ph type="sldNum" sz="quarter" idx="10"/>
+          </p:nvPr>
+        </p:nvSpPr>
+        <p:spPr/>
+        <p:txBody>
+          <a:bodyPr/>
+          <a:lstStyle/>
+          <a:p>
+            <a:fld id="{DE9A8645-4E47-4476-9EEF-65BED58C741A}" type="slidenum">
+              <a:rPr lang="pt-PT" smtClean="0"/>
+              <a:t>20</a:t>
+            </a:fld>
+            <a:endParaRPr lang="pt-PT"/>
+          </a:p>
+        </p:txBody>
+      </p:sp>
+    </p:spTree>
+    <p:extLst>
+      <p:ext uri="{BB962C8B-B14F-4D97-AF65-F5344CB8AC3E}">
+        <p14:creationId xmlns:p14="http://schemas.microsoft.com/office/powerpoint/2010/main" val="3115788900"/>
+      </p:ext>
+    </p:extLst>
+  </p:cSld>
+  <p:clrMapOvr>
+    <a:masterClrMapping/>
+  </p:clrMapOvr>
+</p:notes>
+</file>
+
+<file path=ppt/notesSlides/notesSlide15.xml><?xml version="1.0" encoding="utf-8"?>
+<p:notes xmlns:a="http://schemas.openxmlformats.org/drawingml/2006/main" xmlns:r="http://schemas.openxmlformats.org/officeDocument/2006/relationships" xmlns:p="http://schemas.openxmlformats.org/presentationml/2006/main">
+  <p:cSld>
+    <p:spTree>
+      <p:nvGrpSpPr>
+        <p:cNvPr id="1" name=""/>
+        <p:cNvGrpSpPr/>
+        <p:nvPr/>
+      </p:nvGrpSpPr>
+      <p:grpSpPr>
+        <a:xfrm>
+          <a:off x="0" y="0"/>
+          <a:ext cx="0" cy="0"/>
+          <a:chOff x="0" y="0"/>
+          <a:chExt cx="0" cy="0"/>
+        </a:xfrm>
+      </p:grpSpPr>
+      <p:sp>
+        <p:nvSpPr>
+          <p:cNvPr id="2" name="Slide Image Placeholder 1"/>
+          <p:cNvSpPr>
+            <a:spLocks noGrp="1" noRot="1" noChangeAspect="1"/>
+          </p:cNvSpPr>
+          <p:nvPr>
+            <p:ph type="sldImg"/>
+          </p:nvPr>
+        </p:nvSpPr>
+        <p:spPr/>
+      </p:sp>
+      <p:sp>
+        <p:nvSpPr>
+          <p:cNvPr id="3" name="Notes Placeholder 2"/>
+          <p:cNvSpPr>
+            <a:spLocks noGrp="1"/>
+          </p:cNvSpPr>
+          <p:nvPr>
+            <p:ph type="body" idx="1"/>
+          </p:nvPr>
+        </p:nvSpPr>
+        <p:spPr/>
+        <p:txBody>
+          <a:bodyPr/>
+          <a:lstStyle/>
+          <a:p>
+            <a:r>
+              <a:rPr lang="en-US" dirty="0" smtClean="0"/>
+              <a:t>Decision</a:t>
+            </a:r>
+            <a:r>
+              <a:rPr lang="en-US" baseline="0" dirty="0" smtClean="0"/>
+              <a:t> support model at the business side, such as specific condition accordingly to the tree tests.</a:t>
+            </a:r>
+            <a:endParaRPr lang="pt-PT" dirty="0"/>
+          </a:p>
+        </p:txBody>
+      </p:sp>
+      <p:sp>
+        <p:nvSpPr>
+          <p:cNvPr id="4" name="Slide Number Placeholder 3"/>
+          <p:cNvSpPr>
+            <a:spLocks noGrp="1"/>
+          </p:cNvSpPr>
+          <p:nvPr>
+            <p:ph type="sldNum" sz="quarter" idx="10"/>
+          </p:nvPr>
+        </p:nvSpPr>
+        <p:spPr/>
+        <p:txBody>
+          <a:bodyPr/>
+          <a:lstStyle/>
+          <a:p>
+            <a:fld id="{DE9A8645-4E47-4476-9EEF-65BED58C741A}" type="slidenum">
+              <a:rPr lang="pt-PT" smtClean="0"/>
+              <a:t>21</a:t>
+            </a:fld>
+            <a:endParaRPr lang="pt-PT"/>
+          </a:p>
+        </p:txBody>
+      </p:sp>
+    </p:spTree>
+    <p:extLst>
+      <p:ext uri="{BB962C8B-B14F-4D97-AF65-F5344CB8AC3E}">
+        <p14:creationId xmlns:p14="http://schemas.microsoft.com/office/powerpoint/2010/main" val="1498772037"/>
+      </p:ext>
+    </p:extLst>
+  </p:cSld>
+  <p:clrMapOvr>
+    <a:masterClrMapping/>
+  </p:clrMapOvr>
+</p:notes>
+</file>
+
+<file path=ppt/notesSlides/notesSlide16.xml><?xml version="1.0" encoding="utf-8"?>
+<p:notes xmlns:a="http://schemas.openxmlformats.org/drawingml/2006/main" xmlns:r="http://schemas.openxmlformats.org/officeDocument/2006/relationships" xmlns:p="http://schemas.openxmlformats.org/presentationml/2006/main">
+  <p:cSld>
+    <p:spTree>
+      <p:nvGrpSpPr>
+        <p:cNvPr id="1" name=""/>
+        <p:cNvGrpSpPr/>
+        <p:nvPr/>
+      </p:nvGrpSpPr>
+      <p:grpSpPr>
+        <a:xfrm>
+          <a:off x="0" y="0"/>
+          <a:ext cx="0" cy="0"/>
+          <a:chOff x="0" y="0"/>
+          <a:chExt cx="0" cy="0"/>
+        </a:xfrm>
+      </p:grpSpPr>
+      <p:sp>
+        <p:nvSpPr>
+          <p:cNvPr id="2" name="Slide Image Placeholder 1"/>
+          <p:cNvSpPr>
+            <a:spLocks noGrp="1" noRot="1" noChangeAspect="1"/>
+          </p:cNvSpPr>
+          <p:nvPr>
+            <p:ph type="sldImg"/>
+          </p:nvPr>
+        </p:nvSpPr>
+        <p:spPr/>
+      </p:sp>
+      <p:sp>
+        <p:nvSpPr>
+          <p:cNvPr id="3" name="Notes Placeholder 2"/>
+          <p:cNvSpPr>
+            <a:spLocks noGrp="1"/>
+          </p:cNvSpPr>
+          <p:nvPr>
+            <p:ph type="body" idx="1"/>
+          </p:nvPr>
+        </p:nvSpPr>
+        <p:spPr/>
+        <p:txBody>
+          <a:bodyPr/>
+          <a:lstStyle/>
+          <a:p>
+            <a:pPr marL="0" marR="0" indent="0" algn="l" defTabSz="914400" rtl="0" eaLnBrk="1" fontAlgn="auto" latinLnBrk="0" hangingPunct="1">
+              <a:lnSpc>
+                <a:spcPct val="100000"/>
+              </a:lnSpc>
+              <a:spcBef>
+                <a:spcPts val="0"/>
+              </a:spcBef>
+              <a:spcAft>
+                <a:spcPts val="0"/>
+              </a:spcAft>
+              <a:buClrTx/>
+              <a:buSzTx/>
+              <a:buFontTx/>
+              <a:buNone/>
+              <a:tabLst/>
+              <a:defRPr/>
+            </a:pPr>
+            <a:r>
+              <a:rPr lang="en-US" dirty="0" smtClean="0"/>
+              <a:t>There</a:t>
+            </a:r>
+            <a:r>
+              <a:rPr lang="en-US" baseline="0" dirty="0" smtClean="0"/>
+              <a:t> was tries with different k  number of validations, but in order to be more sure of the results of validation we decided to use 10 as the last verification value, since the relative % stabilized with this number.</a:t>
+            </a:r>
+            <a:endParaRPr lang="pt-PT" dirty="0" smtClean="0"/>
+          </a:p>
+          <a:p>
+            <a:endParaRPr lang="pt-PT" dirty="0"/>
+          </a:p>
+        </p:txBody>
+      </p:sp>
+      <p:sp>
+        <p:nvSpPr>
+          <p:cNvPr id="4" name="Slide Number Placeholder 3"/>
+          <p:cNvSpPr>
+            <a:spLocks noGrp="1"/>
+          </p:cNvSpPr>
+          <p:nvPr>
+            <p:ph type="sldNum" sz="quarter" idx="10"/>
+          </p:nvPr>
+        </p:nvSpPr>
+        <p:spPr/>
+        <p:txBody>
+          <a:bodyPr/>
+          <a:lstStyle/>
+          <a:p>
+            <a:fld id="{DE9A8645-4E47-4476-9EEF-65BED58C741A}" type="slidenum">
+              <a:rPr lang="pt-PT" smtClean="0"/>
+              <a:t>22</a:t>
+            </a:fld>
+            <a:endParaRPr lang="pt-PT"/>
+          </a:p>
+        </p:txBody>
+      </p:sp>
+    </p:spTree>
+    <p:extLst>
+      <p:ext uri="{BB962C8B-B14F-4D97-AF65-F5344CB8AC3E}">
+        <p14:creationId xmlns:p14="http://schemas.microsoft.com/office/powerpoint/2010/main" val="760229672"/>
+      </p:ext>
+    </p:extLst>
+  </p:cSld>
+  <p:clrMapOvr>
+    <a:masterClrMapping/>
+  </p:clrMapOvr>
+</p:notes>
+</file>
+
+<file path=ppt/notesSlides/notesSlide17.xml><?xml version="1.0" encoding="utf-8"?>
+<p:notes xmlns:a="http://schemas.openxmlformats.org/drawingml/2006/main" xmlns:r="http://schemas.openxmlformats.org/officeDocument/2006/relationships" xmlns:p="http://schemas.openxmlformats.org/presentationml/2006/main">
+  <p:cSld>
+    <p:spTree>
+      <p:nvGrpSpPr>
+        <p:cNvPr id="1" name=""/>
+        <p:cNvGrpSpPr/>
+        <p:nvPr/>
+      </p:nvGrpSpPr>
+      <p:grpSpPr>
+        <a:xfrm>
+          <a:off x="0" y="0"/>
+          <a:ext cx="0" cy="0"/>
+          <a:chOff x="0" y="0"/>
+          <a:chExt cx="0" cy="0"/>
+        </a:xfrm>
+      </p:grpSpPr>
+      <p:sp>
+        <p:nvSpPr>
+          <p:cNvPr id="2" name="Slide Image Placeholder 1"/>
+          <p:cNvSpPr>
+            <a:spLocks noGrp="1" noRot="1" noChangeAspect="1"/>
+          </p:cNvSpPr>
+          <p:nvPr>
+            <p:ph type="sldImg"/>
+          </p:nvPr>
+        </p:nvSpPr>
+        <p:spPr/>
+      </p:sp>
+      <p:sp>
+        <p:nvSpPr>
+          <p:cNvPr id="3" name="Notes Placeholder 2"/>
+          <p:cNvSpPr>
+            <a:spLocks noGrp="1"/>
+          </p:cNvSpPr>
+          <p:nvPr>
+            <p:ph type="body" idx="1"/>
+          </p:nvPr>
+        </p:nvSpPr>
+        <p:spPr/>
+        <p:txBody>
+          <a:bodyPr/>
+          <a:lstStyle/>
+          <a:p>
+            <a:r>
+              <a:rPr lang="en-US" dirty="0" smtClean="0"/>
+              <a:t>There</a:t>
+            </a:r>
+            <a:r>
+              <a:rPr lang="en-US" baseline="0" dirty="0" smtClean="0"/>
+              <a:t> was tries with different k  number of validations, but in order to be more sure of the results of validation we decided to use 10 as the last verification value, since the relative % stabilized with this number.</a:t>
+            </a:r>
+            <a:endParaRPr lang="pt-PT" dirty="0"/>
+          </a:p>
+        </p:txBody>
+      </p:sp>
+      <p:sp>
+        <p:nvSpPr>
+          <p:cNvPr id="4" name="Slide Number Placeholder 3"/>
+          <p:cNvSpPr>
+            <a:spLocks noGrp="1"/>
+          </p:cNvSpPr>
+          <p:nvPr>
+            <p:ph type="sldNum" sz="quarter" idx="10"/>
+          </p:nvPr>
+        </p:nvSpPr>
+        <p:spPr/>
+        <p:txBody>
+          <a:bodyPr/>
+          <a:lstStyle/>
+          <a:p>
+            <a:fld id="{DE9A8645-4E47-4476-9EEF-65BED58C741A}" type="slidenum">
+              <a:rPr lang="pt-PT" smtClean="0"/>
+              <a:t>24</a:t>
+            </a:fld>
+            <a:endParaRPr lang="pt-PT"/>
+          </a:p>
+        </p:txBody>
+      </p:sp>
+    </p:spTree>
+    <p:extLst>
+      <p:ext uri="{BB962C8B-B14F-4D97-AF65-F5344CB8AC3E}">
+        <p14:creationId xmlns:p14="http://schemas.microsoft.com/office/powerpoint/2010/main" val="3862023225"/>
+      </p:ext>
+    </p:extLst>
+  </p:cSld>
+  <p:clrMapOvr>
+    <a:masterClrMapping/>
+  </p:clrMapOvr>
+</p:notes>
+</file>
+
+<file path=ppt/notesSlides/notesSlide18.xml><?xml version="1.0" encoding="utf-8"?>
+<p:notes xmlns:a="http://schemas.openxmlformats.org/drawingml/2006/main" xmlns:r="http://schemas.openxmlformats.org/officeDocument/2006/relationships" xmlns:p="http://schemas.openxmlformats.org/presentationml/2006/main">
+  <p:cSld>
+    <p:spTree>
+      <p:nvGrpSpPr>
+        <p:cNvPr id="1" name=""/>
+        <p:cNvGrpSpPr/>
+        <p:nvPr/>
+      </p:nvGrpSpPr>
+      <p:grpSpPr>
+        <a:xfrm>
+          <a:off x="0" y="0"/>
+          <a:ext cx="0" cy="0"/>
+          <a:chOff x="0" y="0"/>
+          <a:chExt cx="0" cy="0"/>
+        </a:xfrm>
+      </p:grpSpPr>
+      <p:sp>
+        <p:nvSpPr>
+          <p:cNvPr id="2" name="Slide Image Placeholder 1"/>
+          <p:cNvSpPr>
+            <a:spLocks noGrp="1" noRot="1" noChangeAspect="1"/>
+          </p:cNvSpPr>
+          <p:nvPr>
+            <p:ph type="sldImg"/>
+          </p:nvPr>
+        </p:nvSpPr>
+        <p:spPr/>
+      </p:sp>
+      <p:sp>
+        <p:nvSpPr>
+          <p:cNvPr id="3" name="Notes Placeholder 2"/>
+          <p:cNvSpPr>
+            <a:spLocks noGrp="1"/>
+          </p:cNvSpPr>
+          <p:nvPr>
+            <p:ph type="body" idx="1"/>
+          </p:nvPr>
+        </p:nvSpPr>
+        <p:spPr/>
+        <p:txBody>
+          <a:bodyPr/>
+          <a:lstStyle/>
+          <a:p>
+            <a:pPr marL="0" marR="0" indent="0" algn="l" defTabSz="914400" rtl="0" eaLnBrk="1" fontAlgn="auto" latinLnBrk="0" hangingPunct="1">
+              <a:lnSpc>
+                <a:spcPct val="100000"/>
+              </a:lnSpc>
+              <a:spcBef>
+                <a:spcPts val="0"/>
+              </a:spcBef>
+              <a:spcAft>
+                <a:spcPts val="0"/>
+              </a:spcAft>
+              <a:buClrTx/>
+              <a:buSzTx/>
+              <a:buFontTx/>
+              <a:buNone/>
+              <a:tabLst/>
+              <a:defRPr/>
+            </a:pPr>
+            <a:r>
+              <a:rPr lang="en-US" dirty="0" smtClean="0"/>
+              <a:t>There</a:t>
+            </a:r>
+            <a:r>
+              <a:rPr lang="en-US" baseline="0" dirty="0" smtClean="0"/>
+              <a:t> was tries with different k  number of validations, but in order to be more sure of the results of validation we decided to use 10 as the last verification value, since the relative % stabilized with this number.</a:t>
+            </a:r>
+            <a:endParaRPr lang="pt-PT" dirty="0" smtClean="0"/>
+          </a:p>
+          <a:p>
+            <a:endParaRPr lang="pt-PT" dirty="0"/>
+          </a:p>
+        </p:txBody>
+      </p:sp>
+      <p:sp>
+        <p:nvSpPr>
+          <p:cNvPr id="4" name="Slide Number Placeholder 3"/>
+          <p:cNvSpPr>
+            <a:spLocks noGrp="1"/>
+          </p:cNvSpPr>
+          <p:nvPr>
+            <p:ph type="sldNum" sz="quarter" idx="10"/>
+          </p:nvPr>
+        </p:nvSpPr>
+        <p:spPr/>
+        <p:txBody>
+          <a:bodyPr/>
+          <a:lstStyle/>
+          <a:p>
+            <a:fld id="{DE9A8645-4E47-4476-9EEF-65BED58C741A}" type="slidenum">
+              <a:rPr lang="pt-PT" smtClean="0"/>
+              <a:t>26</a:t>
+            </a:fld>
+            <a:endParaRPr lang="pt-PT"/>
+          </a:p>
+        </p:txBody>
+      </p:sp>
+    </p:spTree>
+    <p:extLst>
+      <p:ext uri="{BB962C8B-B14F-4D97-AF65-F5344CB8AC3E}">
+        <p14:creationId xmlns:p14="http://schemas.microsoft.com/office/powerpoint/2010/main" val="2869198184"/>
+      </p:ext>
+    </p:extLst>
+  </p:cSld>
+  <p:clrMapOvr>
+    <a:masterClrMapping/>
+  </p:clrMapOvr>
+</p:notes>
+</file>
+
+<file path=ppt/notesSlides/notesSlide19.xml><?xml version="1.0" encoding="utf-8"?>
+<p:notes xmlns:a="http://schemas.openxmlformats.org/drawingml/2006/main" xmlns:r="http://schemas.openxmlformats.org/officeDocument/2006/relationships" xmlns:p="http://schemas.openxmlformats.org/presentationml/2006/main">
+  <p:cSld>
+    <p:spTree>
+      <p:nvGrpSpPr>
+        <p:cNvPr id="1" name=""/>
+        <p:cNvGrpSpPr/>
+        <p:nvPr/>
+      </p:nvGrpSpPr>
+      <p:grpSpPr>
+        <a:xfrm>
+          <a:off x="0" y="0"/>
+          <a:ext cx="0" cy="0"/>
+          <a:chOff x="0" y="0"/>
+          <a:chExt cx="0" cy="0"/>
+        </a:xfrm>
+      </p:grpSpPr>
+      <p:sp>
+        <p:nvSpPr>
+          <p:cNvPr id="2" name="Slide Image Placeholder 1"/>
+          <p:cNvSpPr>
+            <a:spLocks noGrp="1" noRot="1" noChangeAspect="1"/>
+          </p:cNvSpPr>
+          <p:nvPr>
+            <p:ph type="sldImg"/>
+          </p:nvPr>
+        </p:nvSpPr>
+        <p:spPr/>
+      </p:sp>
+      <p:sp>
+        <p:nvSpPr>
+          <p:cNvPr id="3" name="Notes Placeholder 2"/>
+          <p:cNvSpPr>
+            <a:spLocks noGrp="1"/>
+          </p:cNvSpPr>
+          <p:nvPr>
+            <p:ph type="body" idx="1"/>
+          </p:nvPr>
+        </p:nvSpPr>
+        <p:spPr/>
+        <p:txBody>
+          <a:bodyPr/>
+          <a:lstStyle/>
+          <a:p>
+            <a:pPr marL="0" marR="0" indent="0" algn="l" defTabSz="914400" rtl="0" eaLnBrk="1" fontAlgn="auto" latinLnBrk="0" hangingPunct="1">
+              <a:lnSpc>
+                <a:spcPct val="100000"/>
+              </a:lnSpc>
+              <a:spcBef>
+                <a:spcPts val="0"/>
+              </a:spcBef>
+              <a:spcAft>
+                <a:spcPts val="0"/>
+              </a:spcAft>
+              <a:buClrTx/>
+              <a:buSzTx/>
+              <a:buFontTx/>
+              <a:buNone/>
+              <a:tabLst/>
+              <a:defRPr/>
+            </a:pPr>
+            <a:r>
+              <a:rPr lang="en-US" dirty="0" smtClean="0"/>
+              <a:t>Decision</a:t>
+            </a:r>
+            <a:r>
+              <a:rPr lang="en-US" baseline="0" dirty="0" smtClean="0"/>
+              <a:t> support model at the business side, such as specific condition accordingly to the tree tests.</a:t>
+            </a:r>
+            <a:endParaRPr lang="pt-PT" dirty="0" smtClean="0"/>
+          </a:p>
+          <a:p>
+            <a:endParaRPr lang="pt-PT" dirty="0"/>
+          </a:p>
+        </p:txBody>
+      </p:sp>
+      <p:sp>
+        <p:nvSpPr>
+          <p:cNvPr id="4" name="Slide Number Placeholder 3"/>
+          <p:cNvSpPr>
+            <a:spLocks noGrp="1"/>
+          </p:cNvSpPr>
+          <p:nvPr>
+            <p:ph type="sldNum" sz="quarter" idx="10"/>
+          </p:nvPr>
+        </p:nvSpPr>
+        <p:spPr/>
+        <p:txBody>
+          <a:bodyPr/>
+          <a:lstStyle/>
+          <a:p>
+            <a:fld id="{DE9A8645-4E47-4476-9EEF-65BED58C741A}" type="slidenum">
+              <a:rPr lang="pt-PT" smtClean="0"/>
+              <a:t>27</a:t>
+            </a:fld>
+            <a:endParaRPr lang="pt-PT"/>
+          </a:p>
+        </p:txBody>
+      </p:sp>
+    </p:spTree>
+    <p:extLst>
+      <p:ext uri="{BB962C8B-B14F-4D97-AF65-F5344CB8AC3E}">
+        <p14:creationId xmlns:p14="http://schemas.microsoft.com/office/powerpoint/2010/main" val="4265257874"/>
+      </p:ext>
+    </p:extLst>
+  </p:cSld>
+  <p:clrMapOvr>
+    <a:masterClrMapping/>
+  </p:clrMapOvr>
+</p:notes>
+</file>
+
+<file path=ppt/notesSlides/notesSlide2.xml><?xml version="1.0" encoding="utf-8"?>
+<p:notes xmlns:a="http://schemas.openxmlformats.org/drawingml/2006/main" xmlns:r="http://schemas.openxmlformats.org/officeDocument/2006/relationships" xmlns:p="http://schemas.openxmlformats.org/presentationml/2006/main">
+  <p:cSld>
+    <p:spTree>
+      <p:nvGrpSpPr>
+        <p:cNvPr id="1" name=""/>
+        <p:cNvGrpSpPr/>
+        <p:nvPr/>
+      </p:nvGrpSpPr>
+      <p:grpSpPr>
+        <a:xfrm>
+          <a:off x="0" y="0"/>
+          <a:ext cx="0" cy="0"/>
+          <a:chOff x="0" y="0"/>
+          <a:chExt cx="0" cy="0"/>
+        </a:xfrm>
+      </p:grpSpPr>
+      <p:sp>
+        <p:nvSpPr>
+          <p:cNvPr id="2" name="Slide Image Placeholder 1"/>
+          <p:cNvSpPr>
+            <a:spLocks noGrp="1" noRot="1" noChangeAspect="1"/>
+          </p:cNvSpPr>
+          <p:nvPr>
+            <p:ph type="sldImg"/>
+          </p:nvPr>
+        </p:nvSpPr>
+        <p:spPr/>
+      </p:sp>
+      <p:sp>
+        <p:nvSpPr>
+          <p:cNvPr id="3" name="Notes Placeholder 2"/>
+          <p:cNvSpPr>
+            <a:spLocks noGrp="1"/>
+          </p:cNvSpPr>
+          <p:nvPr>
+            <p:ph type="body" idx="1"/>
+          </p:nvPr>
+        </p:nvSpPr>
+        <p:spPr/>
+        <p:txBody>
+          <a:bodyPr/>
+          <a:lstStyle/>
+          <a:p>
+            <a:r>
+              <a:rPr lang="en-US" dirty="0" smtClean="0"/>
+              <a:t>Manual steps.</a:t>
+            </a:r>
+          </a:p>
+          <a:p>
+            <a:endParaRPr lang="en-US" dirty="0" smtClean="0"/>
+          </a:p>
+          <a:p>
+            <a:r>
+              <a:rPr lang="en-US" dirty="0" smtClean="0"/>
+              <a:t>Normalization</a:t>
+            </a:r>
+            <a:r>
+              <a:rPr lang="en-US" baseline="0" dirty="0" smtClean="0"/>
+              <a:t> and </a:t>
+            </a:r>
+            <a:r>
+              <a:rPr lang="pt-PT" dirty="0" smtClean="0"/>
+              <a:t>discretization</a:t>
+            </a:r>
+            <a:r>
+              <a:rPr lang="pt-PT" baseline="0" dirty="0" smtClean="0"/>
+              <a:t> (rapidminer joins) techniques were used in final steps of preparation phase.</a:t>
+            </a:r>
+          </a:p>
+          <a:p>
+            <a:endParaRPr lang="en-US" baseline="0" dirty="0" smtClean="0"/>
+          </a:p>
+          <a:p>
+            <a:r>
+              <a:rPr lang="en-US" dirty="0" smtClean="0"/>
+              <a:t>Excel</a:t>
+            </a:r>
+            <a:r>
+              <a:rPr lang="en-US" baseline="0" dirty="0" smtClean="0"/>
+              <a:t> / </a:t>
+            </a:r>
+            <a:r>
+              <a:rPr lang="en-US" baseline="0" dirty="0" err="1" smtClean="0"/>
+              <a:t>Rapidminer</a:t>
+            </a:r>
+            <a:endParaRPr lang="pt-PT" dirty="0"/>
+          </a:p>
+        </p:txBody>
+      </p:sp>
+      <p:sp>
+        <p:nvSpPr>
+          <p:cNvPr id="4" name="Slide Number Placeholder 3"/>
+          <p:cNvSpPr>
+            <a:spLocks noGrp="1"/>
+          </p:cNvSpPr>
+          <p:nvPr>
+            <p:ph type="sldNum" sz="quarter" idx="10"/>
+          </p:nvPr>
+        </p:nvSpPr>
+        <p:spPr/>
+        <p:txBody>
+          <a:bodyPr/>
+          <a:lstStyle/>
+          <a:p>
+            <a:fld id="{DE9A8645-4E47-4476-9EEF-65BED58C741A}" type="slidenum">
+              <a:rPr lang="pt-PT" smtClean="0"/>
+              <a:t>4</a:t>
+            </a:fld>
+            <a:endParaRPr lang="pt-PT"/>
+          </a:p>
+        </p:txBody>
+      </p:sp>
+    </p:spTree>
+    <p:extLst>
+      <p:ext uri="{BB962C8B-B14F-4D97-AF65-F5344CB8AC3E}">
+        <p14:creationId xmlns:p14="http://schemas.microsoft.com/office/powerpoint/2010/main" val="4081561441"/>
+      </p:ext>
+    </p:extLst>
+  </p:cSld>
+  <p:clrMapOvr>
+    <a:masterClrMapping/>
+  </p:clrMapOvr>
+</p:notes>
+</file>
+
+<file path=ppt/notesSlides/notesSlide20.xml><?xml version="1.0" encoding="utf-8"?>
+<p:notes xmlns:a="http://schemas.openxmlformats.org/drawingml/2006/main" xmlns:r="http://schemas.openxmlformats.org/officeDocument/2006/relationships" xmlns:p="http://schemas.openxmlformats.org/presentationml/2006/main">
+  <p:cSld>
+    <p:spTree>
+      <p:nvGrpSpPr>
+        <p:cNvPr id="1" name=""/>
+        <p:cNvGrpSpPr/>
+        <p:nvPr/>
+      </p:nvGrpSpPr>
+      <p:grpSpPr>
+        <a:xfrm>
+          <a:off x="0" y="0"/>
+          <a:ext cx="0" cy="0"/>
+          <a:chOff x="0" y="0"/>
+          <a:chExt cx="0" cy="0"/>
+        </a:xfrm>
+      </p:grpSpPr>
+      <p:sp>
+        <p:nvSpPr>
+          <p:cNvPr id="2" name="Slide Image Placeholder 1"/>
+          <p:cNvSpPr>
+            <a:spLocks noGrp="1" noRot="1" noChangeAspect="1"/>
+          </p:cNvSpPr>
+          <p:nvPr>
+            <p:ph type="sldImg"/>
+          </p:nvPr>
+        </p:nvSpPr>
+        <p:spPr/>
+      </p:sp>
+      <p:sp>
+        <p:nvSpPr>
+          <p:cNvPr id="3" name="Notes Placeholder 2"/>
+          <p:cNvSpPr>
+            <a:spLocks noGrp="1"/>
+          </p:cNvSpPr>
+          <p:nvPr>
+            <p:ph type="body" idx="1"/>
+          </p:nvPr>
+        </p:nvSpPr>
+        <p:spPr/>
+        <p:txBody>
+          <a:bodyPr/>
+          <a:lstStyle/>
+          <a:p>
+            <a:pPr marL="0" marR="0" indent="0" algn="l" defTabSz="914400" rtl="0" eaLnBrk="1" fontAlgn="auto" latinLnBrk="0" hangingPunct="1">
+              <a:lnSpc>
+                <a:spcPct val="100000"/>
+              </a:lnSpc>
+              <a:spcBef>
+                <a:spcPts val="0"/>
+              </a:spcBef>
+              <a:spcAft>
+                <a:spcPts val="0"/>
+              </a:spcAft>
+              <a:buClrTx/>
+              <a:buSzTx/>
+              <a:buFontTx/>
+              <a:buNone/>
+              <a:tabLst/>
+              <a:defRPr/>
+            </a:pPr>
+            <a:r>
+              <a:rPr lang="en-US" dirty="0" smtClean="0"/>
+              <a:t>There</a:t>
+            </a:r>
+            <a:r>
+              <a:rPr lang="en-US" baseline="0" dirty="0" smtClean="0"/>
+              <a:t> was tries with different k  number of validations, but in order to be more sure of the results of validation we decided to use 10 as the last verification value, since the relative % stabilized with this number.</a:t>
+            </a:r>
+            <a:endParaRPr lang="pt-PT" dirty="0" smtClean="0"/>
+          </a:p>
+          <a:p>
+            <a:endParaRPr lang="pt-PT" dirty="0"/>
+          </a:p>
+        </p:txBody>
+      </p:sp>
+      <p:sp>
+        <p:nvSpPr>
+          <p:cNvPr id="4" name="Slide Number Placeholder 3"/>
+          <p:cNvSpPr>
+            <a:spLocks noGrp="1"/>
+          </p:cNvSpPr>
+          <p:nvPr>
+            <p:ph type="sldNum" sz="quarter" idx="10"/>
+          </p:nvPr>
+        </p:nvSpPr>
+        <p:spPr/>
+        <p:txBody>
+          <a:bodyPr/>
+          <a:lstStyle/>
+          <a:p>
+            <a:fld id="{DE9A8645-4E47-4476-9EEF-65BED58C741A}" type="slidenum">
+              <a:rPr lang="pt-PT" smtClean="0"/>
+              <a:t>28</a:t>
+            </a:fld>
+            <a:endParaRPr lang="pt-PT"/>
+          </a:p>
+        </p:txBody>
+      </p:sp>
+    </p:spTree>
+    <p:extLst>
+      <p:ext uri="{BB962C8B-B14F-4D97-AF65-F5344CB8AC3E}">
+        <p14:creationId xmlns:p14="http://schemas.microsoft.com/office/powerpoint/2010/main" val="3899756660"/>
+      </p:ext>
+    </p:extLst>
+  </p:cSld>
+  <p:clrMapOvr>
+    <a:masterClrMapping/>
+  </p:clrMapOvr>
+</p:notes>
+</file>
+
+<file path=ppt/notesSlides/notesSlide21.xml><?xml version="1.0" encoding="utf-8"?>
+<p:notes xmlns:a="http://schemas.openxmlformats.org/drawingml/2006/main" xmlns:r="http://schemas.openxmlformats.org/officeDocument/2006/relationships" xmlns:p="http://schemas.openxmlformats.org/presentationml/2006/main">
+  <p:cSld>
+    <p:spTree>
+      <p:nvGrpSpPr>
+        <p:cNvPr id="1" name=""/>
+        <p:cNvGrpSpPr/>
+        <p:nvPr/>
+      </p:nvGrpSpPr>
+      <p:grpSpPr>
+        <a:xfrm>
+          <a:off x="0" y="0"/>
+          <a:ext cx="0" cy="0"/>
+          <a:chOff x="0" y="0"/>
+          <a:chExt cx="0" cy="0"/>
+        </a:xfrm>
+      </p:grpSpPr>
+      <p:sp>
+        <p:nvSpPr>
+          <p:cNvPr id="2" name="Slide Image Placeholder 1"/>
+          <p:cNvSpPr>
+            <a:spLocks noGrp="1" noRot="1" noChangeAspect="1"/>
+          </p:cNvSpPr>
+          <p:nvPr>
+            <p:ph type="sldImg"/>
+          </p:nvPr>
+        </p:nvSpPr>
+        <p:spPr/>
+      </p:sp>
+      <p:sp>
+        <p:nvSpPr>
+          <p:cNvPr id="3" name="Notes Placeholder 2"/>
+          <p:cNvSpPr>
+            <a:spLocks noGrp="1"/>
+          </p:cNvSpPr>
+          <p:nvPr>
+            <p:ph type="body" idx="1"/>
+          </p:nvPr>
+        </p:nvSpPr>
+        <p:spPr/>
+        <p:txBody>
+          <a:bodyPr/>
+          <a:lstStyle/>
+          <a:p>
+            <a:pPr marL="0" marR="0" indent="0" algn="l" defTabSz="914400" rtl="0" eaLnBrk="1" fontAlgn="auto" latinLnBrk="0" hangingPunct="1">
+              <a:lnSpc>
+                <a:spcPct val="100000"/>
+              </a:lnSpc>
+              <a:spcBef>
+                <a:spcPts val="0"/>
+              </a:spcBef>
+              <a:spcAft>
+                <a:spcPts val="0"/>
+              </a:spcAft>
+              <a:buClrTx/>
+              <a:buSzTx/>
+              <a:buFontTx/>
+              <a:buNone/>
+              <a:tabLst/>
+              <a:defRPr/>
+            </a:pPr>
+            <a:r>
+              <a:rPr lang="en-US" dirty="0" smtClean="0"/>
+              <a:t>Decision</a:t>
+            </a:r>
+            <a:r>
+              <a:rPr lang="en-US" baseline="0" dirty="0" smtClean="0"/>
+              <a:t> support model at the business side, such as specific condition accordingly to the predicted results given on each test. (for example in new clients)</a:t>
+            </a:r>
+            <a:endParaRPr lang="pt-PT" dirty="0" smtClean="0"/>
+          </a:p>
+          <a:p>
+            <a:endParaRPr lang="pt-PT" dirty="0"/>
+          </a:p>
+        </p:txBody>
+      </p:sp>
+      <p:sp>
+        <p:nvSpPr>
+          <p:cNvPr id="4" name="Slide Number Placeholder 3"/>
+          <p:cNvSpPr>
+            <a:spLocks noGrp="1"/>
+          </p:cNvSpPr>
+          <p:nvPr>
+            <p:ph type="sldNum" sz="quarter" idx="10"/>
+          </p:nvPr>
+        </p:nvSpPr>
+        <p:spPr/>
+        <p:txBody>
+          <a:bodyPr/>
+          <a:lstStyle/>
+          <a:p>
+            <a:fld id="{DE9A8645-4E47-4476-9EEF-65BED58C741A}" type="slidenum">
+              <a:rPr lang="pt-PT" smtClean="0"/>
+              <a:t>29</a:t>
+            </a:fld>
+            <a:endParaRPr lang="pt-PT"/>
+          </a:p>
+        </p:txBody>
+      </p:sp>
+    </p:spTree>
+    <p:extLst>
+      <p:ext uri="{BB962C8B-B14F-4D97-AF65-F5344CB8AC3E}">
+        <p14:creationId xmlns:p14="http://schemas.microsoft.com/office/powerpoint/2010/main" val="789521590"/>
+      </p:ext>
+    </p:extLst>
+  </p:cSld>
+  <p:clrMapOvr>
+    <a:masterClrMapping/>
+  </p:clrMapOvr>
+</p:notes>
+</file>
+
+<file path=ppt/notesSlides/notesSlide22.xml><?xml version="1.0" encoding="utf-8"?>
+<p:notes xmlns:a="http://schemas.openxmlformats.org/drawingml/2006/main" xmlns:r="http://schemas.openxmlformats.org/officeDocument/2006/relationships" xmlns:p="http://schemas.openxmlformats.org/presentationml/2006/main">
+  <p:cSld>
+    <p:spTree>
+      <p:nvGrpSpPr>
+        <p:cNvPr id="1" name=""/>
+        <p:cNvGrpSpPr/>
+        <p:nvPr/>
+      </p:nvGrpSpPr>
+      <p:grpSpPr>
+        <a:xfrm>
+          <a:off x="0" y="0"/>
+          <a:ext cx="0" cy="0"/>
+          <a:chOff x="0" y="0"/>
+          <a:chExt cx="0" cy="0"/>
+        </a:xfrm>
+      </p:grpSpPr>
+      <p:sp>
+        <p:nvSpPr>
+          <p:cNvPr id="2" name="Slide Image Placeholder 1"/>
+          <p:cNvSpPr>
+            <a:spLocks noGrp="1" noRot="1" noChangeAspect="1"/>
+          </p:cNvSpPr>
+          <p:nvPr>
+            <p:ph type="sldImg"/>
+          </p:nvPr>
+        </p:nvSpPr>
+        <p:spPr/>
+      </p:sp>
+      <p:sp>
+        <p:nvSpPr>
+          <p:cNvPr id="3" name="Notes Placeholder 2"/>
+          <p:cNvSpPr>
+            <a:spLocks noGrp="1"/>
+          </p:cNvSpPr>
+          <p:nvPr>
+            <p:ph type="body" idx="1"/>
+          </p:nvPr>
+        </p:nvSpPr>
+        <p:spPr/>
+        <p:txBody>
+          <a:bodyPr/>
+          <a:lstStyle/>
+          <a:p>
+            <a:pPr marL="0" marR="0" indent="0" algn="l" defTabSz="914400" rtl="0" eaLnBrk="1" fontAlgn="auto" latinLnBrk="0" hangingPunct="1">
+              <a:lnSpc>
+                <a:spcPct val="100000"/>
+              </a:lnSpc>
+              <a:spcBef>
+                <a:spcPts val="0"/>
+              </a:spcBef>
+              <a:spcAft>
+                <a:spcPts val="0"/>
+              </a:spcAft>
+              <a:buClrTx/>
+              <a:buSzTx/>
+              <a:buFontTx/>
+              <a:buNone/>
+              <a:tabLst/>
+              <a:defRPr/>
+            </a:pPr>
+            <a:r>
+              <a:rPr lang="en-US" dirty="0" smtClean="0"/>
+              <a:t>There</a:t>
+            </a:r>
+            <a:r>
+              <a:rPr lang="en-US" baseline="0" dirty="0" smtClean="0"/>
+              <a:t> was tries with different k  number of validations, but in order to be more sure of the results of validation we decided to use 10 as the last verification value, since the relative % stabilized with this number.</a:t>
+            </a:r>
+            <a:endParaRPr lang="pt-PT" dirty="0" smtClean="0"/>
+          </a:p>
+          <a:p>
+            <a:endParaRPr lang="pt-PT" dirty="0"/>
+          </a:p>
+        </p:txBody>
+      </p:sp>
+      <p:sp>
+        <p:nvSpPr>
+          <p:cNvPr id="4" name="Slide Number Placeholder 3"/>
+          <p:cNvSpPr>
+            <a:spLocks noGrp="1"/>
+          </p:cNvSpPr>
+          <p:nvPr>
+            <p:ph type="sldNum" sz="quarter" idx="10"/>
+          </p:nvPr>
+        </p:nvSpPr>
+        <p:spPr/>
+        <p:txBody>
+          <a:bodyPr/>
+          <a:lstStyle/>
+          <a:p>
+            <a:fld id="{DE9A8645-4E47-4476-9EEF-65BED58C741A}" type="slidenum">
+              <a:rPr lang="pt-PT" smtClean="0"/>
+              <a:t>30</a:t>
+            </a:fld>
+            <a:endParaRPr lang="pt-PT"/>
+          </a:p>
+        </p:txBody>
+      </p:sp>
+    </p:spTree>
+    <p:extLst>
+      <p:ext uri="{BB962C8B-B14F-4D97-AF65-F5344CB8AC3E}">
+        <p14:creationId xmlns:p14="http://schemas.microsoft.com/office/powerpoint/2010/main" val="772709227"/>
+      </p:ext>
+    </p:extLst>
+  </p:cSld>
+  <p:clrMapOvr>
+    <a:masterClrMapping/>
+  </p:clrMapOvr>
+</p:notes>
+</file>
+
+<file path=ppt/notesSlides/notesSlide23.xml><?xml version="1.0" encoding="utf-8"?>
+<p:notes xmlns:a="http://schemas.openxmlformats.org/drawingml/2006/main" xmlns:r="http://schemas.openxmlformats.org/officeDocument/2006/relationships" xmlns:p="http://schemas.openxmlformats.org/presentationml/2006/main">
+  <p:cSld>
+    <p:spTree>
+      <p:nvGrpSpPr>
+        <p:cNvPr id="1" name=""/>
+        <p:cNvGrpSpPr/>
+        <p:nvPr/>
+      </p:nvGrpSpPr>
+      <p:grpSpPr>
+        <a:xfrm>
+          <a:off x="0" y="0"/>
+          <a:ext cx="0" cy="0"/>
+          <a:chOff x="0" y="0"/>
+          <a:chExt cx="0" cy="0"/>
+        </a:xfrm>
+      </p:grpSpPr>
+      <p:sp>
+        <p:nvSpPr>
+          <p:cNvPr id="2" name="Slide Image Placeholder 1"/>
+          <p:cNvSpPr>
+            <a:spLocks noGrp="1" noRot="1" noChangeAspect="1"/>
+          </p:cNvSpPr>
+          <p:nvPr>
+            <p:ph type="sldImg"/>
+          </p:nvPr>
+        </p:nvSpPr>
+        <p:spPr/>
+      </p:sp>
+      <p:sp>
+        <p:nvSpPr>
+          <p:cNvPr id="3" name="Notes Placeholder 2"/>
+          <p:cNvSpPr>
+            <a:spLocks noGrp="1"/>
+          </p:cNvSpPr>
+          <p:nvPr>
+            <p:ph type="body" idx="1"/>
+          </p:nvPr>
+        </p:nvSpPr>
+        <p:spPr/>
+        <p:txBody>
+          <a:bodyPr/>
+          <a:lstStyle/>
+          <a:p>
+            <a:pPr marL="0" marR="0" indent="0" algn="l" defTabSz="914400" rtl="0" eaLnBrk="1" fontAlgn="auto" latinLnBrk="0" hangingPunct="1">
+              <a:lnSpc>
+                <a:spcPct val="100000"/>
+              </a:lnSpc>
+              <a:spcBef>
+                <a:spcPts val="0"/>
+              </a:spcBef>
+              <a:spcAft>
+                <a:spcPts val="0"/>
+              </a:spcAft>
+              <a:buClrTx/>
+              <a:buSzTx/>
+              <a:buFontTx/>
+              <a:buNone/>
+              <a:tabLst/>
+              <a:defRPr/>
+            </a:pPr>
+            <a:r>
+              <a:rPr lang="en-US" dirty="0" smtClean="0"/>
+              <a:t>Decision</a:t>
+            </a:r>
+            <a:r>
+              <a:rPr lang="en-US" baseline="0" dirty="0" smtClean="0"/>
+              <a:t> support model at the business side, such as specific condition accordingly to the predicted results given on each test. (for example in new clients)</a:t>
+            </a:r>
+            <a:endParaRPr lang="pt-PT" dirty="0" smtClean="0"/>
+          </a:p>
+          <a:p>
+            <a:endParaRPr lang="pt-PT" dirty="0"/>
+          </a:p>
+        </p:txBody>
+      </p:sp>
+      <p:sp>
+        <p:nvSpPr>
+          <p:cNvPr id="4" name="Slide Number Placeholder 3"/>
+          <p:cNvSpPr>
+            <a:spLocks noGrp="1"/>
+          </p:cNvSpPr>
+          <p:nvPr>
+            <p:ph type="sldNum" sz="quarter" idx="10"/>
+          </p:nvPr>
+        </p:nvSpPr>
+        <p:spPr/>
+        <p:txBody>
+          <a:bodyPr/>
+          <a:lstStyle/>
+          <a:p>
+            <a:fld id="{DE9A8645-4E47-4476-9EEF-65BED58C741A}" type="slidenum">
+              <a:rPr lang="pt-PT" smtClean="0"/>
+              <a:t>31</a:t>
+            </a:fld>
+            <a:endParaRPr lang="pt-PT"/>
+          </a:p>
+        </p:txBody>
+      </p:sp>
+    </p:spTree>
+    <p:extLst>
+      <p:ext uri="{BB962C8B-B14F-4D97-AF65-F5344CB8AC3E}">
+        <p14:creationId xmlns:p14="http://schemas.microsoft.com/office/powerpoint/2010/main" val="837555839"/>
+      </p:ext>
+    </p:extLst>
+  </p:cSld>
+  <p:clrMapOvr>
+    <a:masterClrMapping/>
+  </p:clrMapOvr>
+</p:notes>
+</file>
+
+<file path=ppt/notesSlides/notesSlide24.xml><?xml version="1.0" encoding="utf-8"?>
+<p:notes xmlns:a="http://schemas.openxmlformats.org/drawingml/2006/main" xmlns:r="http://schemas.openxmlformats.org/officeDocument/2006/relationships" xmlns:p="http://schemas.openxmlformats.org/presentationml/2006/main">
+  <p:cSld>
+    <p:spTree>
+      <p:nvGrpSpPr>
+        <p:cNvPr id="1" name=""/>
+        <p:cNvGrpSpPr/>
+        <p:nvPr/>
+      </p:nvGrpSpPr>
+      <p:grpSpPr>
+        <a:xfrm>
+          <a:off x="0" y="0"/>
+          <a:ext cx="0" cy="0"/>
+          <a:chOff x="0" y="0"/>
+          <a:chExt cx="0" cy="0"/>
+        </a:xfrm>
+      </p:grpSpPr>
+      <p:sp>
+        <p:nvSpPr>
+          <p:cNvPr id="2" name="Slide Image Placeholder 1"/>
+          <p:cNvSpPr>
+            <a:spLocks noGrp="1" noRot="1" noChangeAspect="1"/>
+          </p:cNvSpPr>
+          <p:nvPr>
+            <p:ph type="sldImg"/>
+          </p:nvPr>
+        </p:nvSpPr>
+        <p:spPr/>
+      </p:sp>
+      <p:sp>
+        <p:nvSpPr>
+          <p:cNvPr id="3" name="Notes Placeholder 2"/>
+          <p:cNvSpPr>
+            <a:spLocks noGrp="1"/>
+          </p:cNvSpPr>
+          <p:nvPr>
+            <p:ph type="body" idx="1"/>
+          </p:nvPr>
+        </p:nvSpPr>
+        <p:spPr/>
+        <p:txBody>
+          <a:bodyPr/>
+          <a:lstStyle/>
+          <a:p>
+            <a:pPr marL="0" marR="0" indent="0" algn="l" defTabSz="914400" rtl="0" eaLnBrk="1" fontAlgn="auto" latinLnBrk="0" hangingPunct="1">
+              <a:lnSpc>
+                <a:spcPct val="100000"/>
+              </a:lnSpc>
+              <a:spcBef>
+                <a:spcPts val="0"/>
+              </a:spcBef>
+              <a:spcAft>
+                <a:spcPts val="0"/>
+              </a:spcAft>
+              <a:buClrTx/>
+              <a:buSzTx/>
+              <a:buFontTx/>
+              <a:buNone/>
+              <a:tabLst/>
+              <a:defRPr/>
+            </a:pPr>
+            <a:r>
+              <a:rPr lang="en-US" dirty="0" smtClean="0"/>
+              <a:t>There</a:t>
+            </a:r>
+            <a:r>
+              <a:rPr lang="en-US" baseline="0" dirty="0" smtClean="0"/>
+              <a:t> was tries with different k  number of validations, but in order to be more sure of the results of validation we decided to use 10 as the last verification value, since the relative % stabilized with this number.</a:t>
+            </a:r>
+            <a:endParaRPr lang="pt-PT" dirty="0" smtClean="0"/>
+          </a:p>
+          <a:p>
+            <a:endParaRPr lang="pt-PT" dirty="0"/>
+          </a:p>
+        </p:txBody>
+      </p:sp>
+      <p:sp>
+        <p:nvSpPr>
+          <p:cNvPr id="4" name="Slide Number Placeholder 3"/>
+          <p:cNvSpPr>
+            <a:spLocks noGrp="1"/>
+          </p:cNvSpPr>
+          <p:nvPr>
+            <p:ph type="sldNum" sz="quarter" idx="10"/>
+          </p:nvPr>
+        </p:nvSpPr>
+        <p:spPr/>
+        <p:txBody>
+          <a:bodyPr/>
+          <a:lstStyle/>
+          <a:p>
+            <a:fld id="{DE9A8645-4E47-4476-9EEF-65BED58C741A}" type="slidenum">
+              <a:rPr lang="pt-PT" smtClean="0"/>
+              <a:t>32</a:t>
+            </a:fld>
+            <a:endParaRPr lang="pt-PT"/>
+          </a:p>
+        </p:txBody>
+      </p:sp>
+    </p:spTree>
+    <p:extLst>
+      <p:ext uri="{BB962C8B-B14F-4D97-AF65-F5344CB8AC3E}">
+        <p14:creationId xmlns:p14="http://schemas.microsoft.com/office/powerpoint/2010/main" val="316955308"/>
+      </p:ext>
+    </p:extLst>
+  </p:cSld>
+  <p:clrMapOvr>
+    <a:masterClrMapping/>
+  </p:clrMapOvr>
+</p:notes>
+</file>
+
+<file path=ppt/notesSlides/notesSlide25.xml><?xml version="1.0" encoding="utf-8"?>
+<p:notes xmlns:a="http://schemas.openxmlformats.org/drawingml/2006/main" xmlns:r="http://schemas.openxmlformats.org/officeDocument/2006/relationships" xmlns:p="http://schemas.openxmlformats.org/presentationml/2006/main">
+  <p:cSld>
+    <p:spTree>
+      <p:nvGrpSpPr>
+        <p:cNvPr id="1" name=""/>
+        <p:cNvGrpSpPr/>
+        <p:nvPr/>
+      </p:nvGrpSpPr>
+      <p:grpSpPr>
+        <a:xfrm>
+          <a:off x="0" y="0"/>
+          <a:ext cx="0" cy="0"/>
+          <a:chOff x="0" y="0"/>
+          <a:chExt cx="0" cy="0"/>
+        </a:xfrm>
+      </p:grpSpPr>
+      <p:sp>
+        <p:nvSpPr>
+          <p:cNvPr id="2" name="Slide Image Placeholder 1"/>
+          <p:cNvSpPr>
+            <a:spLocks noGrp="1" noRot="1" noChangeAspect="1"/>
+          </p:cNvSpPr>
+          <p:nvPr>
+            <p:ph type="sldImg"/>
+          </p:nvPr>
+        </p:nvSpPr>
+        <p:spPr/>
+      </p:sp>
+      <p:sp>
+        <p:nvSpPr>
+          <p:cNvPr id="3" name="Notes Placeholder 2"/>
+          <p:cNvSpPr>
+            <a:spLocks noGrp="1"/>
+          </p:cNvSpPr>
+          <p:nvPr>
+            <p:ph type="body" idx="1"/>
+          </p:nvPr>
+        </p:nvSpPr>
+        <p:spPr/>
+        <p:txBody>
+          <a:bodyPr/>
+          <a:lstStyle/>
+          <a:p>
+            <a:r>
+              <a:rPr lang="en-US" dirty="0" smtClean="0"/>
+              <a:t>As conclusions:</a:t>
+            </a:r>
+          </a:p>
+          <a:p>
+            <a:pPr marL="171450" indent="-171450">
+              <a:buFont typeface="Arial" panose="020B0604020202020204" pitchFamily="34" charset="0"/>
+              <a:buChar char="•"/>
+            </a:pPr>
+            <a:r>
+              <a:rPr lang="en-US" dirty="0" smtClean="0"/>
+              <a:t>Results obtained are generally good for taking data-driven decisions, but consider that this data is old,</a:t>
+            </a:r>
+            <a:r>
+              <a:rPr lang="en-US" baseline="0" dirty="0" smtClean="0"/>
+              <a:t> so the predictions very possibly are not useful today. -&gt; Get new data, get a whole new version of DM and PM.</a:t>
+            </a:r>
+          </a:p>
+          <a:p>
+            <a:pPr marL="171450" indent="-171450">
+              <a:buFont typeface="Arial" panose="020B0604020202020204" pitchFamily="34" charset="0"/>
+              <a:buChar char="•"/>
+            </a:pPr>
+            <a:r>
+              <a:rPr lang="en-US" baseline="0" dirty="0" smtClean="0"/>
+              <a:t>Maybe use association rules and regression techniques as a complement to the clusters in DM.</a:t>
+            </a:r>
+          </a:p>
+          <a:p>
+            <a:pPr marL="171450" indent="-171450">
+              <a:buFont typeface="Arial" panose="020B0604020202020204" pitchFamily="34" charset="0"/>
+              <a:buChar char="•"/>
+            </a:pPr>
+            <a:r>
+              <a:rPr lang="en-US" baseline="0" dirty="0" smtClean="0"/>
+              <a:t>Refinement of the algorithms used with real market tests with small impact but enough to validate them.</a:t>
+            </a:r>
+          </a:p>
+          <a:p>
+            <a:pPr marL="171450" indent="-171450">
+              <a:buFont typeface="Arial" panose="020B0604020202020204" pitchFamily="34" charset="0"/>
+              <a:buChar char="•"/>
+            </a:pPr>
+            <a:r>
+              <a:rPr lang="en-US" baseline="0" dirty="0" smtClean="0"/>
+              <a:t>Select the best of the results only, since some models that give similar results can be simply throw away. (3 trees saying the same is the same as one)</a:t>
+            </a:r>
+          </a:p>
+          <a:p>
+            <a:pPr marL="171450" indent="-171450">
+              <a:buFont typeface="Arial" panose="020B0604020202020204" pitchFamily="34" charset="0"/>
+              <a:buChar char="•"/>
+            </a:pPr>
+            <a:r>
+              <a:rPr lang="en-US" baseline="0" dirty="0" smtClean="0"/>
+              <a:t>Try new methods and methodologies like ensemble methods for predicting.</a:t>
+            </a:r>
+          </a:p>
+          <a:p>
+            <a:pPr marL="171450" indent="-171450">
+              <a:buFont typeface="Arial" panose="020B0604020202020204" pitchFamily="34" charset="0"/>
+              <a:buChar char="•"/>
+            </a:pPr>
+            <a:endParaRPr lang="en-US" baseline="0" dirty="0" smtClean="0"/>
+          </a:p>
+          <a:p>
+            <a:endParaRPr lang="en-US" baseline="0" dirty="0" smtClean="0"/>
+          </a:p>
+          <a:p>
+            <a:endParaRPr lang="pt-PT" dirty="0"/>
+          </a:p>
+        </p:txBody>
+      </p:sp>
+      <p:sp>
+        <p:nvSpPr>
+          <p:cNvPr id="4" name="Slide Number Placeholder 3"/>
+          <p:cNvSpPr>
+            <a:spLocks noGrp="1"/>
+          </p:cNvSpPr>
+          <p:nvPr>
+            <p:ph type="sldNum" sz="quarter" idx="10"/>
+          </p:nvPr>
+        </p:nvSpPr>
+        <p:spPr/>
+        <p:txBody>
+          <a:bodyPr/>
+          <a:lstStyle/>
+          <a:p>
+            <a:fld id="{DE9A8645-4E47-4476-9EEF-65BED58C741A}" type="slidenum">
+              <a:rPr lang="pt-PT" smtClean="0"/>
+              <a:t>33</a:t>
+            </a:fld>
+            <a:endParaRPr lang="pt-PT"/>
+          </a:p>
+        </p:txBody>
+      </p:sp>
+    </p:spTree>
+    <p:extLst>
+      <p:ext uri="{BB962C8B-B14F-4D97-AF65-F5344CB8AC3E}">
+        <p14:creationId xmlns:p14="http://schemas.microsoft.com/office/powerpoint/2010/main" val="1145658826"/>
+      </p:ext>
+    </p:extLst>
+  </p:cSld>
+  <p:clrMapOvr>
+    <a:masterClrMapping/>
+  </p:clrMapOvr>
+</p:notes>
+</file>
+
+<file path=ppt/notesSlides/notesSlide3.xml><?xml version="1.0" encoding="utf-8"?>
+<p:notes xmlns:a="http://schemas.openxmlformats.org/drawingml/2006/main" xmlns:r="http://schemas.openxmlformats.org/officeDocument/2006/relationships" xmlns:p="http://schemas.openxmlformats.org/presentationml/2006/main">
+  <p:cSld>
+    <p:spTree>
+      <p:nvGrpSpPr>
+        <p:cNvPr id="1" name=""/>
+        <p:cNvGrpSpPr/>
+        <p:nvPr/>
+      </p:nvGrpSpPr>
+      <p:grpSpPr>
+        <a:xfrm>
+          <a:off x="0" y="0"/>
+          <a:ext cx="0" cy="0"/>
+          <a:chOff x="0" y="0"/>
+          <a:chExt cx="0" cy="0"/>
+        </a:xfrm>
+      </p:grpSpPr>
+      <p:sp>
+        <p:nvSpPr>
+          <p:cNvPr id="2" name="Slide Image Placeholder 1"/>
+          <p:cNvSpPr>
+            <a:spLocks noGrp="1" noRot="1" noChangeAspect="1"/>
+          </p:cNvSpPr>
+          <p:nvPr>
+            <p:ph type="sldImg"/>
+          </p:nvPr>
+        </p:nvSpPr>
+        <p:spPr/>
+      </p:sp>
+      <p:sp>
+        <p:nvSpPr>
+          <p:cNvPr id="3" name="Notes Placeholder 2"/>
+          <p:cNvSpPr>
+            <a:spLocks noGrp="1"/>
+          </p:cNvSpPr>
+          <p:nvPr>
+            <p:ph type="body" idx="1"/>
+          </p:nvPr>
+        </p:nvSpPr>
+        <p:spPr/>
+        <p:txBody>
+          <a:bodyPr/>
+          <a:lstStyle/>
+          <a:p>
+            <a:r>
+              <a:rPr lang="en-US" dirty="0" smtClean="0"/>
+              <a:t>EDA</a:t>
+            </a:r>
+            <a:r>
+              <a:rPr lang="en-US" baseline="0" dirty="0" smtClean="0"/>
+              <a:t> – exploratory data analysis using charts and statistical rules</a:t>
+            </a:r>
+          </a:p>
+          <a:p>
+            <a:endParaRPr lang="en-US" baseline="0" dirty="0" smtClean="0"/>
+          </a:p>
+          <a:p>
+            <a:r>
+              <a:rPr lang="en-US" baseline="0" dirty="0" smtClean="0"/>
+              <a:t>Clustering and association rules.</a:t>
+            </a:r>
+          </a:p>
+          <a:p>
+            <a:endParaRPr lang="en-US" baseline="0" dirty="0" smtClean="0"/>
+          </a:p>
+          <a:p>
+            <a:r>
+              <a:rPr lang="en-US" baseline="0" dirty="0" err="1" smtClean="0"/>
+              <a:t>Rapidminer</a:t>
+            </a:r>
+            <a:r>
+              <a:rPr lang="en-US" baseline="0" dirty="0" smtClean="0"/>
+              <a:t> and Excel</a:t>
+            </a:r>
+            <a:endParaRPr lang="pt-PT" dirty="0"/>
+          </a:p>
+        </p:txBody>
+      </p:sp>
+      <p:sp>
+        <p:nvSpPr>
+          <p:cNvPr id="4" name="Slide Number Placeholder 3"/>
+          <p:cNvSpPr>
+            <a:spLocks noGrp="1"/>
+          </p:cNvSpPr>
+          <p:nvPr>
+            <p:ph type="sldNum" sz="quarter" idx="10"/>
+          </p:nvPr>
+        </p:nvSpPr>
+        <p:spPr/>
+        <p:txBody>
+          <a:bodyPr/>
+          <a:lstStyle/>
+          <a:p>
+            <a:fld id="{DE9A8645-4E47-4476-9EEF-65BED58C741A}" type="slidenum">
+              <a:rPr lang="pt-PT" smtClean="0"/>
+              <a:t>5</a:t>
+            </a:fld>
+            <a:endParaRPr lang="pt-PT"/>
+          </a:p>
+        </p:txBody>
+      </p:sp>
+    </p:spTree>
+    <p:extLst>
+      <p:ext uri="{BB962C8B-B14F-4D97-AF65-F5344CB8AC3E}">
+        <p14:creationId xmlns:p14="http://schemas.microsoft.com/office/powerpoint/2010/main" val="416504059"/>
+      </p:ext>
+    </p:extLst>
+  </p:cSld>
+  <p:clrMapOvr>
+    <a:masterClrMapping/>
+  </p:clrMapOvr>
+</p:notes>
+</file>
+
+<file path=ppt/notesSlides/notesSlide4.xml><?xml version="1.0" encoding="utf-8"?>
+<p:notes xmlns:a="http://schemas.openxmlformats.org/drawingml/2006/main" xmlns:r="http://schemas.openxmlformats.org/officeDocument/2006/relationships" xmlns:p="http://schemas.openxmlformats.org/presentationml/2006/main">
+  <p:cSld>
+    <p:spTree>
+      <p:nvGrpSpPr>
+        <p:cNvPr id="1" name=""/>
+        <p:cNvGrpSpPr/>
+        <p:nvPr/>
+      </p:nvGrpSpPr>
+      <p:grpSpPr>
+        <a:xfrm>
+          <a:off x="0" y="0"/>
+          <a:ext cx="0" cy="0"/>
+          <a:chOff x="0" y="0"/>
+          <a:chExt cx="0" cy="0"/>
+        </a:xfrm>
+      </p:grpSpPr>
+      <p:sp>
+        <p:nvSpPr>
+          <p:cNvPr id="2" name="Slide Image Placeholder 1"/>
+          <p:cNvSpPr>
+            <a:spLocks noGrp="1" noRot="1" noChangeAspect="1"/>
+          </p:cNvSpPr>
+          <p:nvPr>
+            <p:ph type="sldImg"/>
+          </p:nvPr>
+        </p:nvSpPr>
+        <p:spPr/>
+      </p:sp>
+      <p:sp>
+        <p:nvSpPr>
+          <p:cNvPr id="3" name="Notes Placeholder 2"/>
+          <p:cNvSpPr>
+            <a:spLocks noGrp="1"/>
+          </p:cNvSpPr>
+          <p:nvPr>
+            <p:ph type="body" idx="1"/>
+          </p:nvPr>
+        </p:nvSpPr>
+        <p:spPr/>
+        <p:txBody>
+          <a:bodyPr/>
+          <a:lstStyle/>
+          <a:p>
+            <a:r>
+              <a:rPr lang="en-US" dirty="0" smtClean="0"/>
+              <a:t>This is good for data mining proposes since we got a good distribution (no bias). An we can see that different districts have normally different salaries</a:t>
+            </a:r>
+            <a:r>
+              <a:rPr lang="en-US" baseline="0" dirty="0" smtClean="0"/>
+              <a:t> associated.</a:t>
+            </a:r>
+            <a:endParaRPr lang="pt-PT" dirty="0"/>
+          </a:p>
+        </p:txBody>
+      </p:sp>
+      <p:sp>
+        <p:nvSpPr>
+          <p:cNvPr id="4" name="Slide Number Placeholder 3"/>
+          <p:cNvSpPr>
+            <a:spLocks noGrp="1"/>
+          </p:cNvSpPr>
+          <p:nvPr>
+            <p:ph type="sldNum" sz="quarter" idx="10"/>
+          </p:nvPr>
+        </p:nvSpPr>
+        <p:spPr/>
+        <p:txBody>
+          <a:bodyPr/>
+          <a:lstStyle/>
+          <a:p>
+            <a:fld id="{DE9A8645-4E47-4476-9EEF-65BED58C741A}" type="slidenum">
+              <a:rPr lang="pt-PT" smtClean="0"/>
+              <a:t>6</a:t>
+            </a:fld>
+            <a:endParaRPr lang="pt-PT"/>
+          </a:p>
+        </p:txBody>
+      </p:sp>
+    </p:spTree>
+    <p:extLst>
+      <p:ext uri="{BB962C8B-B14F-4D97-AF65-F5344CB8AC3E}">
+        <p14:creationId xmlns:p14="http://schemas.microsoft.com/office/powerpoint/2010/main" val="1400993205"/>
+      </p:ext>
+    </p:extLst>
+  </p:cSld>
+  <p:clrMapOvr>
+    <a:masterClrMapping/>
+  </p:clrMapOvr>
+</p:notes>
+</file>
+
+<file path=ppt/notesSlides/notesSlide5.xml><?xml version="1.0" encoding="utf-8"?>
+<p:notes xmlns:a="http://schemas.openxmlformats.org/drawingml/2006/main" xmlns:r="http://schemas.openxmlformats.org/officeDocument/2006/relationships" xmlns:p="http://schemas.openxmlformats.org/presentationml/2006/main">
+  <p:cSld>
+    <p:spTree>
+      <p:nvGrpSpPr>
+        <p:cNvPr id="1" name=""/>
+        <p:cNvGrpSpPr/>
+        <p:nvPr/>
+      </p:nvGrpSpPr>
+      <p:grpSpPr>
+        <a:xfrm>
+          <a:off x="0" y="0"/>
+          <a:ext cx="0" cy="0"/>
+          <a:chOff x="0" y="0"/>
+          <a:chExt cx="0" cy="0"/>
+        </a:xfrm>
+      </p:grpSpPr>
+      <p:sp>
+        <p:nvSpPr>
+          <p:cNvPr id="2" name="Slide Image Placeholder 1"/>
+          <p:cNvSpPr>
+            <a:spLocks noGrp="1" noRot="1" noChangeAspect="1"/>
+          </p:cNvSpPr>
+          <p:nvPr>
+            <p:ph type="sldImg"/>
+          </p:nvPr>
+        </p:nvSpPr>
+        <p:spPr/>
+      </p:sp>
+      <p:sp>
+        <p:nvSpPr>
+          <p:cNvPr id="3" name="Notes Placeholder 2"/>
+          <p:cNvSpPr>
+            <a:spLocks noGrp="1"/>
+          </p:cNvSpPr>
+          <p:nvPr>
+            <p:ph type="body" idx="1"/>
+          </p:nvPr>
+        </p:nvSpPr>
+        <p:spPr/>
+        <p:txBody>
+          <a:bodyPr/>
+          <a:lstStyle/>
+          <a:p>
+            <a:r>
+              <a:rPr lang="en-US" dirty="0" smtClean="0"/>
+              <a:t>Once again we got</a:t>
+            </a:r>
+            <a:r>
+              <a:rPr lang="en-US" baseline="0" dirty="0" smtClean="0"/>
+              <a:t> no bias, with an similar population rate between all regions.</a:t>
+            </a:r>
+            <a:endParaRPr lang="pt-PT" dirty="0"/>
+          </a:p>
+        </p:txBody>
+      </p:sp>
+      <p:sp>
+        <p:nvSpPr>
+          <p:cNvPr id="4" name="Slide Number Placeholder 3"/>
+          <p:cNvSpPr>
+            <a:spLocks noGrp="1"/>
+          </p:cNvSpPr>
+          <p:nvPr>
+            <p:ph type="sldNum" sz="quarter" idx="10"/>
+          </p:nvPr>
+        </p:nvSpPr>
+        <p:spPr/>
+        <p:txBody>
+          <a:bodyPr/>
+          <a:lstStyle/>
+          <a:p>
+            <a:fld id="{DE9A8645-4E47-4476-9EEF-65BED58C741A}" type="slidenum">
+              <a:rPr lang="pt-PT" smtClean="0"/>
+              <a:t>7</a:t>
+            </a:fld>
+            <a:endParaRPr lang="pt-PT"/>
+          </a:p>
+        </p:txBody>
+      </p:sp>
+    </p:spTree>
+    <p:extLst>
+      <p:ext uri="{BB962C8B-B14F-4D97-AF65-F5344CB8AC3E}">
+        <p14:creationId xmlns:p14="http://schemas.microsoft.com/office/powerpoint/2010/main" val="1003097855"/>
+      </p:ext>
+    </p:extLst>
+  </p:cSld>
+  <p:clrMapOvr>
+    <a:masterClrMapping/>
+  </p:clrMapOvr>
+</p:notes>
+</file>
+
+<file path=ppt/notesSlides/notesSlide6.xml><?xml version="1.0" encoding="utf-8"?>
+<p:notes xmlns:a="http://schemas.openxmlformats.org/drawingml/2006/main" xmlns:r="http://schemas.openxmlformats.org/officeDocument/2006/relationships" xmlns:p="http://schemas.openxmlformats.org/presentationml/2006/main">
+  <p:cSld>
+    <p:spTree>
+      <p:nvGrpSpPr>
+        <p:cNvPr id="1" name=""/>
+        <p:cNvGrpSpPr/>
+        <p:nvPr/>
+      </p:nvGrpSpPr>
+      <p:grpSpPr>
+        <a:xfrm>
+          <a:off x="0" y="0"/>
+          <a:ext cx="0" cy="0"/>
+          <a:chOff x="0" y="0"/>
+          <a:chExt cx="0" cy="0"/>
+        </a:xfrm>
+      </p:grpSpPr>
+      <p:sp>
+        <p:nvSpPr>
+          <p:cNvPr id="2" name="Slide Image Placeholder 1"/>
+          <p:cNvSpPr>
+            <a:spLocks noGrp="1" noRot="1" noChangeAspect="1"/>
+          </p:cNvSpPr>
+          <p:nvPr>
+            <p:ph type="sldImg"/>
+          </p:nvPr>
+        </p:nvSpPr>
+        <p:spPr/>
+      </p:sp>
+      <p:sp>
+        <p:nvSpPr>
+          <p:cNvPr id="3" name="Notes Placeholder 2"/>
+          <p:cNvSpPr>
+            <a:spLocks noGrp="1"/>
+          </p:cNvSpPr>
+          <p:nvPr>
+            <p:ph type="body" idx="1"/>
+          </p:nvPr>
+        </p:nvSpPr>
+        <p:spPr/>
+        <p:txBody>
+          <a:bodyPr/>
+          <a:lstStyle/>
+          <a:p>
+            <a:r>
+              <a:rPr lang="en-US" dirty="0" smtClean="0"/>
+              <a:t>We</a:t>
+            </a:r>
+            <a:r>
+              <a:rPr lang="en-US" baseline="0" dirty="0" smtClean="0"/>
+              <a:t> see a pattern that credit cards are typical classic. Gold and junior cards are less common, since the conditions of this cards depends on specific client characteristics (age, Client Lifetime Value). </a:t>
+            </a:r>
+            <a:endParaRPr lang="pt-PT" dirty="0"/>
+          </a:p>
+        </p:txBody>
+      </p:sp>
+      <p:sp>
+        <p:nvSpPr>
+          <p:cNvPr id="4" name="Slide Number Placeholder 3"/>
+          <p:cNvSpPr>
+            <a:spLocks noGrp="1"/>
+          </p:cNvSpPr>
+          <p:nvPr>
+            <p:ph type="sldNum" sz="quarter" idx="10"/>
+          </p:nvPr>
+        </p:nvSpPr>
+        <p:spPr/>
+        <p:txBody>
+          <a:bodyPr/>
+          <a:lstStyle/>
+          <a:p>
+            <a:fld id="{DE9A8645-4E47-4476-9EEF-65BED58C741A}" type="slidenum">
+              <a:rPr lang="pt-PT" smtClean="0"/>
+              <a:t>8</a:t>
+            </a:fld>
+            <a:endParaRPr lang="pt-PT"/>
+          </a:p>
+        </p:txBody>
+      </p:sp>
+    </p:spTree>
+    <p:extLst>
+      <p:ext uri="{BB962C8B-B14F-4D97-AF65-F5344CB8AC3E}">
+        <p14:creationId xmlns:p14="http://schemas.microsoft.com/office/powerpoint/2010/main" val="1096001291"/>
+      </p:ext>
+    </p:extLst>
+  </p:cSld>
+  <p:clrMapOvr>
+    <a:masterClrMapping/>
+  </p:clrMapOvr>
+</p:notes>
+</file>
+
+<file path=ppt/notesSlides/notesSlide7.xml><?xml version="1.0" encoding="utf-8"?>
+<p:notes xmlns:a="http://schemas.openxmlformats.org/drawingml/2006/main" xmlns:r="http://schemas.openxmlformats.org/officeDocument/2006/relationships" xmlns:p="http://schemas.openxmlformats.org/presentationml/2006/main">
+  <p:cSld>
+    <p:spTree>
+      <p:nvGrpSpPr>
+        <p:cNvPr id="1" name=""/>
+        <p:cNvGrpSpPr/>
+        <p:nvPr/>
+      </p:nvGrpSpPr>
+      <p:grpSpPr>
+        <a:xfrm>
+          <a:off x="0" y="0"/>
+          <a:ext cx="0" cy="0"/>
+          <a:chOff x="0" y="0"/>
+          <a:chExt cx="0" cy="0"/>
+        </a:xfrm>
+      </p:grpSpPr>
+      <p:sp>
+        <p:nvSpPr>
+          <p:cNvPr id="2" name="Slide Image Placeholder 1"/>
+          <p:cNvSpPr>
+            <a:spLocks noGrp="1" noRot="1" noChangeAspect="1"/>
+          </p:cNvSpPr>
+          <p:nvPr>
+            <p:ph type="sldImg"/>
+          </p:nvPr>
+        </p:nvSpPr>
+        <p:spPr/>
+      </p:sp>
+      <p:sp>
+        <p:nvSpPr>
+          <p:cNvPr id="3" name="Notes Placeholder 2"/>
+          <p:cNvSpPr>
+            <a:spLocks noGrp="1"/>
+          </p:cNvSpPr>
+          <p:nvPr>
+            <p:ph type="body" idx="1"/>
+          </p:nvPr>
+        </p:nvSpPr>
+        <p:spPr/>
+        <p:txBody>
+          <a:bodyPr/>
+          <a:lstStyle/>
+          <a:p>
+            <a:r>
+              <a:rPr lang="en-US" dirty="0" smtClean="0"/>
+              <a:t>But</a:t>
+            </a:r>
+            <a:r>
+              <a:rPr lang="en-US" baseline="0" dirty="0" smtClean="0"/>
+              <a:t> we got to consider that this includes Owners and dispones.</a:t>
+            </a:r>
+            <a:endParaRPr lang="pt-PT" dirty="0"/>
+          </a:p>
+        </p:txBody>
+      </p:sp>
+      <p:sp>
+        <p:nvSpPr>
+          <p:cNvPr id="4" name="Slide Number Placeholder 3"/>
+          <p:cNvSpPr>
+            <a:spLocks noGrp="1"/>
+          </p:cNvSpPr>
+          <p:nvPr>
+            <p:ph type="sldNum" sz="quarter" idx="10"/>
+          </p:nvPr>
+        </p:nvSpPr>
+        <p:spPr/>
+        <p:txBody>
+          <a:bodyPr/>
+          <a:lstStyle/>
+          <a:p>
+            <a:fld id="{DE9A8645-4E47-4476-9EEF-65BED58C741A}" type="slidenum">
+              <a:rPr lang="pt-PT" smtClean="0"/>
+              <a:t>9</a:t>
+            </a:fld>
+            <a:endParaRPr lang="pt-PT"/>
+          </a:p>
+        </p:txBody>
+      </p:sp>
+    </p:spTree>
+    <p:extLst>
+      <p:ext uri="{BB962C8B-B14F-4D97-AF65-F5344CB8AC3E}">
+        <p14:creationId xmlns:p14="http://schemas.microsoft.com/office/powerpoint/2010/main" val="545459907"/>
+      </p:ext>
+    </p:extLst>
+  </p:cSld>
+  <p:clrMapOvr>
+    <a:masterClrMapping/>
+  </p:clrMapOvr>
+</p:notes>
+</file>
+
+<file path=ppt/notesSlides/notesSlide8.xml><?xml version="1.0" encoding="utf-8"?>
+<p:notes xmlns:a="http://schemas.openxmlformats.org/drawingml/2006/main" xmlns:r="http://schemas.openxmlformats.org/officeDocument/2006/relationships" xmlns:p="http://schemas.openxmlformats.org/presentationml/2006/main">
+  <p:cSld>
+    <p:spTree>
+      <p:nvGrpSpPr>
+        <p:cNvPr id="1" name=""/>
+        <p:cNvGrpSpPr/>
+        <p:nvPr/>
+      </p:nvGrpSpPr>
+      <p:grpSpPr>
+        <a:xfrm>
+          <a:off x="0" y="0"/>
+          <a:ext cx="0" cy="0"/>
+          <a:chOff x="0" y="0"/>
+          <a:chExt cx="0" cy="0"/>
+        </a:xfrm>
+      </p:grpSpPr>
+      <p:sp>
+        <p:nvSpPr>
+          <p:cNvPr id="2" name="Slide Image Placeholder 1"/>
+          <p:cNvSpPr>
+            <a:spLocks noGrp="1" noRot="1" noChangeAspect="1"/>
+          </p:cNvSpPr>
+          <p:nvPr>
+            <p:ph type="sldImg"/>
+          </p:nvPr>
+        </p:nvSpPr>
+        <p:spPr/>
+      </p:sp>
+      <p:sp>
+        <p:nvSpPr>
+          <p:cNvPr id="3" name="Notes Placeholder 2"/>
+          <p:cNvSpPr>
+            <a:spLocks noGrp="1"/>
+          </p:cNvSpPr>
+          <p:nvPr>
+            <p:ph type="body" idx="1"/>
+          </p:nvPr>
+        </p:nvSpPr>
+        <p:spPr/>
+        <p:txBody>
+          <a:bodyPr/>
+          <a:lstStyle/>
+          <a:p>
+            <a:r>
+              <a:rPr lang="en-US" dirty="0" smtClean="0"/>
+              <a:t>This</a:t>
+            </a:r>
+            <a:r>
+              <a:rPr lang="en-US" baseline="0" dirty="0" smtClean="0"/>
+              <a:t> get us an overview of all clients with loans, as well the success rates. Based on this data we can see if there are lots of success or </a:t>
+            </a:r>
+            <a:r>
+              <a:rPr lang="en-US" baseline="0" dirty="0" err="1" smtClean="0"/>
+              <a:t>insuccess</a:t>
+            </a:r>
+            <a:r>
+              <a:rPr lang="en-US" baseline="0" dirty="0" smtClean="0"/>
+              <a:t> what can be useful to the bank (adjust campaigns/conditions)</a:t>
+            </a:r>
+            <a:endParaRPr lang="pt-PT" dirty="0"/>
+          </a:p>
+        </p:txBody>
+      </p:sp>
+      <p:sp>
+        <p:nvSpPr>
+          <p:cNvPr id="4" name="Slide Number Placeholder 3"/>
+          <p:cNvSpPr>
+            <a:spLocks noGrp="1"/>
+          </p:cNvSpPr>
+          <p:nvPr>
+            <p:ph type="sldNum" sz="quarter" idx="10"/>
+          </p:nvPr>
+        </p:nvSpPr>
+        <p:spPr/>
+        <p:txBody>
+          <a:bodyPr/>
+          <a:lstStyle/>
+          <a:p>
+            <a:fld id="{DE9A8645-4E47-4476-9EEF-65BED58C741A}" type="slidenum">
+              <a:rPr lang="pt-PT" smtClean="0"/>
+              <a:t>10</a:t>
+            </a:fld>
+            <a:endParaRPr lang="pt-PT"/>
+          </a:p>
+        </p:txBody>
+      </p:sp>
+    </p:spTree>
+    <p:extLst>
+      <p:ext uri="{BB962C8B-B14F-4D97-AF65-F5344CB8AC3E}">
+        <p14:creationId xmlns:p14="http://schemas.microsoft.com/office/powerpoint/2010/main" val="2790088165"/>
+      </p:ext>
+    </p:extLst>
+  </p:cSld>
+  <p:clrMapOvr>
+    <a:masterClrMapping/>
+  </p:clrMapOvr>
+</p:notes>
+</file>
+
+<file path=ppt/notesSlides/notesSlide9.xml><?xml version="1.0" encoding="utf-8"?>
+<p:notes xmlns:a="http://schemas.openxmlformats.org/drawingml/2006/main" xmlns:r="http://schemas.openxmlformats.org/officeDocument/2006/relationships" xmlns:p="http://schemas.openxmlformats.org/presentationml/2006/main">
+  <p:cSld>
+    <p:spTree>
+      <p:nvGrpSpPr>
+        <p:cNvPr id="1" name=""/>
+        <p:cNvGrpSpPr/>
+        <p:nvPr/>
+      </p:nvGrpSpPr>
+      <p:grpSpPr>
+        <a:xfrm>
+          <a:off x="0" y="0"/>
+          <a:ext cx="0" cy="0"/>
+          <a:chOff x="0" y="0"/>
+          <a:chExt cx="0" cy="0"/>
+        </a:xfrm>
+      </p:grpSpPr>
+      <p:sp>
+        <p:nvSpPr>
+          <p:cNvPr id="2" name="Slide Image Placeholder 1"/>
+          <p:cNvSpPr>
+            <a:spLocks noGrp="1" noRot="1" noChangeAspect="1"/>
+          </p:cNvSpPr>
+          <p:nvPr>
+            <p:ph type="sldImg"/>
+          </p:nvPr>
+        </p:nvSpPr>
+        <p:spPr/>
+      </p:sp>
+      <p:sp>
+        <p:nvSpPr>
+          <p:cNvPr id="3" name="Notes Placeholder 2"/>
+          <p:cNvSpPr>
+            <a:spLocks noGrp="1"/>
+          </p:cNvSpPr>
+          <p:nvPr>
+            <p:ph type="body" idx="1"/>
+          </p:nvPr>
+        </p:nvSpPr>
+        <p:spPr/>
+        <p:txBody>
+          <a:bodyPr/>
+          <a:lstStyle/>
+          <a:p>
+            <a:r>
+              <a:rPr lang="en-US" dirty="0" smtClean="0"/>
+              <a:t>At</a:t>
+            </a:r>
+            <a:r>
+              <a:rPr lang="en-US" baseline="0" dirty="0" smtClean="0"/>
+              <a:t> a technical/data mining level we got some problems regarding dimensionality of the data, noise (not useful data) and irrelevant attributes. </a:t>
+            </a:r>
+          </a:p>
+          <a:p>
+            <a:endParaRPr lang="en-US" baseline="0" dirty="0" smtClean="0"/>
+          </a:p>
+          <a:p>
+            <a:r>
+              <a:rPr lang="en-US" baseline="0" dirty="0" smtClean="0"/>
+              <a:t>Good distribution of the data (variety, quantity) give us better and precise classification.</a:t>
+            </a:r>
+            <a:endParaRPr lang="pt-PT" dirty="0" smtClean="0"/>
+          </a:p>
+          <a:p>
+            <a:endParaRPr lang="pt-PT" dirty="0"/>
+          </a:p>
+        </p:txBody>
+      </p:sp>
+      <p:sp>
+        <p:nvSpPr>
+          <p:cNvPr id="4" name="Slide Number Placeholder 3"/>
+          <p:cNvSpPr>
+            <a:spLocks noGrp="1"/>
+          </p:cNvSpPr>
+          <p:nvPr>
+            <p:ph type="sldNum" sz="quarter" idx="10"/>
+          </p:nvPr>
+        </p:nvSpPr>
+        <p:spPr/>
+        <p:txBody>
+          <a:bodyPr/>
+          <a:lstStyle/>
+          <a:p>
+            <a:fld id="{DE9A8645-4E47-4476-9EEF-65BED58C741A}" type="slidenum">
+              <a:rPr lang="pt-PT" smtClean="0"/>
+              <a:t>12</a:t>
+            </a:fld>
+            <a:endParaRPr lang="pt-PT"/>
+          </a:p>
+        </p:txBody>
+      </p:sp>
+    </p:spTree>
+    <p:extLst>
+      <p:ext uri="{BB962C8B-B14F-4D97-AF65-F5344CB8AC3E}">
+        <p14:creationId xmlns:p14="http://schemas.microsoft.com/office/powerpoint/2010/main" val="1727142303"/>
+      </p:ext>
+    </p:extLst>
+  </p:cSld>
+  <p:clrMapOvr>
+    <a:masterClrMapping/>
+  </p:clrMapOvr>
+</p:notes>
+</file>
+
 <file path=ppt/slideLayouts/slideLayout1.xml><?xml version="1.0" encoding="utf-8"?>
 <p:sldLayout xmlns:a="http://schemas.openxmlformats.org/drawingml/2006/main" xmlns:r="http://schemas.openxmlformats.org/officeDocument/2006/relationships" xmlns:p="http://schemas.openxmlformats.org/presentationml/2006/main" showMasterSp="0" type="title" preserve="1">
   <p:cSld name="Title Slide">
@@ -382,7 +3366,7 @@
             <a:fld id="{5586B75A-687E-405C-8A0B-8D00578BA2C3}" type="datetimeFigureOut">
               <a:rPr lang="en-US" dirty="0"/>
               <a:pPr/>
-              <a:t>12/16/2015</a:t>
+              <a:t>1/25/2016</a:t>
             </a:fld>
             <a:endParaRPr lang="en-US" dirty="0"/>
           </a:p>
@@ -549,7 +3533,7 @@
             <a:fld id="{5586B75A-687E-405C-8A0B-8D00578BA2C3}" type="datetimeFigureOut">
               <a:rPr lang="en-US" dirty="0"/>
               <a:pPr/>
-              <a:t>12/16/2015</a:t>
+              <a:t>1/25/2016</a:t>
             </a:fld>
             <a:endParaRPr lang="en-US" dirty="0"/>
           </a:p>
@@ -726,7 +3710,7 @@
             <a:fld id="{5586B75A-687E-405C-8A0B-8D00578BA2C3}" type="datetimeFigureOut">
               <a:rPr lang="en-US" dirty="0"/>
               <a:pPr/>
-              <a:t>12/16/2015</a:t>
+              <a:t>1/25/2016</a:t>
             </a:fld>
             <a:endParaRPr lang="en-US" dirty="0"/>
           </a:p>
@@ -893,7 +3877,7 @@
             <a:fld id="{5586B75A-687E-405C-8A0B-8D00578BA2C3}" type="datetimeFigureOut">
               <a:rPr lang="en-US" dirty="0"/>
               <a:pPr/>
-              <a:t>12/16/2015</a:t>
+              <a:t>1/25/2016</a:t>
             </a:fld>
             <a:endParaRPr lang="en-US" dirty="0"/>
           </a:p>
@@ -1148,7 +4132,7 @@
             <a:fld id="{5586B75A-687E-405C-8A0B-8D00578BA2C3}" type="datetimeFigureOut">
               <a:rPr lang="en-US" dirty="0"/>
               <a:pPr/>
-              <a:t>12/16/2015</a:t>
+              <a:t>1/25/2016</a:t>
             </a:fld>
             <a:endParaRPr lang="en-US" dirty="0"/>
           </a:p>
@@ -1433,7 +4417,7 @@
             <a:fld id="{5586B75A-687E-405C-8A0B-8D00578BA2C3}" type="datetimeFigureOut">
               <a:rPr lang="en-US" dirty="0"/>
               <a:pPr/>
-              <a:t>12/16/2015</a:t>
+              <a:t>1/25/2016</a:t>
             </a:fld>
             <a:endParaRPr lang="en-US" dirty="0"/>
           </a:p>
@@ -1872,7 +4856,7 @@
             <a:fld id="{5586B75A-687E-405C-8A0B-8D00578BA2C3}" type="datetimeFigureOut">
               <a:rPr lang="en-US" dirty="0"/>
               <a:pPr/>
-              <a:t>12/16/2015</a:t>
+              <a:t>1/25/2016</a:t>
             </a:fld>
             <a:endParaRPr lang="en-US" dirty="0"/>
           </a:p>
@@ -1987,7 +4971,7 @@
             <a:fld id="{5586B75A-687E-405C-8A0B-8D00578BA2C3}" type="datetimeFigureOut">
               <a:rPr lang="en-US" dirty="0"/>
               <a:pPr/>
-              <a:t>12/16/2015</a:t>
+              <a:t>1/25/2016</a:t>
             </a:fld>
             <a:endParaRPr lang="en-US" dirty="0"/>
           </a:p>
@@ -2079,7 +5063,7 @@
             <a:fld id="{5586B75A-687E-405C-8A0B-8D00578BA2C3}" type="datetimeFigureOut">
               <a:rPr lang="en-US" dirty="0"/>
               <a:pPr/>
-              <a:t>12/16/2015</a:t>
+              <a:t>1/25/2016</a:t>
             </a:fld>
             <a:endParaRPr lang="en-US" dirty="0"/>
           </a:p>
@@ -2364,7 +5348,7 @@
             <a:fld id="{5586B75A-687E-405C-8A0B-8D00578BA2C3}" type="datetimeFigureOut">
               <a:rPr lang="en-US" dirty="0"/>
               <a:pPr/>
-              <a:t>12/16/2015</a:t>
+              <a:t>1/25/2016</a:t>
             </a:fld>
             <a:endParaRPr lang="en-US" dirty="0"/>
           </a:p>
@@ -2634,7 +5618,7 @@
             <a:fld id="{5586B75A-687E-405C-8A0B-8D00578BA2C3}" type="datetimeFigureOut">
               <a:rPr lang="en-US" dirty="0"/>
               <a:pPr/>
-              <a:t>12/16/2015</a:t>
+              <a:t>1/25/2016</a:t>
             </a:fld>
             <a:endParaRPr lang="en-US" dirty="0"/>
           </a:p>
@@ -2928,7 +5912,7 @@
             <a:fld id="{5586B75A-687E-405C-8A0B-8D00578BA2C3}" type="datetimeFigureOut">
               <a:rPr lang="en-US" dirty="0"/>
               <a:pPr/>
-              <a:t>12/16/2015</a:t>
+              <a:t>1/25/2016</a:t>
             </a:fld>
             <a:endParaRPr lang="en-US" dirty="0"/>
           </a:p>
@@ -3545,7 +6529,7 @@
           </p:nvPr>
         </p:nvPicPr>
         <p:blipFill>
-          <a:blip r:embed="rId2"/>
+          <a:blip r:embed="rId3"/>
           <a:stretch>
             <a:fillRect/>
           </a:stretch>
@@ -3883,7 +6867,7 @@
           <p:nvPr/>
         </p:nvPicPr>
         <p:blipFill>
-          <a:blip r:embed="rId2"/>
+          <a:blip r:embed="rId3"/>
           <a:stretch>
             <a:fillRect/>
           </a:stretch>
@@ -4209,7 +7193,7 @@
           </p:nvPr>
         </p:nvPicPr>
         <p:blipFill>
-          <a:blip r:embed="rId3"/>
+          <a:blip r:embed="rId4"/>
           <a:stretch>
             <a:fillRect/>
           </a:stretch>
@@ -6917,7 +9901,7 @@
           <p:nvPr/>
         </p:nvPicPr>
         <p:blipFill>
-          <a:blip r:embed="rId2"/>
+          <a:blip r:embed="rId3"/>
           <a:stretch>
             <a:fillRect/>
           </a:stretch>
@@ -6941,7 +9925,7 @@
           <p:nvPr/>
         </p:nvPicPr>
         <p:blipFill>
-          <a:blip r:embed="rId3"/>
+          <a:blip r:embed="rId4"/>
           <a:stretch>
             <a:fillRect/>
           </a:stretch>
@@ -7301,7 +10285,7 @@
           <p:nvPr/>
         </p:nvPicPr>
         <p:blipFill>
-          <a:blip r:embed="rId2"/>
+          <a:blip r:embed="rId3"/>
           <a:stretch>
             <a:fillRect/>
           </a:stretch>
@@ -7330,7 +10314,7 @@
           <p:nvPr/>
         </p:nvPicPr>
         <p:blipFill rotWithShape="1">
-          <a:blip r:embed="rId3"/>
+          <a:blip r:embed="rId4"/>
           <a:srcRect t="7857" b="6394"/>
           <a:stretch/>
         </p:blipFill>
@@ -7640,19 +10624,7 @@
           <a:p>
             <a:r>
               <a:rPr lang="en-US" dirty="0" smtClean="0"/>
-              <a:t>Decision tree for predicting successful  </a:t>
-            </a:r>
-            <a:r>
-              <a:rPr lang="en-US" dirty="0" smtClean="0"/>
-              <a:t>loans based on finished and </a:t>
-            </a:r>
-            <a:r>
-              <a:rPr lang="en-US" dirty="0" smtClean="0"/>
-              <a:t>active </a:t>
-            </a:r>
-            <a:r>
-              <a:rPr lang="en-US" dirty="0" smtClean="0"/>
-              <a:t>loans </a:t>
+              <a:t>Decision tree for predicting successful  loans based on finished and active loans </a:t>
             </a:r>
             <a:endParaRPr lang="pt-PT" dirty="0"/>
           </a:p>
@@ -7697,7 +10669,7 @@
           <p:nvPr/>
         </p:nvPicPr>
         <p:blipFill rotWithShape="1">
-          <a:blip r:embed="rId2"/>
+          <a:blip r:embed="rId3"/>
           <a:srcRect t="4412"/>
           <a:stretch/>
         </p:blipFill>
@@ -7720,7 +10692,7 @@
           <p:nvPr/>
         </p:nvPicPr>
         <p:blipFill>
-          <a:blip r:embed="rId3"/>
+          <a:blip r:embed="rId4"/>
           <a:stretch>
             <a:fillRect/>
           </a:stretch>
@@ -7964,15 +10936,7 @@
             <a:pPr algn="just"/>
             <a:r>
               <a:rPr lang="en-US" sz="1800" dirty="0" smtClean="0"/>
-              <a:t>We get worse </a:t>
-            </a:r>
-            <a:r>
-              <a:rPr lang="en-US" sz="1800" dirty="0" smtClean="0"/>
-              <a:t>results </a:t>
-            </a:r>
-            <a:r>
-              <a:rPr lang="en-US" sz="1800" dirty="0" smtClean="0"/>
-              <a:t>with k-</a:t>
+              <a:t>We get worse results with k-</a:t>
             </a:r>
             <a:r>
               <a:rPr lang="en-US" sz="1800" dirty="0" err="1" smtClean="0"/>
@@ -8190,11 +11154,7 @@
           <a:p>
             <a:r>
               <a:rPr lang="en-US" dirty="0" smtClean="0"/>
-              <a:t>Using </a:t>
-            </a:r>
-            <a:r>
-              <a:rPr lang="en-US" dirty="0" smtClean="0"/>
-              <a:t>k-</a:t>
+              <a:t>Using k-</a:t>
             </a:r>
             <a:r>
               <a:rPr lang="en-US" dirty="0" err="1" smtClean="0"/>
@@ -8231,11 +11191,7 @@
           <a:p>
             <a:r>
               <a:rPr lang="en-US" dirty="0" smtClean="0"/>
-              <a:t>Use </a:t>
-            </a:r>
-            <a:r>
-              <a:rPr lang="en-US" dirty="0" smtClean="0"/>
-              <a:t>of data tables:</a:t>
+              <a:t>Use of data tables:</a:t>
             </a:r>
           </a:p>
           <a:p>
@@ -8301,11 +11257,7 @@
           <a:p>
             <a:r>
               <a:rPr lang="en-US" sz="2400" dirty="0" smtClean="0"/>
-              <a:t>Naïve Bayes for </a:t>
-            </a:r>
-            <a:r>
-              <a:rPr lang="en-US" sz="2400" dirty="0" smtClean="0"/>
-              <a:t>predicting successful  loans based on finished and active loans </a:t>
+              <a:t>Naïve Bayes for predicting successful  loans based on finished and active loans </a:t>
             </a:r>
             <a:endParaRPr lang="pt-PT" sz="2400" dirty="0"/>
           </a:p>
@@ -8572,11 +11524,7 @@
             </a:r>
             <a:r>
               <a:rPr lang="en-US" dirty="0" smtClean="0"/>
-              <a:t>aïve Bayes operator</a:t>
-            </a:r>
-            <a:r>
-              <a:rPr lang="en-US" dirty="0" smtClean="0"/>
-              <a:t>:</a:t>
+              <a:t>aïve Bayes operator:</a:t>
             </a:r>
           </a:p>
           <a:p>
@@ -8585,7 +11533,6 @@
               <a:rPr lang="en-US" dirty="0" smtClean="0"/>
               <a:t>Laplace correction: true</a:t>
             </a:r>
-            <a:endParaRPr lang="en-US" dirty="0" smtClean="0"/>
           </a:p>
           <a:p>
             <a:r>
@@ -8701,7 +11648,7 @@
           <p:nvPr/>
         </p:nvPicPr>
         <p:blipFill>
-          <a:blip r:embed="rId2"/>
+          <a:blip r:embed="rId3"/>
           <a:stretch>
             <a:fillRect/>
           </a:stretch>
@@ -8725,7 +11672,7 @@
           <p:nvPr/>
         </p:nvPicPr>
         <p:blipFill rotWithShape="1">
-          <a:blip r:embed="rId3"/>
+          <a:blip r:embed="rId4"/>
           <a:srcRect t="9264" b="10064"/>
           <a:stretch/>
         </p:blipFill>
@@ -8939,11 +11886,7 @@
           <a:p>
             <a:r>
               <a:rPr lang="en-US" sz="2200" dirty="0" smtClean="0"/>
-              <a:t>Support Vector Machine for </a:t>
-            </a:r>
-            <a:r>
-              <a:rPr lang="en-US" sz="2200" dirty="0" smtClean="0"/>
-              <a:t>predicting successful  loans based on finished and active loans and transaction data</a:t>
+              <a:t>Support Vector Machine for predicting successful  loans based on finished and active loans and transaction data</a:t>
             </a:r>
             <a:endParaRPr lang="pt-PT" sz="2200" dirty="0"/>
           </a:p>
@@ -9091,7 +12034,7 @@
           <p:nvPr/>
         </p:nvPicPr>
         <p:blipFill>
-          <a:blip r:embed="rId2"/>
+          <a:blip r:embed="rId3"/>
           <a:stretch>
             <a:fillRect/>
           </a:stretch>
@@ -9412,11 +12355,7 @@
             </a:r>
             <a:r>
               <a:rPr lang="en-US" sz="2200" dirty="0" smtClean="0"/>
-              <a:t> for </a:t>
-            </a:r>
-            <a:r>
-              <a:rPr lang="en-US" sz="2200" dirty="0" smtClean="0"/>
-              <a:t>predicting successful  loans based on finished and active loans and transaction data</a:t>
+              <a:t> for predicting successful  loans based on finished and active loans and transaction data</a:t>
             </a:r>
             <a:endParaRPr lang="pt-PT" sz="2200" dirty="0"/>
           </a:p>
@@ -9483,7 +12422,7 @@
           <p:nvPr/>
         </p:nvPicPr>
         <p:blipFill>
-          <a:blip r:embed="rId2"/>
+          <a:blip r:embed="rId3"/>
           <a:stretch>
             <a:fillRect/>
           </a:stretch>
@@ -9507,7 +12446,7 @@
           <p:nvPr/>
         </p:nvPicPr>
         <p:blipFill>
-          <a:blip r:embed="rId3"/>
+          <a:blip r:embed="rId4"/>
           <a:stretch>
             <a:fillRect/>
           </a:stretch>
@@ -9531,7 +12470,7 @@
           <p:nvPr/>
         </p:nvPicPr>
         <p:blipFill>
-          <a:blip r:embed="rId4"/>
+          <a:blip r:embed="rId5"/>
           <a:stretch>
             <a:fillRect/>
           </a:stretch>
@@ -12095,7 +15034,7 @@
           </p:nvPr>
         </p:nvPicPr>
         <p:blipFill>
-          <a:blip r:embed="rId2"/>
+          <a:blip r:embed="rId3"/>
           <a:stretch>
             <a:fillRect/>
           </a:stretch>
@@ -12198,7 +15137,7 @@
           </p:nvPr>
         </p:nvPicPr>
         <p:blipFill>
-          <a:blip r:embed="rId2"/>
+          <a:blip r:embed="rId3"/>
           <a:stretch>
             <a:fillRect/>
           </a:stretch>
@@ -12299,7 +15238,7 @@
           </p:nvPr>
         </p:nvPicPr>
         <p:blipFill>
-          <a:blip r:embed="rId2"/>
+          <a:blip r:embed="rId3"/>
           <a:stretch>
             <a:fillRect/>
           </a:stretch>
@@ -12400,7 +15339,7 @@
           </p:nvPr>
         </p:nvPicPr>
         <p:blipFill>
-          <a:blip r:embed="rId2"/>
+          <a:blip r:embed="rId3"/>
           <a:stretch>
             <a:fillRect/>
           </a:stretch>
@@ -12687,4 +15626,265 @@
     </a:ext>
   </a:extLst>
 </a:theme>
+</file>
+
+<file path=ppt/theme/theme2.xml><?xml version="1.0" encoding="utf-8"?>
+<a:theme xmlns:a="http://schemas.openxmlformats.org/drawingml/2006/main" name="Office Theme">
+  <a:themeElements>
+    <a:clrScheme name="Office">
+      <a:dk1>
+        <a:sysClr val="windowText" lastClr="000000"/>
+      </a:dk1>
+      <a:lt1>
+        <a:sysClr val="window" lastClr="FFFFFF"/>
+      </a:lt1>
+      <a:dk2>
+        <a:srgbClr val="44546A"/>
+      </a:dk2>
+      <a:lt2>
+        <a:srgbClr val="E7E6E6"/>
+      </a:lt2>
+      <a:accent1>
+        <a:srgbClr val="5B9BD5"/>
+      </a:accent1>
+      <a:accent2>
+        <a:srgbClr val="ED7D31"/>
+      </a:accent2>
+      <a:accent3>
+        <a:srgbClr val="A5A5A5"/>
+      </a:accent3>
+      <a:accent4>
+        <a:srgbClr val="FFC000"/>
+      </a:accent4>
+      <a:accent5>
+        <a:srgbClr val="4472C4"/>
+      </a:accent5>
+      <a:accent6>
+        <a:srgbClr val="70AD47"/>
+      </a:accent6>
+      <a:hlink>
+        <a:srgbClr val="0563C1"/>
+      </a:hlink>
+      <a:folHlink>
+        <a:srgbClr val="954F72"/>
+      </a:folHlink>
+    </a:clrScheme>
+    <a:fontScheme name="Office">
+      <a:majorFont>
+        <a:latin typeface="Calibri Light" panose="020F0302020204030204"/>
+        <a:ea typeface=""/>
+        <a:cs typeface=""/>
+        <a:font script="Jpan" typeface="游ゴシック Light"/>
+        <a:font script="Hang" typeface="맑은 고딕"/>
+        <a:font script="Hans" typeface="等线 Light"/>
+        <a:font script="Hant" typeface="新細明體"/>
+        <a:font script="Arab" typeface="Times New Roman"/>
+        <a:font script="Hebr" typeface="Times New Roman"/>
+        <a:font script="Thai" typeface="Angsana New"/>
+        <a:font script="Ethi" typeface="Nyala"/>
+        <a:font script="Beng" typeface="Vrinda"/>
+        <a:font script="Gujr" typeface="Shruti"/>
+        <a:font script="Khmr" typeface="MoolBoran"/>
+        <a:font script="Knda" typeface="Tunga"/>
+        <a:font script="Guru" typeface="Raavi"/>
+        <a:font script="Cans" typeface="Euphemia"/>
+        <a:font script="Cher" typeface="Plantagenet Cherokee"/>
+        <a:font script="Yiii" typeface="Microsoft Yi Baiti"/>
+        <a:font script="Tibt" typeface="Microsoft Himalaya"/>
+        <a:font script="Thaa" typeface="MV Boli"/>
+        <a:font script="Deva" typeface="Mangal"/>
+        <a:font script="Telu" typeface="Gautami"/>
+        <a:font script="Taml" typeface="Latha"/>
+        <a:font script="Syrc" typeface="Estrangelo Edessa"/>
+        <a:font script="Orya" typeface="Kalinga"/>
+        <a:font script="Mlym" typeface="Kartika"/>
+        <a:font script="Laoo" typeface="DokChampa"/>
+        <a:font script="Sinh" typeface="Iskoola Pota"/>
+        <a:font script="Mong" typeface="Mongolian Baiti"/>
+        <a:font script="Viet" typeface="Times New Roman"/>
+        <a:font script="Uigh" typeface="Microsoft Uighur"/>
+        <a:font script="Geor" typeface="Sylfaen"/>
+      </a:majorFont>
+      <a:minorFont>
+        <a:latin typeface="Calibri" panose="020F0502020204030204"/>
+        <a:ea typeface=""/>
+        <a:cs typeface=""/>
+        <a:font script="Jpan" typeface="游ゴシック"/>
+        <a:font script="Hang" typeface="맑은 고딕"/>
+        <a:font script="Hans" typeface="等线"/>
+        <a:font script="Hant" typeface="新細明體"/>
+        <a:font script="Arab" typeface="Arial"/>
+        <a:font script="Hebr" typeface="Arial"/>
+        <a:font script="Thai" typeface="Cordia New"/>
+        <a:font script="Ethi" typeface="Nyala"/>
+        <a:font script="Beng" typeface="Vrinda"/>
+        <a:font script="Gujr" typeface="Shruti"/>
+        <a:font script="Khmr" typeface="DaunPenh"/>
+        <a:font script="Knda" typeface="Tunga"/>
+        <a:font script="Guru" typeface="Raavi"/>
+        <a:font script="Cans" typeface="Euphemia"/>
+        <a:font script="Cher" typeface="Plantagenet Cherokee"/>
+        <a:font script="Yiii" typeface="Microsoft Yi Baiti"/>
+        <a:font script="Tibt" typeface="Microsoft Himalaya"/>
+        <a:font script="Thaa" typeface="MV Boli"/>
+        <a:font script="Deva" typeface="Mangal"/>
+        <a:font script="Telu" typeface="Gautami"/>
+        <a:font script="Taml" typeface="Latha"/>
+        <a:font script="Syrc" typeface="Estrangelo Edessa"/>
+        <a:font script="Orya" typeface="Kalinga"/>
+        <a:font script="Mlym" typeface="Kartika"/>
+        <a:font script="Laoo" typeface="DokChampa"/>
+        <a:font script="Sinh" typeface="Iskoola Pota"/>
+        <a:font script="Mong" typeface="Mongolian Baiti"/>
+        <a:font script="Viet" typeface="Arial"/>
+        <a:font script="Uigh" typeface="Microsoft Uighur"/>
+        <a:font script="Geor" typeface="Sylfaen"/>
+      </a:minorFont>
+    </a:fontScheme>
+    <a:fmtScheme name="Office">
+      <a:fillStyleLst>
+        <a:solidFill>
+          <a:schemeClr val="phClr"/>
+        </a:solidFill>
+        <a:gradFill rotWithShape="1">
+          <a:gsLst>
+            <a:gs pos="0">
+              <a:schemeClr val="phClr">
+                <a:lumMod val="110000"/>
+                <a:satMod val="105000"/>
+                <a:tint val="67000"/>
+              </a:schemeClr>
+            </a:gs>
+            <a:gs pos="50000">
+              <a:schemeClr val="phClr">
+                <a:lumMod val="105000"/>
+                <a:satMod val="103000"/>
+                <a:tint val="73000"/>
+              </a:schemeClr>
+            </a:gs>
+            <a:gs pos="100000">
+              <a:schemeClr val="phClr">
+                <a:lumMod val="105000"/>
+                <a:satMod val="109000"/>
+                <a:tint val="81000"/>
+              </a:schemeClr>
+            </a:gs>
+          </a:gsLst>
+          <a:lin ang="5400000" scaled="0"/>
+        </a:gradFill>
+        <a:gradFill rotWithShape="1">
+          <a:gsLst>
+            <a:gs pos="0">
+              <a:schemeClr val="phClr">
+                <a:satMod val="103000"/>
+                <a:lumMod val="102000"/>
+                <a:tint val="94000"/>
+              </a:schemeClr>
+            </a:gs>
+            <a:gs pos="50000">
+              <a:schemeClr val="phClr">
+                <a:satMod val="110000"/>
+                <a:lumMod val="100000"/>
+                <a:shade val="100000"/>
+              </a:schemeClr>
+            </a:gs>
+            <a:gs pos="100000">
+              <a:schemeClr val="phClr">
+                <a:lumMod val="99000"/>
+                <a:satMod val="120000"/>
+                <a:shade val="78000"/>
+              </a:schemeClr>
+            </a:gs>
+          </a:gsLst>
+          <a:lin ang="5400000" scaled="0"/>
+        </a:gradFill>
+      </a:fillStyleLst>
+      <a:lnStyleLst>
+        <a:ln w="6350" cap="flat" cmpd="sng" algn="ctr">
+          <a:solidFill>
+            <a:schemeClr val="phClr"/>
+          </a:solidFill>
+          <a:prstDash val="solid"/>
+          <a:miter lim="800000"/>
+        </a:ln>
+        <a:ln w="12700" cap="flat" cmpd="sng" algn="ctr">
+          <a:solidFill>
+            <a:schemeClr val="phClr"/>
+          </a:solidFill>
+          <a:prstDash val="solid"/>
+          <a:miter lim="800000"/>
+        </a:ln>
+        <a:ln w="19050" cap="flat" cmpd="sng" algn="ctr">
+          <a:solidFill>
+            <a:schemeClr val="phClr"/>
+          </a:solidFill>
+          <a:prstDash val="solid"/>
+          <a:miter lim="800000"/>
+        </a:ln>
+      </a:lnStyleLst>
+      <a:effectStyleLst>
+        <a:effectStyle>
+          <a:effectLst/>
+        </a:effectStyle>
+        <a:effectStyle>
+          <a:effectLst/>
+        </a:effectStyle>
+        <a:effectStyle>
+          <a:effectLst>
+            <a:outerShdw blurRad="57150" dist="19050" dir="5400000" algn="ctr" rotWithShape="0">
+              <a:srgbClr val="000000">
+                <a:alpha val="63000"/>
+              </a:srgbClr>
+            </a:outerShdw>
+          </a:effectLst>
+        </a:effectStyle>
+      </a:effectStyleLst>
+      <a:bgFillStyleLst>
+        <a:solidFill>
+          <a:schemeClr val="phClr"/>
+        </a:solidFill>
+        <a:solidFill>
+          <a:schemeClr val="phClr">
+            <a:tint val="95000"/>
+            <a:satMod val="170000"/>
+          </a:schemeClr>
+        </a:solidFill>
+        <a:gradFill rotWithShape="1">
+          <a:gsLst>
+            <a:gs pos="0">
+              <a:schemeClr val="phClr">
+                <a:tint val="93000"/>
+                <a:satMod val="150000"/>
+                <a:shade val="98000"/>
+                <a:lumMod val="102000"/>
+              </a:schemeClr>
+            </a:gs>
+            <a:gs pos="50000">
+              <a:schemeClr val="phClr">
+                <a:tint val="98000"/>
+                <a:satMod val="130000"/>
+                <a:shade val="90000"/>
+                <a:lumMod val="103000"/>
+              </a:schemeClr>
+            </a:gs>
+            <a:gs pos="100000">
+              <a:schemeClr val="phClr">
+                <a:shade val="63000"/>
+                <a:satMod val="120000"/>
+              </a:schemeClr>
+            </a:gs>
+          </a:gsLst>
+          <a:lin ang="5400000" scaled="0"/>
+        </a:gradFill>
+      </a:bgFillStyleLst>
+    </a:fmtScheme>
+  </a:themeElements>
+  <a:objectDefaults/>
+  <a:extraClrSchemeLst/>
+  <a:extLst>
+    <a:ext uri="{05A4C25C-085E-4340-85A3-A5531E510DB2}">
+      <thm15:themeFamily xmlns:thm15="http://schemas.microsoft.com/office/thememl/2012/main" name="Office Theme" id="{62F939B6-93AF-4DB8-9C6B-D6C7DFDC589F}" vid="{4A3C46E8-61CC-4603-A589-7422A47A8E4A}"/>
+    </a:ext>
+  </a:extLst>
+</a:theme>
 </file>
</xml_diff>